<commit_message>
Tests added for product controller. (Steve cleaned up the mocking part.) Slides adjusted, but not finished.
</commit_message>
<xml_diff>
--- a/Samples/Getting-Started-With-MVC/Getting Started with MVC.pptx
+++ b/Samples/Getting-Started-With-MVC/Getting Started with MVC.pptx
@@ -4,18 +4,26 @@
   <p:sldMasterIdLst>
     <p:sldMasterId id="2147483672" r:id="rId1"/>
   </p:sldMasterIdLst>
+  <p:notesMasterIdLst>
+    <p:notesMasterId r:id="rId18"/>
+  </p:notesMasterIdLst>
   <p:sldIdLst>
     <p:sldId id="256" r:id="rId2"/>
-    <p:sldId id="257" r:id="rId3"/>
-    <p:sldId id="258" r:id="rId4"/>
-    <p:sldId id="260" r:id="rId5"/>
-    <p:sldId id="259" r:id="rId6"/>
-    <p:sldId id="261" r:id="rId7"/>
-    <p:sldId id="262" r:id="rId8"/>
-    <p:sldId id="263" r:id="rId9"/>
-    <p:sldId id="264" r:id="rId10"/>
-    <p:sldId id="265" r:id="rId11"/>
-    <p:sldId id="266" r:id="rId12"/>
+    <p:sldId id="260" r:id="rId3"/>
+    <p:sldId id="267" r:id="rId4"/>
+    <p:sldId id="257" r:id="rId5"/>
+    <p:sldId id="262" r:id="rId6"/>
+    <p:sldId id="258" r:id="rId7"/>
+    <p:sldId id="269" r:id="rId8"/>
+    <p:sldId id="270" r:id="rId9"/>
+    <p:sldId id="271" r:id="rId10"/>
+    <p:sldId id="272" r:id="rId11"/>
+    <p:sldId id="259" r:id="rId12"/>
+    <p:sldId id="268" r:id="rId13"/>
+    <p:sldId id="263" r:id="rId14"/>
+    <p:sldId id="264" r:id="rId15"/>
+    <p:sldId id="265" r:id="rId16"/>
+    <p:sldId id="266" r:id="rId17"/>
   </p:sldIdLst>
   <p:sldSz cx="9144000" cy="6858000" type="screen4x3"/>
   <p:notesSz cx="6858000" cy="9144000"/>
@@ -117,6 +125,1753 @@
 </p:presentation>
 </file>
 
+<file path=ppt/notesMasters/notesMaster1.xml><?xml version="1.0" encoding="utf-8"?>
+<p:notesMaster xmlns:a="http://schemas.openxmlformats.org/drawingml/2006/main" xmlns:r="http://schemas.openxmlformats.org/officeDocument/2006/relationships" xmlns:p="http://schemas.openxmlformats.org/presentationml/2006/main">
+  <p:cSld>
+    <p:bg>
+      <p:bgRef idx="1001">
+        <a:schemeClr val="bg1"/>
+      </p:bgRef>
+    </p:bg>
+    <p:spTree>
+      <p:nvGrpSpPr>
+        <p:cNvPr id="1" name=""/>
+        <p:cNvGrpSpPr/>
+        <p:nvPr/>
+      </p:nvGrpSpPr>
+      <p:grpSpPr>
+        <a:xfrm>
+          <a:off x="0" y="0"/>
+          <a:ext cx="0" cy="0"/>
+          <a:chOff x="0" y="0"/>
+          <a:chExt cx="0" cy="0"/>
+        </a:xfrm>
+      </p:grpSpPr>
+      <p:sp>
+        <p:nvSpPr>
+          <p:cNvPr id="2" name="Header Placeholder 1"/>
+          <p:cNvSpPr>
+            <a:spLocks noGrp="1"/>
+          </p:cNvSpPr>
+          <p:nvPr>
+            <p:ph type="hdr" sz="quarter"/>
+          </p:nvPr>
+        </p:nvSpPr>
+        <p:spPr>
+          <a:xfrm>
+            <a:off x="0" y="0"/>
+            <a:ext cx="2971800" cy="457200"/>
+          </a:xfrm>
+          <a:prstGeom prst="rect">
+            <a:avLst/>
+          </a:prstGeom>
+        </p:spPr>
+        <p:txBody>
+          <a:bodyPr vert="horz" lIns="91440" tIns="45720" rIns="91440" bIns="45720" rtlCol="0"/>
+          <a:lstStyle>
+            <a:lvl1pPr algn="l">
+              <a:defRPr sz="1200"/>
+            </a:lvl1pPr>
+          </a:lstStyle>
+          <a:p>
+            <a:endParaRPr lang="en-US"/>
+          </a:p>
+        </p:txBody>
+      </p:sp>
+      <p:sp>
+        <p:nvSpPr>
+          <p:cNvPr id="3" name="Date Placeholder 2"/>
+          <p:cNvSpPr>
+            <a:spLocks noGrp="1"/>
+          </p:cNvSpPr>
+          <p:nvPr>
+            <p:ph type="dt" idx="1"/>
+          </p:nvPr>
+        </p:nvSpPr>
+        <p:spPr>
+          <a:xfrm>
+            <a:off x="3884613" y="0"/>
+            <a:ext cx="2971800" cy="457200"/>
+          </a:xfrm>
+          <a:prstGeom prst="rect">
+            <a:avLst/>
+          </a:prstGeom>
+        </p:spPr>
+        <p:txBody>
+          <a:bodyPr vert="horz" lIns="91440" tIns="45720" rIns="91440" bIns="45720" rtlCol="0"/>
+          <a:lstStyle>
+            <a:lvl1pPr algn="r">
+              <a:defRPr sz="1200"/>
+            </a:lvl1pPr>
+          </a:lstStyle>
+          <a:p>
+            <a:fld id="{B8B43353-CC08-4841-A32F-CA9CB26E48DD}" type="datetimeFigureOut">
+              <a:rPr lang="en-US" smtClean="0"/>
+              <a:t>4/9/2008</a:t>
+            </a:fld>
+            <a:endParaRPr lang="en-US"/>
+          </a:p>
+        </p:txBody>
+      </p:sp>
+      <p:sp>
+        <p:nvSpPr>
+          <p:cNvPr id="4" name="Slide Image Placeholder 3"/>
+          <p:cNvSpPr>
+            <a:spLocks noGrp="1" noRot="1" noChangeAspect="1"/>
+          </p:cNvSpPr>
+          <p:nvPr>
+            <p:ph type="sldImg" idx="2"/>
+          </p:nvPr>
+        </p:nvSpPr>
+        <p:spPr>
+          <a:xfrm>
+            <a:off x="1143000" y="685800"/>
+            <a:ext cx="4572000" cy="3429000"/>
+          </a:xfrm>
+          <a:prstGeom prst="rect">
+            <a:avLst/>
+          </a:prstGeom>
+          <a:noFill/>
+          <a:ln w="12700">
+            <a:solidFill>
+              <a:prstClr val="black"/>
+            </a:solidFill>
+          </a:ln>
+        </p:spPr>
+        <p:txBody>
+          <a:bodyPr vert="horz" lIns="91440" tIns="45720" rIns="91440" bIns="45720" rtlCol="0" anchor="ctr"/>
+          <a:lstStyle/>
+          <a:p>
+            <a:endParaRPr lang="en-US"/>
+          </a:p>
+        </p:txBody>
+      </p:sp>
+      <p:sp>
+        <p:nvSpPr>
+          <p:cNvPr id="5" name="Notes Placeholder 4"/>
+          <p:cNvSpPr>
+            <a:spLocks noGrp="1"/>
+          </p:cNvSpPr>
+          <p:nvPr>
+            <p:ph type="body" sz="quarter" idx="3"/>
+          </p:nvPr>
+        </p:nvSpPr>
+        <p:spPr>
+          <a:xfrm>
+            <a:off x="685800" y="4343400"/>
+            <a:ext cx="5486400" cy="4114800"/>
+          </a:xfrm>
+          <a:prstGeom prst="rect">
+            <a:avLst/>
+          </a:prstGeom>
+        </p:spPr>
+        <p:txBody>
+          <a:bodyPr vert="horz" lIns="91440" tIns="45720" rIns="91440" bIns="45720" rtlCol="0">
+            <a:normAutofit/>
+          </a:bodyPr>
+          <a:lstStyle/>
+          <a:p>
+            <a:pPr lvl="0"/>
+            <a:r>
+              <a:rPr lang="en-US" smtClean="0"/>
+              <a:t>Click to edit Master text styles</a:t>
+            </a:r>
+          </a:p>
+          <a:p>
+            <a:pPr lvl="1"/>
+            <a:r>
+              <a:rPr lang="en-US" smtClean="0"/>
+              <a:t>Second level</a:t>
+            </a:r>
+          </a:p>
+          <a:p>
+            <a:pPr lvl="2"/>
+            <a:r>
+              <a:rPr lang="en-US" smtClean="0"/>
+              <a:t>Third level</a:t>
+            </a:r>
+          </a:p>
+          <a:p>
+            <a:pPr lvl="3"/>
+            <a:r>
+              <a:rPr lang="en-US" smtClean="0"/>
+              <a:t>Fourth level</a:t>
+            </a:r>
+          </a:p>
+          <a:p>
+            <a:pPr lvl="4"/>
+            <a:r>
+              <a:rPr lang="en-US" smtClean="0"/>
+              <a:t>Fifth level</a:t>
+            </a:r>
+            <a:endParaRPr lang="en-US"/>
+          </a:p>
+        </p:txBody>
+      </p:sp>
+      <p:sp>
+        <p:nvSpPr>
+          <p:cNvPr id="6" name="Footer Placeholder 5"/>
+          <p:cNvSpPr>
+            <a:spLocks noGrp="1"/>
+          </p:cNvSpPr>
+          <p:nvPr>
+            <p:ph type="ftr" sz="quarter" idx="4"/>
+          </p:nvPr>
+        </p:nvSpPr>
+        <p:spPr>
+          <a:xfrm>
+            <a:off x="0" y="8685213"/>
+            <a:ext cx="2971800" cy="457200"/>
+          </a:xfrm>
+          <a:prstGeom prst="rect">
+            <a:avLst/>
+          </a:prstGeom>
+        </p:spPr>
+        <p:txBody>
+          <a:bodyPr vert="horz" lIns="91440" tIns="45720" rIns="91440" bIns="45720" rtlCol="0" anchor="b"/>
+          <a:lstStyle>
+            <a:lvl1pPr algn="l">
+              <a:defRPr sz="1200"/>
+            </a:lvl1pPr>
+          </a:lstStyle>
+          <a:p>
+            <a:endParaRPr lang="en-US"/>
+          </a:p>
+        </p:txBody>
+      </p:sp>
+      <p:sp>
+        <p:nvSpPr>
+          <p:cNvPr id="7" name="Slide Number Placeholder 6"/>
+          <p:cNvSpPr>
+            <a:spLocks noGrp="1"/>
+          </p:cNvSpPr>
+          <p:nvPr>
+            <p:ph type="sldNum" sz="quarter" idx="5"/>
+          </p:nvPr>
+        </p:nvSpPr>
+        <p:spPr>
+          <a:xfrm>
+            <a:off x="3884613" y="8685213"/>
+            <a:ext cx="2971800" cy="457200"/>
+          </a:xfrm>
+          <a:prstGeom prst="rect">
+            <a:avLst/>
+          </a:prstGeom>
+        </p:spPr>
+        <p:txBody>
+          <a:bodyPr vert="horz" lIns="91440" tIns="45720" rIns="91440" bIns="45720" rtlCol="0" anchor="b"/>
+          <a:lstStyle>
+            <a:lvl1pPr algn="r">
+              <a:defRPr sz="1200"/>
+            </a:lvl1pPr>
+          </a:lstStyle>
+          <a:p>
+            <a:fld id="{F8007F4E-10F5-4104-9EF8-E98D370060A3}" type="slidenum">
+              <a:rPr lang="en-US" smtClean="0"/>
+              <a:t>‹#›</a:t>
+            </a:fld>
+            <a:endParaRPr lang="en-US"/>
+          </a:p>
+        </p:txBody>
+      </p:sp>
+    </p:spTree>
+  </p:cSld>
+  <p:clrMap bg1="lt1" tx1="dk1" bg2="lt2" tx2="dk2" accent1="accent1" accent2="accent2" accent3="accent3" accent4="accent4" accent5="accent5" accent6="accent6" hlink="hlink" folHlink="folHlink"/>
+  <p:notesStyle>
+    <a:lvl1pPr marL="0" algn="l" defTabSz="914400" rtl="0" eaLnBrk="1" latinLnBrk="0" hangingPunct="1">
+      <a:defRPr sz="1200" kern="1200">
+        <a:solidFill>
+          <a:schemeClr val="tx1"/>
+        </a:solidFill>
+        <a:latin typeface="+mn-lt"/>
+        <a:ea typeface="+mn-ea"/>
+        <a:cs typeface="+mn-cs"/>
+      </a:defRPr>
+    </a:lvl1pPr>
+    <a:lvl2pPr marL="457200" algn="l" defTabSz="914400" rtl="0" eaLnBrk="1" latinLnBrk="0" hangingPunct="1">
+      <a:defRPr sz="1200" kern="1200">
+        <a:solidFill>
+          <a:schemeClr val="tx1"/>
+        </a:solidFill>
+        <a:latin typeface="+mn-lt"/>
+        <a:ea typeface="+mn-ea"/>
+        <a:cs typeface="+mn-cs"/>
+      </a:defRPr>
+    </a:lvl2pPr>
+    <a:lvl3pPr marL="914400" algn="l" defTabSz="914400" rtl="0" eaLnBrk="1" latinLnBrk="0" hangingPunct="1">
+      <a:defRPr sz="1200" kern="1200">
+        <a:solidFill>
+          <a:schemeClr val="tx1"/>
+        </a:solidFill>
+        <a:latin typeface="+mn-lt"/>
+        <a:ea typeface="+mn-ea"/>
+        <a:cs typeface="+mn-cs"/>
+      </a:defRPr>
+    </a:lvl3pPr>
+    <a:lvl4pPr marL="1371600" algn="l" defTabSz="914400" rtl="0" eaLnBrk="1" latinLnBrk="0" hangingPunct="1">
+      <a:defRPr sz="1200" kern="1200">
+        <a:solidFill>
+          <a:schemeClr val="tx1"/>
+        </a:solidFill>
+        <a:latin typeface="+mn-lt"/>
+        <a:ea typeface="+mn-ea"/>
+        <a:cs typeface="+mn-cs"/>
+      </a:defRPr>
+    </a:lvl4pPr>
+    <a:lvl5pPr marL="1828800" algn="l" defTabSz="914400" rtl="0" eaLnBrk="1" latinLnBrk="0" hangingPunct="1">
+      <a:defRPr sz="1200" kern="1200">
+        <a:solidFill>
+          <a:schemeClr val="tx1"/>
+        </a:solidFill>
+        <a:latin typeface="+mn-lt"/>
+        <a:ea typeface="+mn-ea"/>
+        <a:cs typeface="+mn-cs"/>
+      </a:defRPr>
+    </a:lvl5pPr>
+    <a:lvl6pPr marL="2286000" algn="l" defTabSz="914400" rtl="0" eaLnBrk="1" latinLnBrk="0" hangingPunct="1">
+      <a:defRPr sz="1200" kern="1200">
+        <a:solidFill>
+          <a:schemeClr val="tx1"/>
+        </a:solidFill>
+        <a:latin typeface="+mn-lt"/>
+        <a:ea typeface="+mn-ea"/>
+        <a:cs typeface="+mn-cs"/>
+      </a:defRPr>
+    </a:lvl6pPr>
+    <a:lvl7pPr marL="2743200" algn="l" defTabSz="914400" rtl="0" eaLnBrk="1" latinLnBrk="0" hangingPunct="1">
+      <a:defRPr sz="1200" kern="1200">
+        <a:solidFill>
+          <a:schemeClr val="tx1"/>
+        </a:solidFill>
+        <a:latin typeface="+mn-lt"/>
+        <a:ea typeface="+mn-ea"/>
+        <a:cs typeface="+mn-cs"/>
+      </a:defRPr>
+    </a:lvl7pPr>
+    <a:lvl8pPr marL="3200400" algn="l" defTabSz="914400" rtl="0" eaLnBrk="1" latinLnBrk="0" hangingPunct="1">
+      <a:defRPr sz="1200" kern="1200">
+        <a:solidFill>
+          <a:schemeClr val="tx1"/>
+        </a:solidFill>
+        <a:latin typeface="+mn-lt"/>
+        <a:ea typeface="+mn-ea"/>
+        <a:cs typeface="+mn-cs"/>
+      </a:defRPr>
+    </a:lvl8pPr>
+    <a:lvl9pPr marL="3657600" algn="l" defTabSz="914400" rtl="0" eaLnBrk="1" latinLnBrk="0" hangingPunct="1">
+      <a:defRPr sz="1200" kern="1200">
+        <a:solidFill>
+          <a:schemeClr val="tx1"/>
+        </a:solidFill>
+        <a:latin typeface="+mn-lt"/>
+        <a:ea typeface="+mn-ea"/>
+        <a:cs typeface="+mn-cs"/>
+      </a:defRPr>
+    </a:lvl9pPr>
+  </p:notesStyle>
+</p:notesMaster>
+</file>
+
+<file path=ppt/notesSlides/notesSlide1.xml><?xml version="1.0" encoding="utf-8"?>
+<p:notes xmlns:a="http://schemas.openxmlformats.org/drawingml/2006/main" xmlns:r="http://schemas.openxmlformats.org/officeDocument/2006/relationships" xmlns:p="http://schemas.openxmlformats.org/presentationml/2006/main">
+  <p:cSld>
+    <p:spTree>
+      <p:nvGrpSpPr>
+        <p:cNvPr id="1" name=""/>
+        <p:cNvGrpSpPr/>
+        <p:nvPr/>
+      </p:nvGrpSpPr>
+      <p:grpSpPr>
+        <a:xfrm>
+          <a:off x="0" y="0"/>
+          <a:ext cx="0" cy="0"/>
+          <a:chOff x="0" y="0"/>
+          <a:chExt cx="0" cy="0"/>
+        </a:xfrm>
+      </p:grpSpPr>
+      <p:sp>
+        <p:nvSpPr>
+          <p:cNvPr id="2" name="Slide Image Placeholder 1"/>
+          <p:cNvSpPr>
+            <a:spLocks noGrp="1" noRot="1" noChangeAspect="1"/>
+          </p:cNvSpPr>
+          <p:nvPr>
+            <p:ph type="sldImg"/>
+          </p:nvPr>
+        </p:nvSpPr>
+        <p:spPr/>
+      </p:sp>
+      <p:sp>
+        <p:nvSpPr>
+          <p:cNvPr id="3" name="Notes Placeholder 2"/>
+          <p:cNvSpPr>
+            <a:spLocks noGrp="1"/>
+          </p:cNvSpPr>
+          <p:nvPr>
+            <p:ph type="body" idx="1"/>
+          </p:nvPr>
+        </p:nvSpPr>
+        <p:spPr/>
+        <p:txBody>
+          <a:bodyPr>
+            <a:normAutofit/>
+          </a:bodyPr>
+          <a:lstStyle/>
+          <a:p>
+            <a:pPr marL="228600" indent="-228600">
+              <a:buNone/>
+            </a:pPr>
+            <a:r>
+              <a:rPr lang="en-US" dirty="0" smtClean="0"/>
+              <a:t>New title, talking point “Why do we need it?”</a:t>
+            </a:r>
+          </a:p>
+          <a:p>
+            <a:pPr marL="228600" indent="-228600">
+              <a:buAutoNum type="arabicPeriod"/>
+            </a:pPr>
+            <a:endParaRPr lang="en-US" dirty="0" smtClean="0"/>
+          </a:p>
+          <a:p>
+            <a:pPr marL="228600" indent="-228600">
+              <a:buAutoNum type="arabicPeriod"/>
+            </a:pPr>
+            <a:r>
+              <a:rPr lang="en-US" dirty="0" smtClean="0"/>
+              <a:t>Proven pattern</a:t>
+            </a:r>
+          </a:p>
+          <a:p>
+            <a:pPr marL="228600" indent="-228600">
+              <a:buAutoNum type="arabicPeriod"/>
+            </a:pPr>
+            <a:r>
+              <a:rPr lang="en-US" dirty="0" smtClean="0"/>
+              <a:t>Not</a:t>
+            </a:r>
+            <a:r>
+              <a:rPr lang="en-US" baseline="0" dirty="0" smtClean="0"/>
+              <a:t> open source</a:t>
+            </a:r>
+          </a:p>
+          <a:p>
+            <a:pPr marL="228600" indent="-228600">
+              <a:buAutoNum type="arabicPeriod"/>
+            </a:pPr>
+            <a:r>
+              <a:rPr lang="en-US" baseline="0" dirty="0" smtClean="0"/>
+              <a:t>Demand from community for an offering from Microsoft</a:t>
+            </a:r>
+          </a:p>
+          <a:p>
+            <a:pPr marL="228600" indent="-228600">
+              <a:buAutoNum type="arabicPeriod"/>
+            </a:pPr>
+            <a:r>
+              <a:rPr lang="en-US" baseline="0" dirty="0" smtClean="0"/>
+              <a:t>Test against code behinds</a:t>
+            </a:r>
+          </a:p>
+          <a:p>
+            <a:pPr marL="228600" indent="-228600">
+              <a:buAutoNum type="arabicPeriod"/>
+            </a:pPr>
+            <a:r>
+              <a:rPr lang="en-US" baseline="0" dirty="0" smtClean="0"/>
+              <a:t>Page lifecycle mess</a:t>
+            </a:r>
+          </a:p>
+          <a:p>
+            <a:pPr marL="228600" indent="-228600">
+              <a:buAutoNum type="arabicPeriod"/>
+            </a:pPr>
+            <a:r>
+              <a:rPr lang="en-US" dirty="0" smtClean="0"/>
+              <a:t>Piling up in the steamin</a:t>
+            </a:r>
+            <a:r>
+              <a:rPr lang="en-US" baseline="0" dirty="0" smtClean="0"/>
+              <a:t>g </a:t>
+            </a:r>
+            <a:r>
+              <a:rPr lang="en-US" baseline="0" dirty="0" err="1" smtClean="0"/>
+              <a:t>page</a:t>
+            </a:r>
+            <a:r>
+              <a:rPr lang="en-US" dirty="0" err="1" smtClean="0"/>
+              <a:t>Load</a:t>
+            </a:r>
+            <a:endParaRPr lang="en-US" dirty="0" smtClean="0"/>
+          </a:p>
+          <a:p>
+            <a:pPr marL="228600" indent="-228600">
+              <a:buAutoNum type="arabicPeriod"/>
+            </a:pPr>
+            <a:r>
+              <a:rPr lang="en-US" dirty="0" smtClean="0"/>
+              <a:t>Mix of logic and presentation</a:t>
+            </a:r>
+            <a:r>
+              <a:rPr lang="en-US" baseline="0" dirty="0" smtClean="0"/>
+              <a:t> in code behinds [picture of </a:t>
+            </a:r>
+            <a:r>
+              <a:rPr lang="en-US" baseline="0" dirty="0" err="1" smtClean="0"/>
+              <a:t>spagetti</a:t>
+            </a:r>
+            <a:r>
+              <a:rPr lang="en-US" baseline="0" dirty="0" smtClean="0"/>
+              <a:t>]</a:t>
+            </a:r>
+            <a:endParaRPr lang="en-US" dirty="0"/>
+          </a:p>
+        </p:txBody>
+      </p:sp>
+      <p:sp>
+        <p:nvSpPr>
+          <p:cNvPr id="4" name="Slide Number Placeholder 3"/>
+          <p:cNvSpPr>
+            <a:spLocks noGrp="1"/>
+          </p:cNvSpPr>
+          <p:nvPr>
+            <p:ph type="sldNum" sz="quarter" idx="10"/>
+          </p:nvPr>
+        </p:nvSpPr>
+        <p:spPr/>
+        <p:txBody>
+          <a:bodyPr/>
+          <a:lstStyle/>
+          <a:p>
+            <a:fld id="{F8007F4E-10F5-4104-9EF8-E98D370060A3}" type="slidenum">
+              <a:rPr lang="en-US" smtClean="0"/>
+              <a:t>2</a:t>
+            </a:fld>
+            <a:endParaRPr lang="en-US"/>
+          </a:p>
+        </p:txBody>
+      </p:sp>
+    </p:spTree>
+  </p:cSld>
+  <p:clrMapOvr>
+    <a:masterClrMapping/>
+  </p:clrMapOvr>
+</p:notes>
+</file>
+
+<file path=ppt/notesSlides/notesSlide10.xml><?xml version="1.0" encoding="utf-8"?>
+<p:notes xmlns:a="http://schemas.openxmlformats.org/drawingml/2006/main" xmlns:r="http://schemas.openxmlformats.org/officeDocument/2006/relationships" xmlns:p="http://schemas.openxmlformats.org/presentationml/2006/main">
+  <p:cSld>
+    <p:spTree>
+      <p:nvGrpSpPr>
+        <p:cNvPr id="1" name=""/>
+        <p:cNvGrpSpPr/>
+        <p:nvPr/>
+      </p:nvGrpSpPr>
+      <p:grpSpPr>
+        <a:xfrm>
+          <a:off x="0" y="0"/>
+          <a:ext cx="0" cy="0"/>
+          <a:chOff x="0" y="0"/>
+          <a:chExt cx="0" cy="0"/>
+        </a:xfrm>
+      </p:grpSpPr>
+      <p:sp>
+        <p:nvSpPr>
+          <p:cNvPr id="2" name="Slide Image Placeholder 1"/>
+          <p:cNvSpPr>
+            <a:spLocks noGrp="1" noRot="1" noChangeAspect="1"/>
+          </p:cNvSpPr>
+          <p:nvPr>
+            <p:ph type="sldImg"/>
+          </p:nvPr>
+        </p:nvSpPr>
+        <p:spPr/>
+      </p:sp>
+      <p:sp>
+        <p:nvSpPr>
+          <p:cNvPr id="3" name="Notes Placeholder 2"/>
+          <p:cNvSpPr>
+            <a:spLocks noGrp="1"/>
+          </p:cNvSpPr>
+          <p:nvPr>
+            <p:ph type="body" idx="1"/>
+          </p:nvPr>
+        </p:nvSpPr>
+        <p:spPr/>
+        <p:txBody>
+          <a:bodyPr>
+            <a:normAutofit/>
+          </a:bodyPr>
+          <a:lstStyle/>
+          <a:p>
+            <a:r>
+              <a:rPr lang="en-US" dirty="0" smtClean="0"/>
+              <a:t>These need to be the talking points of three circles diagram</a:t>
+            </a:r>
+            <a:endParaRPr lang="en-US" dirty="0"/>
+          </a:p>
+        </p:txBody>
+      </p:sp>
+      <p:sp>
+        <p:nvSpPr>
+          <p:cNvPr id="4" name="Slide Number Placeholder 3"/>
+          <p:cNvSpPr>
+            <a:spLocks noGrp="1"/>
+          </p:cNvSpPr>
+          <p:nvPr>
+            <p:ph type="sldNum" sz="quarter" idx="10"/>
+          </p:nvPr>
+        </p:nvSpPr>
+        <p:spPr/>
+        <p:txBody>
+          <a:bodyPr/>
+          <a:lstStyle/>
+          <a:p>
+            <a:fld id="{F8007F4E-10F5-4104-9EF8-E98D370060A3}" type="slidenum">
+              <a:rPr lang="en-US" smtClean="0"/>
+              <a:t>13</a:t>
+            </a:fld>
+            <a:endParaRPr lang="en-US"/>
+          </a:p>
+        </p:txBody>
+      </p:sp>
+    </p:spTree>
+  </p:cSld>
+  <p:clrMapOvr>
+    <a:masterClrMapping/>
+  </p:clrMapOvr>
+</p:notes>
+</file>
+
+<file path=ppt/notesSlides/notesSlide11.xml><?xml version="1.0" encoding="utf-8"?>
+<p:notes xmlns:a="http://schemas.openxmlformats.org/drawingml/2006/main" xmlns:r="http://schemas.openxmlformats.org/officeDocument/2006/relationships" xmlns:p="http://schemas.openxmlformats.org/presentationml/2006/main">
+  <p:cSld>
+    <p:spTree>
+      <p:nvGrpSpPr>
+        <p:cNvPr id="1" name=""/>
+        <p:cNvGrpSpPr/>
+        <p:nvPr/>
+      </p:nvGrpSpPr>
+      <p:grpSpPr>
+        <a:xfrm>
+          <a:off x="0" y="0"/>
+          <a:ext cx="0" cy="0"/>
+          <a:chOff x="0" y="0"/>
+          <a:chExt cx="0" cy="0"/>
+        </a:xfrm>
+      </p:grpSpPr>
+      <p:sp>
+        <p:nvSpPr>
+          <p:cNvPr id="2" name="Slide Image Placeholder 1"/>
+          <p:cNvSpPr>
+            <a:spLocks noGrp="1" noRot="1" noChangeAspect="1"/>
+          </p:cNvSpPr>
+          <p:nvPr>
+            <p:ph type="sldImg"/>
+          </p:nvPr>
+        </p:nvSpPr>
+        <p:spPr/>
+      </p:sp>
+      <p:sp>
+        <p:nvSpPr>
+          <p:cNvPr id="3" name="Notes Placeholder 2"/>
+          <p:cNvSpPr>
+            <a:spLocks noGrp="1"/>
+          </p:cNvSpPr>
+          <p:nvPr>
+            <p:ph type="body" idx="1"/>
+          </p:nvPr>
+        </p:nvSpPr>
+        <p:spPr/>
+        <p:txBody>
+          <a:bodyPr>
+            <a:normAutofit/>
+          </a:bodyPr>
+          <a:lstStyle/>
+          <a:p>
+            <a:pPr marL="228600" indent="-228600">
+              <a:buAutoNum type="arabicPeriod"/>
+            </a:pPr>
+            <a:r>
+              <a:rPr lang="en-US" dirty="0" smtClean="0"/>
+              <a:t>New app</a:t>
+            </a:r>
+          </a:p>
+          <a:p>
+            <a:pPr marL="228600" indent="-228600">
+              <a:buAutoNum type="arabicPeriod"/>
+            </a:pPr>
+            <a:r>
+              <a:rPr lang="en-US" dirty="0" smtClean="0"/>
+              <a:t>Demo</a:t>
+            </a:r>
+            <a:r>
+              <a:rPr lang="en-US" baseline="0" dirty="0" smtClean="0"/>
+              <a:t> app</a:t>
+            </a:r>
+            <a:endParaRPr lang="en-US" dirty="0"/>
+          </a:p>
+        </p:txBody>
+      </p:sp>
+      <p:sp>
+        <p:nvSpPr>
+          <p:cNvPr id="4" name="Slide Number Placeholder 3"/>
+          <p:cNvSpPr>
+            <a:spLocks noGrp="1"/>
+          </p:cNvSpPr>
+          <p:nvPr>
+            <p:ph type="sldNum" sz="quarter" idx="10"/>
+          </p:nvPr>
+        </p:nvSpPr>
+        <p:spPr/>
+        <p:txBody>
+          <a:bodyPr/>
+          <a:lstStyle/>
+          <a:p>
+            <a:fld id="{F8007F4E-10F5-4104-9EF8-E98D370060A3}" type="slidenum">
+              <a:rPr lang="en-US" smtClean="0"/>
+              <a:t>14</a:t>
+            </a:fld>
+            <a:endParaRPr lang="en-US"/>
+          </a:p>
+        </p:txBody>
+      </p:sp>
+    </p:spTree>
+  </p:cSld>
+  <p:clrMapOvr>
+    <a:masterClrMapping/>
+  </p:clrMapOvr>
+</p:notes>
+</file>
+
+<file path=ppt/notesSlides/notesSlide12.xml><?xml version="1.0" encoding="utf-8"?>
+<p:notes xmlns:a="http://schemas.openxmlformats.org/drawingml/2006/main" xmlns:r="http://schemas.openxmlformats.org/officeDocument/2006/relationships" xmlns:p="http://schemas.openxmlformats.org/presentationml/2006/main">
+  <p:cSld>
+    <p:spTree>
+      <p:nvGrpSpPr>
+        <p:cNvPr id="1" name=""/>
+        <p:cNvGrpSpPr/>
+        <p:nvPr/>
+      </p:nvGrpSpPr>
+      <p:grpSpPr>
+        <a:xfrm>
+          <a:off x="0" y="0"/>
+          <a:ext cx="0" cy="0"/>
+          <a:chOff x="0" y="0"/>
+          <a:chExt cx="0" cy="0"/>
+        </a:xfrm>
+      </p:grpSpPr>
+      <p:sp>
+        <p:nvSpPr>
+          <p:cNvPr id="2" name="Slide Image Placeholder 1"/>
+          <p:cNvSpPr>
+            <a:spLocks noGrp="1" noRot="1" noChangeAspect="1"/>
+          </p:cNvSpPr>
+          <p:nvPr>
+            <p:ph type="sldImg"/>
+          </p:nvPr>
+        </p:nvSpPr>
+        <p:spPr/>
+      </p:sp>
+      <p:sp>
+        <p:nvSpPr>
+          <p:cNvPr id="3" name="Notes Placeholder 2"/>
+          <p:cNvSpPr>
+            <a:spLocks noGrp="1"/>
+          </p:cNvSpPr>
+          <p:nvPr>
+            <p:ph type="body" idx="1"/>
+          </p:nvPr>
+        </p:nvSpPr>
+        <p:spPr/>
+        <p:txBody>
+          <a:bodyPr>
+            <a:normAutofit/>
+          </a:bodyPr>
+          <a:lstStyle/>
+          <a:p>
+            <a:endParaRPr lang="en-US" dirty="0"/>
+          </a:p>
+        </p:txBody>
+      </p:sp>
+      <p:sp>
+        <p:nvSpPr>
+          <p:cNvPr id="4" name="Slide Number Placeholder 3"/>
+          <p:cNvSpPr>
+            <a:spLocks noGrp="1"/>
+          </p:cNvSpPr>
+          <p:nvPr>
+            <p:ph type="sldNum" sz="quarter" idx="10"/>
+          </p:nvPr>
+        </p:nvSpPr>
+        <p:spPr/>
+        <p:txBody>
+          <a:bodyPr/>
+          <a:lstStyle/>
+          <a:p>
+            <a:fld id="{F8007F4E-10F5-4104-9EF8-E98D370060A3}" type="slidenum">
+              <a:rPr lang="en-US" smtClean="0"/>
+              <a:t>15</a:t>
+            </a:fld>
+            <a:endParaRPr lang="en-US"/>
+          </a:p>
+        </p:txBody>
+      </p:sp>
+    </p:spTree>
+  </p:cSld>
+  <p:clrMapOvr>
+    <a:masterClrMapping/>
+  </p:clrMapOvr>
+</p:notes>
+</file>
+
+<file path=ppt/notesSlides/notesSlide2.xml><?xml version="1.0" encoding="utf-8"?>
+<p:notes xmlns:a="http://schemas.openxmlformats.org/drawingml/2006/main" xmlns:r="http://schemas.openxmlformats.org/officeDocument/2006/relationships" xmlns:p="http://schemas.openxmlformats.org/presentationml/2006/main">
+  <p:cSld>
+    <p:spTree>
+      <p:nvGrpSpPr>
+        <p:cNvPr id="1" name=""/>
+        <p:cNvGrpSpPr/>
+        <p:nvPr/>
+      </p:nvGrpSpPr>
+      <p:grpSpPr>
+        <a:xfrm>
+          <a:off x="0" y="0"/>
+          <a:ext cx="0" cy="0"/>
+          <a:chOff x="0" y="0"/>
+          <a:chExt cx="0" cy="0"/>
+        </a:xfrm>
+      </p:grpSpPr>
+      <p:sp>
+        <p:nvSpPr>
+          <p:cNvPr id="2" name="Slide Image Placeholder 1"/>
+          <p:cNvSpPr>
+            <a:spLocks noGrp="1" noRot="1" noChangeAspect="1"/>
+          </p:cNvSpPr>
+          <p:nvPr>
+            <p:ph type="sldImg"/>
+          </p:nvPr>
+        </p:nvSpPr>
+        <p:spPr/>
+      </p:sp>
+      <p:sp>
+        <p:nvSpPr>
+          <p:cNvPr id="3" name="Notes Placeholder 2"/>
+          <p:cNvSpPr>
+            <a:spLocks noGrp="1"/>
+          </p:cNvSpPr>
+          <p:nvPr>
+            <p:ph type="body" idx="1"/>
+          </p:nvPr>
+        </p:nvSpPr>
+        <p:spPr/>
+        <p:txBody>
+          <a:bodyPr>
+            <a:normAutofit/>
+          </a:bodyPr>
+          <a:lstStyle/>
+          <a:p>
+            <a:r>
+              <a:rPr lang="en-US" dirty="0" smtClean="0"/>
+              <a:t>Everybody’s doing it, man</a:t>
+            </a:r>
+          </a:p>
+          <a:p>
+            <a:endParaRPr lang="en-US" dirty="0" smtClean="0"/>
+          </a:p>
+          <a:p>
+            <a:r>
+              <a:rPr lang="en-US" dirty="0" smtClean="0"/>
+              <a:t>Explain why monorail</a:t>
+            </a:r>
+            <a:r>
+              <a:rPr lang="en-US" baseline="0" dirty="0" smtClean="0"/>
+              <a:t> is a valid alternative, but it’s Open Source</a:t>
+            </a:r>
+            <a:endParaRPr lang="en-US" dirty="0"/>
+          </a:p>
+        </p:txBody>
+      </p:sp>
+      <p:sp>
+        <p:nvSpPr>
+          <p:cNvPr id="4" name="Slide Number Placeholder 3"/>
+          <p:cNvSpPr>
+            <a:spLocks noGrp="1"/>
+          </p:cNvSpPr>
+          <p:nvPr>
+            <p:ph type="sldNum" sz="quarter" idx="10"/>
+          </p:nvPr>
+        </p:nvSpPr>
+        <p:spPr/>
+        <p:txBody>
+          <a:bodyPr/>
+          <a:lstStyle/>
+          <a:p>
+            <a:fld id="{F8007F4E-10F5-4104-9EF8-E98D370060A3}" type="slidenum">
+              <a:rPr lang="en-US" smtClean="0"/>
+              <a:t>3</a:t>
+            </a:fld>
+            <a:endParaRPr lang="en-US"/>
+          </a:p>
+        </p:txBody>
+      </p:sp>
+    </p:spTree>
+  </p:cSld>
+  <p:clrMapOvr>
+    <a:masterClrMapping/>
+  </p:clrMapOvr>
+</p:notes>
+</file>
+
+<file path=ppt/notesSlides/notesSlide3.xml><?xml version="1.0" encoding="utf-8"?>
+<p:notes xmlns:a="http://schemas.openxmlformats.org/drawingml/2006/main" xmlns:r="http://schemas.openxmlformats.org/officeDocument/2006/relationships" xmlns:p="http://schemas.openxmlformats.org/presentationml/2006/main">
+  <p:cSld>
+    <p:spTree>
+      <p:nvGrpSpPr>
+        <p:cNvPr id="1" name=""/>
+        <p:cNvGrpSpPr/>
+        <p:nvPr/>
+      </p:nvGrpSpPr>
+      <p:grpSpPr>
+        <a:xfrm>
+          <a:off x="0" y="0"/>
+          <a:ext cx="0" cy="0"/>
+          <a:chOff x="0" y="0"/>
+          <a:chExt cx="0" cy="0"/>
+        </a:xfrm>
+      </p:grpSpPr>
+      <p:sp>
+        <p:nvSpPr>
+          <p:cNvPr id="2" name="Slide Image Placeholder 1"/>
+          <p:cNvSpPr>
+            <a:spLocks noGrp="1" noRot="1" noChangeAspect="1"/>
+          </p:cNvSpPr>
+          <p:nvPr>
+            <p:ph type="sldImg"/>
+          </p:nvPr>
+        </p:nvSpPr>
+        <p:spPr/>
+      </p:sp>
+      <p:sp>
+        <p:nvSpPr>
+          <p:cNvPr id="3" name="Notes Placeholder 2"/>
+          <p:cNvSpPr>
+            <a:spLocks noGrp="1"/>
+          </p:cNvSpPr>
+          <p:nvPr>
+            <p:ph type="body" idx="1"/>
+          </p:nvPr>
+        </p:nvSpPr>
+        <p:spPr/>
+        <p:txBody>
+          <a:bodyPr>
+            <a:normAutofit/>
+          </a:bodyPr>
+          <a:lstStyle/>
+          <a:p>
+            <a:r>
+              <a:rPr lang="en-US" dirty="0" smtClean="0"/>
+              <a:t>Expand on not a replacement to </a:t>
+            </a:r>
+            <a:r>
+              <a:rPr lang="en-US" dirty="0" err="1" smtClean="0"/>
+              <a:t>WebForms</a:t>
+            </a:r>
+            <a:endParaRPr lang="en-US" dirty="0" smtClean="0"/>
+          </a:p>
+          <a:p>
+            <a:r>
+              <a:rPr lang="en-US" dirty="0" err="1" smtClean="0"/>
+              <a:t>WebForms</a:t>
+            </a:r>
+            <a:r>
+              <a:rPr lang="en-US" baseline="0" dirty="0" smtClean="0"/>
+              <a:t> is a beast</a:t>
+            </a:r>
+            <a:endParaRPr lang="en-US" dirty="0"/>
+          </a:p>
+        </p:txBody>
+      </p:sp>
+      <p:sp>
+        <p:nvSpPr>
+          <p:cNvPr id="4" name="Slide Number Placeholder 3"/>
+          <p:cNvSpPr>
+            <a:spLocks noGrp="1"/>
+          </p:cNvSpPr>
+          <p:nvPr>
+            <p:ph type="sldNum" sz="quarter" idx="10"/>
+          </p:nvPr>
+        </p:nvSpPr>
+        <p:spPr/>
+        <p:txBody>
+          <a:bodyPr/>
+          <a:lstStyle/>
+          <a:p>
+            <a:fld id="{F8007F4E-10F5-4104-9EF8-E98D370060A3}" type="slidenum">
+              <a:rPr lang="en-US" smtClean="0"/>
+              <a:t>4</a:t>
+            </a:fld>
+            <a:endParaRPr lang="en-US"/>
+          </a:p>
+        </p:txBody>
+      </p:sp>
+    </p:spTree>
+  </p:cSld>
+  <p:clrMapOvr>
+    <a:masterClrMapping/>
+  </p:clrMapOvr>
+</p:notes>
+</file>
+
+<file path=ppt/notesSlides/notesSlide4.xml><?xml version="1.0" encoding="utf-8"?>
+<p:notes xmlns:a="http://schemas.openxmlformats.org/drawingml/2006/main" xmlns:r="http://schemas.openxmlformats.org/officeDocument/2006/relationships" xmlns:p="http://schemas.openxmlformats.org/presentationml/2006/main">
+  <p:cSld>
+    <p:spTree>
+      <p:nvGrpSpPr>
+        <p:cNvPr id="1" name=""/>
+        <p:cNvGrpSpPr/>
+        <p:nvPr/>
+      </p:nvGrpSpPr>
+      <p:grpSpPr>
+        <a:xfrm>
+          <a:off x="0" y="0"/>
+          <a:ext cx="0" cy="0"/>
+          <a:chOff x="0" y="0"/>
+          <a:chExt cx="0" cy="0"/>
+        </a:xfrm>
+      </p:grpSpPr>
+      <p:sp>
+        <p:nvSpPr>
+          <p:cNvPr id="2" name="Slide Image Placeholder 1"/>
+          <p:cNvSpPr>
+            <a:spLocks noGrp="1" noRot="1" noChangeAspect="1"/>
+          </p:cNvSpPr>
+          <p:nvPr>
+            <p:ph type="sldImg"/>
+          </p:nvPr>
+        </p:nvSpPr>
+        <p:spPr/>
+      </p:sp>
+      <p:sp>
+        <p:nvSpPr>
+          <p:cNvPr id="3" name="Notes Placeholder 2"/>
+          <p:cNvSpPr>
+            <a:spLocks noGrp="1"/>
+          </p:cNvSpPr>
+          <p:nvPr>
+            <p:ph type="body" idx="1"/>
+          </p:nvPr>
+        </p:nvSpPr>
+        <p:spPr/>
+        <p:txBody>
+          <a:bodyPr>
+            <a:normAutofit/>
+          </a:bodyPr>
+          <a:lstStyle/>
+          <a:p>
+            <a:r>
+              <a:rPr lang="en-US" dirty="0" smtClean="0"/>
+              <a:t>Sell</a:t>
+            </a:r>
+            <a:r>
+              <a:rPr lang="en-US" baseline="0" dirty="0" smtClean="0"/>
+              <a:t> on the pattern, find an analogy, elevator pitch </a:t>
+            </a:r>
+            <a:endParaRPr lang="en-US" dirty="0" smtClean="0"/>
+          </a:p>
+          <a:p>
+            <a:r>
+              <a:rPr lang="en-US" dirty="0" smtClean="0"/>
+              <a:t>Cover Controller</a:t>
+            </a:r>
+          </a:p>
+          <a:p>
+            <a:r>
+              <a:rPr lang="en-US" dirty="0" smtClean="0"/>
+              <a:t>Cover</a:t>
+            </a:r>
+            <a:r>
+              <a:rPr lang="en-US" baseline="0" dirty="0" smtClean="0"/>
+              <a:t> View</a:t>
+            </a:r>
+          </a:p>
+          <a:p>
+            <a:r>
+              <a:rPr lang="en-US" baseline="0" dirty="0" smtClean="0"/>
+              <a:t>Cover Model</a:t>
+            </a:r>
+          </a:p>
+        </p:txBody>
+      </p:sp>
+      <p:sp>
+        <p:nvSpPr>
+          <p:cNvPr id="4" name="Slide Number Placeholder 3"/>
+          <p:cNvSpPr>
+            <a:spLocks noGrp="1"/>
+          </p:cNvSpPr>
+          <p:nvPr>
+            <p:ph type="sldNum" sz="quarter" idx="10"/>
+          </p:nvPr>
+        </p:nvSpPr>
+        <p:spPr/>
+        <p:txBody>
+          <a:bodyPr/>
+          <a:lstStyle/>
+          <a:p>
+            <a:fld id="{F8007F4E-10F5-4104-9EF8-E98D370060A3}" type="slidenum">
+              <a:rPr lang="en-US" smtClean="0"/>
+              <a:t>5</a:t>
+            </a:fld>
+            <a:endParaRPr lang="en-US"/>
+          </a:p>
+        </p:txBody>
+      </p:sp>
+    </p:spTree>
+  </p:cSld>
+  <p:clrMapOvr>
+    <a:masterClrMapping/>
+  </p:clrMapOvr>
+</p:notes>
+</file>
+
+<file path=ppt/notesSlides/notesSlide5.xml><?xml version="1.0" encoding="utf-8"?>
+<p:notes xmlns:a="http://schemas.openxmlformats.org/drawingml/2006/main" xmlns:r="http://schemas.openxmlformats.org/officeDocument/2006/relationships" xmlns:p="http://schemas.openxmlformats.org/presentationml/2006/main">
+  <p:cSld>
+    <p:spTree>
+      <p:nvGrpSpPr>
+        <p:cNvPr id="1" name=""/>
+        <p:cNvGrpSpPr/>
+        <p:nvPr/>
+      </p:nvGrpSpPr>
+      <p:grpSpPr>
+        <a:xfrm>
+          <a:off x="0" y="0"/>
+          <a:ext cx="0" cy="0"/>
+          <a:chOff x="0" y="0"/>
+          <a:chExt cx="0" cy="0"/>
+        </a:xfrm>
+      </p:grpSpPr>
+      <p:sp>
+        <p:nvSpPr>
+          <p:cNvPr id="2" name="Slide Image Placeholder 1"/>
+          <p:cNvSpPr>
+            <a:spLocks noGrp="1" noRot="1" noChangeAspect="1"/>
+          </p:cNvSpPr>
+          <p:nvPr>
+            <p:ph type="sldImg"/>
+          </p:nvPr>
+        </p:nvSpPr>
+        <p:spPr/>
+      </p:sp>
+      <p:sp>
+        <p:nvSpPr>
+          <p:cNvPr id="3" name="Notes Placeholder 2"/>
+          <p:cNvSpPr>
+            <a:spLocks noGrp="1"/>
+          </p:cNvSpPr>
+          <p:nvPr>
+            <p:ph type="body" idx="1"/>
+          </p:nvPr>
+        </p:nvSpPr>
+        <p:spPr/>
+        <p:txBody>
+          <a:bodyPr>
+            <a:normAutofit/>
+          </a:bodyPr>
+          <a:lstStyle/>
+          <a:p>
+            <a:pPr marL="228600" indent="-228600">
+              <a:buNone/>
+            </a:pPr>
+            <a:r>
+              <a:rPr lang="en-US" dirty="0" smtClean="0"/>
+              <a:t>[Break into four slides,</a:t>
+            </a:r>
+            <a:r>
+              <a:rPr lang="en-US" baseline="0" dirty="0" smtClean="0"/>
+              <a:t> find kittens]</a:t>
+            </a:r>
+          </a:p>
+          <a:p>
+            <a:pPr marL="228600" indent="-228600">
+              <a:buNone/>
+            </a:pPr>
+            <a:r>
+              <a:rPr lang="en-US" baseline="0" dirty="0" smtClean="0"/>
+              <a:t>Doesn’t increase </a:t>
+            </a:r>
+            <a:r>
+              <a:rPr lang="en-US" baseline="0" dirty="0" err="1" smtClean="0"/>
+              <a:t>cyclomatic</a:t>
+            </a:r>
+            <a:r>
+              <a:rPr lang="en-US" baseline="0" dirty="0" smtClean="0"/>
+              <a:t> complexity of page-load</a:t>
+            </a:r>
+          </a:p>
+          <a:p>
+            <a:pPr marL="228600" indent="-228600">
+              <a:buNone/>
+            </a:pPr>
+            <a:r>
+              <a:rPr lang="en-US" baseline="0" dirty="0" smtClean="0"/>
+              <a:t>Bye </a:t>
+            </a:r>
+            <a:r>
+              <a:rPr lang="en-US" baseline="0" dirty="0" err="1" smtClean="0"/>
+              <a:t>bye</a:t>
+            </a:r>
+            <a:r>
+              <a:rPr lang="en-US" baseline="0" dirty="0" smtClean="0"/>
+              <a:t> naming container</a:t>
+            </a:r>
+          </a:p>
+          <a:p>
+            <a:pPr marL="228600" indent="-228600">
+              <a:buNone/>
+            </a:pPr>
+            <a:r>
+              <a:rPr lang="en-US" baseline="0" dirty="0" smtClean="0"/>
+              <a:t>No more </a:t>
+            </a:r>
+            <a:r>
+              <a:rPr lang="en-US" baseline="0" dirty="0" err="1" smtClean="0"/>
+              <a:t>control.ClientId</a:t>
+            </a:r>
+            <a:endParaRPr lang="en-US" dirty="0" smtClean="0"/>
+          </a:p>
+          <a:p>
+            <a:pPr marL="228600" indent="-228600">
+              <a:buAutoNum type="arabicPeriod"/>
+            </a:pPr>
+            <a:r>
+              <a:rPr lang="en-US" dirty="0" smtClean="0"/>
+              <a:t>Encourage</a:t>
+            </a:r>
+            <a:r>
+              <a:rPr lang="en-US" baseline="0" dirty="0" smtClean="0"/>
+              <a:t> use of OOP principles</a:t>
+            </a:r>
+          </a:p>
+          <a:p>
+            <a:pPr marL="685800" lvl="1" indent="-228600">
+              <a:buAutoNum type="arabicPeriod"/>
+            </a:pPr>
+            <a:r>
+              <a:rPr lang="en-US" baseline="0" dirty="0" smtClean="0"/>
+              <a:t>Separation of Concerns</a:t>
+            </a:r>
+          </a:p>
+          <a:p>
+            <a:pPr marL="685800" lvl="1" indent="-228600">
+              <a:buAutoNum type="arabicPeriod"/>
+            </a:pPr>
+            <a:r>
+              <a:rPr lang="en-US" baseline="0" dirty="0" smtClean="0"/>
+              <a:t>Single </a:t>
+            </a:r>
+            <a:r>
+              <a:rPr lang="en-US" baseline="0" dirty="0" err="1" smtClean="0"/>
+              <a:t>Responsibilty</a:t>
+            </a:r>
+            <a:endParaRPr lang="en-US" baseline="0" dirty="0" smtClean="0"/>
+          </a:p>
+        </p:txBody>
+      </p:sp>
+      <p:sp>
+        <p:nvSpPr>
+          <p:cNvPr id="4" name="Slide Number Placeholder 3"/>
+          <p:cNvSpPr>
+            <a:spLocks noGrp="1"/>
+          </p:cNvSpPr>
+          <p:nvPr>
+            <p:ph type="sldNum" sz="quarter" idx="10"/>
+          </p:nvPr>
+        </p:nvSpPr>
+        <p:spPr/>
+        <p:txBody>
+          <a:bodyPr/>
+          <a:lstStyle/>
+          <a:p>
+            <a:fld id="{F8007F4E-10F5-4104-9EF8-E98D370060A3}" type="slidenum">
+              <a:rPr lang="en-US" smtClean="0"/>
+              <a:t>6</a:t>
+            </a:fld>
+            <a:endParaRPr lang="en-US"/>
+          </a:p>
+        </p:txBody>
+      </p:sp>
+    </p:spTree>
+  </p:cSld>
+  <p:clrMapOvr>
+    <a:masterClrMapping/>
+  </p:clrMapOvr>
+</p:notes>
+</file>
+
+<file path=ppt/notesSlides/notesSlide6.xml><?xml version="1.0" encoding="utf-8"?>
+<p:notes xmlns:a="http://schemas.openxmlformats.org/drawingml/2006/main" xmlns:r="http://schemas.openxmlformats.org/officeDocument/2006/relationships" xmlns:p="http://schemas.openxmlformats.org/presentationml/2006/main">
+  <p:cSld>
+    <p:spTree>
+      <p:nvGrpSpPr>
+        <p:cNvPr id="1" name=""/>
+        <p:cNvGrpSpPr/>
+        <p:nvPr/>
+      </p:nvGrpSpPr>
+      <p:grpSpPr>
+        <a:xfrm>
+          <a:off x="0" y="0"/>
+          <a:ext cx="0" cy="0"/>
+          <a:chOff x="0" y="0"/>
+          <a:chExt cx="0" cy="0"/>
+        </a:xfrm>
+      </p:grpSpPr>
+      <p:sp>
+        <p:nvSpPr>
+          <p:cNvPr id="2" name="Slide Image Placeholder 1"/>
+          <p:cNvSpPr>
+            <a:spLocks noGrp="1" noRot="1" noChangeAspect="1"/>
+          </p:cNvSpPr>
+          <p:nvPr>
+            <p:ph type="sldImg"/>
+          </p:nvPr>
+        </p:nvSpPr>
+        <p:spPr/>
+      </p:sp>
+      <p:sp>
+        <p:nvSpPr>
+          <p:cNvPr id="3" name="Notes Placeholder 2"/>
+          <p:cNvSpPr>
+            <a:spLocks noGrp="1"/>
+          </p:cNvSpPr>
+          <p:nvPr>
+            <p:ph type="body" idx="1"/>
+          </p:nvPr>
+        </p:nvSpPr>
+        <p:spPr/>
+        <p:txBody>
+          <a:bodyPr>
+            <a:normAutofit/>
+          </a:bodyPr>
+          <a:lstStyle/>
+          <a:p>
+            <a:pPr marL="228600" indent="-228600">
+              <a:buNone/>
+            </a:pPr>
+            <a:r>
+              <a:rPr lang="en-US" dirty="0" smtClean="0"/>
+              <a:t>[f</a:t>
+            </a:r>
+            <a:r>
+              <a:rPr lang="en-US" baseline="0" dirty="0" smtClean="0"/>
+              <a:t>ind kittens]</a:t>
+            </a:r>
+          </a:p>
+          <a:p>
+            <a:pPr marL="228600" indent="-228600">
+              <a:buNone/>
+            </a:pPr>
+            <a:endParaRPr lang="en-US" baseline="0" dirty="0" smtClean="0"/>
+          </a:p>
+          <a:p>
+            <a:pPr marL="228600" indent="-228600">
+              <a:buNone/>
+            </a:pPr>
+            <a:r>
+              <a:rPr lang="en-US" dirty="0" smtClean="0"/>
+              <a:t>Encourage</a:t>
+            </a:r>
+            <a:r>
+              <a:rPr lang="en-US" baseline="0" dirty="0" smtClean="0"/>
+              <a:t> use of OOP principles</a:t>
+            </a:r>
+          </a:p>
+          <a:p>
+            <a:pPr marL="685800" lvl="1" indent="-228600">
+              <a:buAutoNum type="arabicPeriod"/>
+            </a:pPr>
+            <a:r>
+              <a:rPr lang="en-US" baseline="0" dirty="0" smtClean="0"/>
+              <a:t>Separation of Concerns</a:t>
+            </a:r>
+          </a:p>
+          <a:p>
+            <a:pPr marL="685800" lvl="1" indent="-228600">
+              <a:buAutoNum type="arabicPeriod"/>
+            </a:pPr>
+            <a:r>
+              <a:rPr lang="en-US" baseline="0" dirty="0" smtClean="0"/>
+              <a:t>Single </a:t>
+            </a:r>
+            <a:r>
+              <a:rPr lang="en-US" baseline="0" dirty="0" err="1" smtClean="0"/>
+              <a:t>Responsibilty</a:t>
+            </a:r>
+            <a:endParaRPr lang="en-US" baseline="0" dirty="0" smtClean="0"/>
+          </a:p>
+          <a:p>
+            <a:endParaRPr lang="en-US" dirty="0"/>
+          </a:p>
+        </p:txBody>
+      </p:sp>
+      <p:sp>
+        <p:nvSpPr>
+          <p:cNvPr id="4" name="Slide Number Placeholder 3"/>
+          <p:cNvSpPr>
+            <a:spLocks noGrp="1"/>
+          </p:cNvSpPr>
+          <p:nvPr>
+            <p:ph type="sldNum" sz="quarter" idx="10"/>
+          </p:nvPr>
+        </p:nvSpPr>
+        <p:spPr/>
+        <p:txBody>
+          <a:bodyPr/>
+          <a:lstStyle/>
+          <a:p>
+            <a:fld id="{F8007F4E-10F5-4104-9EF8-E98D370060A3}" type="slidenum">
+              <a:rPr lang="en-US" smtClean="0"/>
+              <a:t>7</a:t>
+            </a:fld>
+            <a:endParaRPr lang="en-US"/>
+          </a:p>
+        </p:txBody>
+      </p:sp>
+    </p:spTree>
+  </p:cSld>
+  <p:clrMapOvr>
+    <a:masterClrMapping/>
+  </p:clrMapOvr>
+</p:notes>
+</file>
+
+<file path=ppt/notesSlides/notesSlide7.xml><?xml version="1.0" encoding="utf-8"?>
+<p:notes xmlns:a="http://schemas.openxmlformats.org/drawingml/2006/main" xmlns:r="http://schemas.openxmlformats.org/officeDocument/2006/relationships" xmlns:p="http://schemas.openxmlformats.org/presentationml/2006/main">
+  <p:cSld>
+    <p:spTree>
+      <p:nvGrpSpPr>
+        <p:cNvPr id="1" name=""/>
+        <p:cNvGrpSpPr/>
+        <p:nvPr/>
+      </p:nvGrpSpPr>
+      <p:grpSpPr>
+        <a:xfrm>
+          <a:off x="0" y="0"/>
+          <a:ext cx="0" cy="0"/>
+          <a:chOff x="0" y="0"/>
+          <a:chExt cx="0" cy="0"/>
+        </a:xfrm>
+      </p:grpSpPr>
+      <p:sp>
+        <p:nvSpPr>
+          <p:cNvPr id="2" name="Slide Image Placeholder 1"/>
+          <p:cNvSpPr>
+            <a:spLocks noGrp="1" noRot="1" noChangeAspect="1"/>
+          </p:cNvSpPr>
+          <p:nvPr>
+            <p:ph type="sldImg"/>
+          </p:nvPr>
+        </p:nvSpPr>
+        <p:spPr/>
+      </p:sp>
+      <p:sp>
+        <p:nvSpPr>
+          <p:cNvPr id="3" name="Notes Placeholder 2"/>
+          <p:cNvSpPr>
+            <a:spLocks noGrp="1"/>
+          </p:cNvSpPr>
+          <p:nvPr>
+            <p:ph type="body" idx="1"/>
+          </p:nvPr>
+        </p:nvSpPr>
+        <p:spPr/>
+        <p:txBody>
+          <a:bodyPr>
+            <a:normAutofit/>
+          </a:bodyPr>
+          <a:lstStyle/>
+          <a:p>
+            <a:pPr marL="228600" indent="-228600">
+              <a:buNone/>
+            </a:pPr>
+            <a:r>
+              <a:rPr lang="en-US" baseline="0" dirty="0" smtClean="0"/>
+              <a:t>Bye </a:t>
+            </a:r>
+            <a:r>
+              <a:rPr lang="en-US" baseline="0" dirty="0" err="1" smtClean="0"/>
+              <a:t>bye</a:t>
+            </a:r>
+            <a:r>
+              <a:rPr lang="en-US" baseline="0" dirty="0" smtClean="0"/>
+              <a:t> naming container</a:t>
+            </a:r>
+          </a:p>
+          <a:p>
+            <a:pPr marL="228600" indent="-228600">
+              <a:buNone/>
+            </a:pPr>
+            <a:r>
+              <a:rPr lang="en-US" baseline="0" dirty="0" smtClean="0"/>
+              <a:t>No more </a:t>
+            </a:r>
+            <a:r>
+              <a:rPr lang="en-US" baseline="0" dirty="0" err="1" smtClean="0"/>
+              <a:t>control.ClientId</a:t>
+            </a:r>
+            <a:endParaRPr lang="en-US" dirty="0" smtClean="0"/>
+          </a:p>
+          <a:p>
+            <a:pPr marL="228600" indent="-228600">
+              <a:buNone/>
+            </a:pPr>
+            <a:r>
+              <a:rPr lang="en-US" dirty="0" smtClean="0"/>
+              <a:t>Separation of concerns, no more business logic in your presentation code</a:t>
+            </a:r>
+            <a:endParaRPr lang="en-US" baseline="0" dirty="0" smtClean="0"/>
+          </a:p>
+          <a:p>
+            <a:pPr marL="228600" indent="-228600">
+              <a:buNone/>
+            </a:pPr>
+            <a:r>
+              <a:rPr lang="en-US" baseline="0" dirty="0" smtClean="0"/>
+              <a:t>Doesn’t increase </a:t>
+            </a:r>
+            <a:r>
+              <a:rPr lang="en-US" baseline="0" dirty="0" err="1" smtClean="0"/>
+              <a:t>cyclomatic</a:t>
+            </a:r>
+            <a:r>
+              <a:rPr lang="en-US" baseline="0" smtClean="0"/>
+              <a:t> complexity of page-load</a:t>
+            </a:r>
+            <a:endParaRPr lang="en-US" dirty="0" smtClean="0"/>
+          </a:p>
+          <a:p>
+            <a:endParaRPr lang="en-US" dirty="0"/>
+          </a:p>
+        </p:txBody>
+      </p:sp>
+      <p:sp>
+        <p:nvSpPr>
+          <p:cNvPr id="4" name="Slide Number Placeholder 3"/>
+          <p:cNvSpPr>
+            <a:spLocks noGrp="1"/>
+          </p:cNvSpPr>
+          <p:nvPr>
+            <p:ph type="sldNum" sz="quarter" idx="10"/>
+          </p:nvPr>
+        </p:nvSpPr>
+        <p:spPr/>
+        <p:txBody>
+          <a:bodyPr/>
+          <a:lstStyle/>
+          <a:p>
+            <a:fld id="{F8007F4E-10F5-4104-9EF8-E98D370060A3}" type="slidenum">
+              <a:rPr lang="en-US" smtClean="0"/>
+              <a:t>8</a:t>
+            </a:fld>
+            <a:endParaRPr lang="en-US"/>
+          </a:p>
+        </p:txBody>
+      </p:sp>
+    </p:spTree>
+  </p:cSld>
+  <p:clrMapOvr>
+    <a:masterClrMapping/>
+  </p:clrMapOvr>
+</p:notes>
+</file>
+
+<file path=ppt/notesSlides/notesSlide8.xml><?xml version="1.0" encoding="utf-8"?>
+<p:notes xmlns:a="http://schemas.openxmlformats.org/drawingml/2006/main" xmlns:r="http://schemas.openxmlformats.org/officeDocument/2006/relationships" xmlns:p="http://schemas.openxmlformats.org/presentationml/2006/main">
+  <p:cSld>
+    <p:spTree>
+      <p:nvGrpSpPr>
+        <p:cNvPr id="1" name=""/>
+        <p:cNvGrpSpPr/>
+        <p:nvPr/>
+      </p:nvGrpSpPr>
+      <p:grpSpPr>
+        <a:xfrm>
+          <a:off x="0" y="0"/>
+          <a:ext cx="0" cy="0"/>
+          <a:chOff x="0" y="0"/>
+          <a:chExt cx="0" cy="0"/>
+        </a:xfrm>
+      </p:grpSpPr>
+      <p:sp>
+        <p:nvSpPr>
+          <p:cNvPr id="2" name="Slide Image Placeholder 1"/>
+          <p:cNvSpPr>
+            <a:spLocks noGrp="1" noRot="1" noChangeAspect="1"/>
+          </p:cNvSpPr>
+          <p:nvPr>
+            <p:ph type="sldImg"/>
+          </p:nvPr>
+        </p:nvSpPr>
+        <p:spPr/>
+      </p:sp>
+      <p:sp>
+        <p:nvSpPr>
+          <p:cNvPr id="3" name="Notes Placeholder 2"/>
+          <p:cNvSpPr>
+            <a:spLocks noGrp="1"/>
+          </p:cNvSpPr>
+          <p:nvPr>
+            <p:ph type="body" idx="1"/>
+          </p:nvPr>
+        </p:nvSpPr>
+        <p:spPr/>
+        <p:txBody>
+          <a:bodyPr>
+            <a:normAutofit/>
+          </a:bodyPr>
+          <a:lstStyle/>
+          <a:p>
+            <a:r>
+              <a:rPr lang="en-US" dirty="0" smtClean="0"/>
+              <a:t>Expand on routing</a:t>
+            </a:r>
+          </a:p>
+          <a:p>
+            <a:r>
+              <a:rPr lang="en-US" dirty="0" smtClean="0"/>
+              <a:t>Find kittens</a:t>
+            </a:r>
+          </a:p>
+          <a:p>
+            <a:r>
+              <a:rPr lang="en-US" dirty="0" smtClean="0"/>
+              <a:t>Explain server controls…can use, not needed. Postback gone</a:t>
+            </a:r>
+            <a:endParaRPr lang="en-US" dirty="0"/>
+          </a:p>
+        </p:txBody>
+      </p:sp>
+      <p:sp>
+        <p:nvSpPr>
+          <p:cNvPr id="4" name="Slide Number Placeholder 3"/>
+          <p:cNvSpPr>
+            <a:spLocks noGrp="1"/>
+          </p:cNvSpPr>
+          <p:nvPr>
+            <p:ph type="sldNum" sz="quarter" idx="10"/>
+          </p:nvPr>
+        </p:nvSpPr>
+        <p:spPr/>
+        <p:txBody>
+          <a:bodyPr/>
+          <a:lstStyle/>
+          <a:p>
+            <a:fld id="{F8007F4E-10F5-4104-9EF8-E98D370060A3}" type="slidenum">
+              <a:rPr lang="en-US" smtClean="0"/>
+              <a:t>11</a:t>
+            </a:fld>
+            <a:endParaRPr lang="en-US"/>
+          </a:p>
+        </p:txBody>
+      </p:sp>
+    </p:spTree>
+  </p:cSld>
+  <p:clrMapOvr>
+    <a:masterClrMapping/>
+  </p:clrMapOvr>
+</p:notes>
+</file>
+
+<file path=ppt/notesSlides/notesSlide9.xml><?xml version="1.0" encoding="utf-8"?>
+<p:notes xmlns:a="http://schemas.openxmlformats.org/drawingml/2006/main" xmlns:r="http://schemas.openxmlformats.org/officeDocument/2006/relationships" xmlns:p="http://schemas.openxmlformats.org/presentationml/2006/main">
+  <p:cSld>
+    <p:spTree>
+      <p:nvGrpSpPr>
+        <p:cNvPr id="1" name=""/>
+        <p:cNvGrpSpPr/>
+        <p:nvPr/>
+      </p:nvGrpSpPr>
+      <p:grpSpPr>
+        <a:xfrm>
+          <a:off x="0" y="0"/>
+          <a:ext cx="0" cy="0"/>
+          <a:chOff x="0" y="0"/>
+          <a:chExt cx="0" cy="0"/>
+        </a:xfrm>
+      </p:grpSpPr>
+      <p:sp>
+        <p:nvSpPr>
+          <p:cNvPr id="2" name="Slide Image Placeholder 1"/>
+          <p:cNvSpPr>
+            <a:spLocks noGrp="1" noRot="1" noChangeAspect="1"/>
+          </p:cNvSpPr>
+          <p:nvPr>
+            <p:ph type="sldImg"/>
+          </p:nvPr>
+        </p:nvSpPr>
+        <p:spPr/>
+      </p:sp>
+      <p:sp>
+        <p:nvSpPr>
+          <p:cNvPr id="3" name="Notes Placeholder 2"/>
+          <p:cNvSpPr>
+            <a:spLocks noGrp="1"/>
+          </p:cNvSpPr>
+          <p:nvPr>
+            <p:ph type="body" idx="1"/>
+          </p:nvPr>
+        </p:nvSpPr>
+        <p:spPr/>
+        <p:txBody>
+          <a:bodyPr>
+            <a:normAutofit/>
+          </a:bodyPr>
+          <a:lstStyle/>
+          <a:p>
+            <a:r>
+              <a:rPr lang="en-US" dirty="0" smtClean="0"/>
+              <a:t>Lay previous slide over this one, whack previous slide</a:t>
+            </a:r>
+          </a:p>
+          <a:p>
+            <a:r>
+              <a:rPr lang="en-US" baseline="0" dirty="0" smtClean="0"/>
+              <a:t>Model everything that’s not view and controller – business logic, data</a:t>
+            </a:r>
+          </a:p>
+        </p:txBody>
+      </p:sp>
+      <p:sp>
+        <p:nvSpPr>
+          <p:cNvPr id="4" name="Slide Number Placeholder 3"/>
+          <p:cNvSpPr>
+            <a:spLocks noGrp="1"/>
+          </p:cNvSpPr>
+          <p:nvPr>
+            <p:ph type="sldNum" sz="quarter" idx="10"/>
+          </p:nvPr>
+        </p:nvSpPr>
+        <p:spPr/>
+        <p:txBody>
+          <a:bodyPr/>
+          <a:lstStyle/>
+          <a:p>
+            <a:fld id="{F8007F4E-10F5-4104-9EF8-E98D370060A3}" type="slidenum">
+              <a:rPr lang="en-US" smtClean="0"/>
+              <a:t>12</a:t>
+            </a:fld>
+            <a:endParaRPr lang="en-US"/>
+          </a:p>
+        </p:txBody>
+      </p:sp>
+    </p:spTree>
+  </p:cSld>
+  <p:clrMapOvr>
+    <a:masterClrMapping/>
+  </p:clrMapOvr>
+</p:notes>
+</file>
+
 <file path=ppt/slideLayouts/slideLayout1.xml><?xml version="1.0" encoding="utf-8"?>
 <p:sldLayout xmlns:a="http://schemas.openxmlformats.org/drawingml/2006/main" xmlns:r="http://schemas.openxmlformats.org/officeDocument/2006/relationships" xmlns:p="http://schemas.openxmlformats.org/presentationml/2006/main" showMasterSp="0" type="title" preserve="1">
   <p:cSld name="Title Slide">
@@ -154,7 +1909,7 @@
             <a:fld id="{1D8BD707-D9CF-40AE-B4C6-C98DA3205C09}" type="datetimeFigureOut">
               <a:rPr lang="en-US" smtClean="0"/>
               <a:pPr/>
-              <a:t>3/24/2008</a:t>
+              <a:t>4/9/2008</a:t>
             </a:fld>
             <a:endParaRPr lang="en-US"/>
           </a:p>
@@ -873,7 +2628,7 @@
             <a:fld id="{1D8BD707-D9CF-40AE-B4C6-C98DA3205C09}" type="datetimeFigureOut">
               <a:rPr lang="en-US" smtClean="0"/>
               <a:pPr/>
-              <a:t>3/24/2008</a:t>
+              <a:t>4/9/2008</a:t>
             </a:fld>
             <a:endParaRPr lang="en-US"/>
           </a:p>
@@ -1060,7 +2815,7 @@
             <a:fld id="{1D8BD707-D9CF-40AE-B4C6-C98DA3205C09}" type="datetimeFigureOut">
               <a:rPr lang="en-US" smtClean="0"/>
               <a:pPr/>
-              <a:t>3/24/2008</a:t>
+              <a:t>4/9/2008</a:t>
             </a:fld>
             <a:endParaRPr lang="en-US"/>
           </a:p>
@@ -1237,7 +2992,7 @@
             <a:fld id="{1D8BD707-D9CF-40AE-B4C6-C98DA3205C09}" type="datetimeFigureOut">
               <a:rPr lang="en-US" smtClean="0"/>
               <a:pPr/>
-              <a:t>3/24/2008</a:t>
+              <a:t>4/9/2008</a:t>
             </a:fld>
             <a:endParaRPr lang="en-US"/>
           </a:p>
@@ -2722,7 +4477,7 @@
             <a:fld id="{1D8BD707-D9CF-40AE-B4C6-C98DA3205C09}" type="datetimeFigureOut">
               <a:rPr lang="en-US" smtClean="0"/>
               <a:pPr/>
-              <a:t>3/24/2008</a:t>
+              <a:t>4/9/2008</a:t>
             </a:fld>
             <a:endParaRPr lang="en-US"/>
           </a:p>
@@ -3324,7 +5079,7 @@
             <a:fld id="{1D8BD707-D9CF-40AE-B4C6-C98DA3205C09}" type="datetimeFigureOut">
               <a:rPr lang="en-US" smtClean="0"/>
               <a:pPr/>
-              <a:t>3/24/2008</a:t>
+              <a:t>4/9/2008</a:t>
             </a:fld>
             <a:endParaRPr lang="en-US"/>
           </a:p>
@@ -3763,7 +5518,7 @@
             <a:fld id="{1D8BD707-D9CF-40AE-B4C6-C98DA3205C09}" type="datetimeFigureOut">
               <a:rPr lang="en-US" smtClean="0"/>
               <a:pPr/>
-              <a:t>3/24/2008</a:t>
+              <a:t>4/9/2008</a:t>
             </a:fld>
             <a:endParaRPr lang="en-US"/>
           </a:p>
@@ -4326,7 +6081,7 @@
             <a:fld id="{1D8BD707-D9CF-40AE-B4C6-C98DA3205C09}" type="datetimeFigureOut">
               <a:rPr lang="en-US" smtClean="0"/>
               <a:pPr/>
-              <a:t>3/24/2008</a:t>
+              <a:t>4/9/2008</a:t>
             </a:fld>
             <a:endParaRPr lang="en-US"/>
           </a:p>
@@ -4424,7 +6179,7 @@
             <a:fld id="{1D8BD707-D9CF-40AE-B4C6-C98DA3205C09}" type="datetimeFigureOut">
               <a:rPr lang="en-US" smtClean="0"/>
               <a:pPr/>
-              <a:t>3/24/2008</a:t>
+              <a:t>4/9/2008</a:t>
             </a:fld>
             <a:endParaRPr lang="en-US"/>
           </a:p>
@@ -4680,7 +6435,7 @@
             <a:fld id="{1D8BD707-D9CF-40AE-B4C6-C98DA3205C09}" type="datetimeFigureOut">
               <a:rPr lang="en-US" smtClean="0"/>
               <a:pPr/>
-              <a:t>3/24/2008</a:t>
+              <a:t>4/9/2008</a:t>
             </a:fld>
             <a:endParaRPr lang="en-US"/>
           </a:p>
@@ -5403,7 +7158,7 @@
             <a:fld id="{1D8BD707-D9CF-40AE-B4C6-C98DA3205C09}" type="datetimeFigureOut">
               <a:rPr lang="en-US" smtClean="0"/>
               <a:pPr/>
-              <a:t>3/24/2008</a:t>
+              <a:t>4/9/2008</a:t>
             </a:fld>
             <a:endParaRPr lang="en-US"/>
           </a:p>
@@ -6078,7 +7833,7 @@
             <a:fld id="{1D8BD707-D9CF-40AE-B4C6-C98DA3205C09}" type="datetimeFigureOut">
               <a:rPr lang="en-US" smtClean="0"/>
               <a:pPr/>
-              <a:t>3/24/2008</a:t>
+              <a:t>4/9/2008</a:t>
             </a:fld>
             <a:endParaRPr lang="en-US"/>
           </a:p>
@@ -6581,8 +8336,11 @@
           <a:p>
             <a:r>
               <a:rPr lang="en-US" dirty="0" smtClean="0"/>
-              <a:t>Resources</a:t>
-            </a:r>
+              <a:t>Customizable and Extensible</a:t>
+            </a:r>
+            <a:br>
+              <a:rPr lang="en-US" dirty="0" smtClean="0"/>
+            </a:br>
             <a:endParaRPr lang="en-US" dirty="0"/>
           </a:p>
         </p:txBody>
@@ -6601,81 +8359,6 @@
         <p:txBody>
           <a:bodyPr/>
           <a:lstStyle/>
-          <a:p>
-            <a:r>
-              <a:rPr lang="en-US" dirty="0" smtClean="0">
-                <a:hlinkClick r:id="rId2"/>
-              </a:rPr>
-              <a:t>www.asp.net/learn/3.5-extensions-videos/</a:t>
-            </a:r>
-            <a:endParaRPr lang="en-US" dirty="0" smtClean="0"/>
-          </a:p>
-          <a:p>
-            <a:r>
-              <a:rPr lang="en-US" dirty="0" smtClean="0">
-                <a:hlinkClick r:id="rId3"/>
-              </a:rPr>
-              <a:t>www.hanselman.com/blog/</a:t>
-            </a:r>
-            <a:endParaRPr lang="en-US" dirty="0" smtClean="0"/>
-          </a:p>
-          <a:p>
-            <a:r>
-              <a:rPr lang="en-US" dirty="0" smtClean="0">
-                <a:hlinkClick r:id="rId4"/>
-              </a:rPr>
-              <a:t>www.haacked.com</a:t>
-            </a:r>
-            <a:endParaRPr lang="en-US" dirty="0" smtClean="0"/>
-          </a:p>
-          <a:p>
-            <a:r>
-              <a:rPr lang="en-US" dirty="0" smtClean="0">
-                <a:hlinkClick r:id="rId5"/>
-              </a:rPr>
-              <a:t>sessions.visitmix.com</a:t>
-            </a:r>
-            <a:r>
-              <a:rPr lang="en-US" dirty="0" smtClean="0">
-                <a:hlinkClick r:id="rId5"/>
-              </a:rPr>
-              <a:t>/?</a:t>
-            </a:r>
-            <a:r>
-              <a:rPr lang="en-US" dirty="0" err="1" smtClean="0">
-                <a:hlinkClick r:id="rId5"/>
-              </a:rPr>
-              <a:t>selectedSearch</a:t>
-            </a:r>
-            <a:r>
-              <a:rPr lang="en-US" dirty="0" smtClean="0">
-                <a:hlinkClick r:id="rId5"/>
-              </a:rPr>
-              <a:t>=T22</a:t>
-            </a:r>
-            <a:endParaRPr lang="en-US" dirty="0" smtClean="0"/>
-          </a:p>
-          <a:p>
-            <a:r>
-              <a:rPr lang="en-US" dirty="0" smtClean="0">
-                <a:hlinkClick r:id="rId6"/>
-              </a:rPr>
-              <a:t>weblogs.asp.net/</a:t>
-            </a:r>
-            <a:r>
-              <a:rPr lang="en-US" dirty="0" err="1" smtClean="0">
-                <a:hlinkClick r:id="rId6"/>
-              </a:rPr>
-              <a:t>scottgu</a:t>
-            </a:r>
-            <a:r>
-              <a:rPr lang="en-US" dirty="0" smtClean="0">
-                <a:hlinkClick r:id="rId6"/>
-              </a:rPr>
-              <a:t>/</a:t>
-            </a:r>
-            <a:endParaRPr lang="en-US" dirty="0" smtClean="0"/>
-          </a:p>
           <a:p>
             <a:endParaRPr lang="en-US" dirty="0"/>
           </a:p>
@@ -6708,6 +8391,741 @@
       </p:grpSpPr>
       <p:sp>
         <p:nvSpPr>
+          <p:cNvPr id="2" name="Title 1"/>
+          <p:cNvSpPr>
+            <a:spLocks noGrp="1"/>
+          </p:cNvSpPr>
+          <p:nvPr>
+            <p:ph type="title"/>
+          </p:nvPr>
+        </p:nvSpPr>
+        <p:spPr/>
+        <p:txBody>
+          <a:bodyPr/>
+          <a:lstStyle/>
+          <a:p>
+            <a:r>
+              <a:rPr lang="en-US" sz="3600" dirty="0" smtClean="0"/>
+              <a:t>What do you get out of the box?</a:t>
+            </a:r>
+            <a:endParaRPr lang="en-US" sz="3600" dirty="0"/>
+          </a:p>
+        </p:txBody>
+      </p:sp>
+      <p:sp>
+        <p:nvSpPr>
+          <p:cNvPr id="3" name="Content Placeholder 2"/>
+          <p:cNvSpPr>
+            <a:spLocks noGrp="1"/>
+          </p:cNvSpPr>
+          <p:nvPr>
+            <p:ph idx="1"/>
+          </p:nvPr>
+        </p:nvSpPr>
+        <p:spPr/>
+        <p:txBody>
+          <a:bodyPr/>
+          <a:lstStyle/>
+          <a:p>
+            <a:r>
+              <a:rPr lang="en-US" dirty="0" smtClean="0"/>
+              <a:t>Working sample application</a:t>
+            </a:r>
+          </a:p>
+          <a:p>
+            <a:pPr lvl="1"/>
+            <a:r>
+              <a:rPr lang="en-US" dirty="0" err="1" smtClean="0"/>
+              <a:t>HomeController</a:t>
+            </a:r>
+            <a:endParaRPr lang="en-US" dirty="0" smtClean="0"/>
+          </a:p>
+          <a:p>
+            <a:pPr lvl="1"/>
+            <a:r>
+              <a:rPr lang="en-US" dirty="0" smtClean="0"/>
+              <a:t>Home and About views</a:t>
+            </a:r>
+          </a:p>
+          <a:p>
+            <a:pPr lvl="1"/>
+            <a:r>
+              <a:rPr lang="en-US" dirty="0" smtClean="0"/>
+              <a:t>Default routes</a:t>
+            </a:r>
+          </a:p>
+          <a:p>
+            <a:r>
+              <a:rPr lang="en-US" dirty="0" err="1" smtClean="0"/>
+              <a:t>WebForms</a:t>
+            </a:r>
+            <a:r>
+              <a:rPr lang="en-US" dirty="0" smtClean="0"/>
+              <a:t> </a:t>
+            </a:r>
+            <a:r>
+              <a:rPr lang="en-US" dirty="0" err="1" smtClean="0"/>
+              <a:t>ViewEngineBase</a:t>
+            </a:r>
+            <a:endParaRPr lang="en-US" dirty="0" smtClean="0"/>
+          </a:p>
+          <a:p>
+            <a:r>
+              <a:rPr lang="en-US" dirty="0" smtClean="0"/>
+              <a:t>Test Project</a:t>
+            </a:r>
+            <a:endParaRPr lang="en-US" dirty="0"/>
+          </a:p>
+        </p:txBody>
+      </p:sp>
+    </p:spTree>
+  </p:cSld>
+  <p:clrMapOvr>
+    <a:masterClrMapping/>
+  </p:clrMapOvr>
+  <p:timing>
+    <p:tnLst>
+      <p:par>
+        <p:cTn id="1" dur="indefinite" restart="never" nodeType="tmRoot"/>
+      </p:par>
+    </p:tnLst>
+  </p:timing>
+</p:sld>
+</file>
+
+<file path=ppt/slides/slide12.xml><?xml version="1.0" encoding="utf-8"?>
+<p:sld xmlns:a="http://schemas.openxmlformats.org/drawingml/2006/main" xmlns:r="http://schemas.openxmlformats.org/officeDocument/2006/relationships" xmlns:p="http://schemas.openxmlformats.org/presentationml/2006/main" showMasterSp="0">
+  <p:cSld>
+    <p:spTree>
+      <p:nvGrpSpPr>
+        <p:cNvPr id="1" name=""/>
+        <p:cNvGrpSpPr/>
+        <p:nvPr/>
+      </p:nvGrpSpPr>
+      <p:grpSpPr>
+        <a:xfrm>
+          <a:off x="0" y="0"/>
+          <a:ext cx="0" cy="0"/>
+          <a:chOff x="0" y="0"/>
+          <a:chExt cx="0" cy="0"/>
+        </a:xfrm>
+      </p:grpSpPr>
+      <p:sp>
+        <p:nvSpPr>
+          <p:cNvPr id="4" name="Oval 3"/>
+          <p:cNvSpPr/>
+          <p:nvPr/>
+        </p:nvSpPr>
+        <p:spPr>
+          <a:xfrm>
+            <a:off x="3200400" y="457200"/>
+            <a:ext cx="2743200" cy="2590800"/>
+          </a:xfrm>
+          <a:prstGeom prst="ellipse">
+            <a:avLst/>
+          </a:prstGeom>
+        </p:spPr>
+        <p:style>
+          <a:lnRef idx="1">
+            <a:schemeClr val="accent4"/>
+          </a:lnRef>
+          <a:fillRef idx="3">
+            <a:schemeClr val="accent4"/>
+          </a:fillRef>
+          <a:effectRef idx="2">
+            <a:schemeClr val="accent4"/>
+          </a:effectRef>
+          <a:fontRef idx="minor">
+            <a:schemeClr val="lt1"/>
+          </a:fontRef>
+        </p:style>
+        <p:txBody>
+          <a:bodyPr rtlCol="0" anchor="ctr"/>
+          <a:lstStyle/>
+          <a:p>
+            <a:pPr algn="ctr"/>
+            <a:r>
+              <a:rPr lang="en-US" sz="3200" dirty="0" smtClean="0">
+                <a:solidFill>
+                  <a:schemeClr val="bg1"/>
+                </a:solidFill>
+              </a:rPr>
+              <a:t>Model</a:t>
+            </a:r>
+            <a:endParaRPr lang="en-US" sz="3200" dirty="0">
+              <a:solidFill>
+                <a:schemeClr val="bg1"/>
+              </a:solidFill>
+            </a:endParaRPr>
+          </a:p>
+        </p:txBody>
+      </p:sp>
+      <p:sp>
+        <p:nvSpPr>
+          <p:cNvPr id="7" name="Oval 6"/>
+          <p:cNvSpPr/>
+          <p:nvPr/>
+        </p:nvSpPr>
+        <p:spPr>
+          <a:xfrm>
+            <a:off x="838200" y="3352800"/>
+            <a:ext cx="2743200" cy="2590800"/>
+          </a:xfrm>
+          <a:prstGeom prst="ellipse">
+            <a:avLst/>
+          </a:prstGeom>
+        </p:spPr>
+        <p:style>
+          <a:lnRef idx="1">
+            <a:schemeClr val="accent3"/>
+          </a:lnRef>
+          <a:fillRef idx="3">
+            <a:schemeClr val="accent3"/>
+          </a:fillRef>
+          <a:effectRef idx="2">
+            <a:schemeClr val="accent3"/>
+          </a:effectRef>
+          <a:fontRef idx="minor">
+            <a:schemeClr val="lt1"/>
+          </a:fontRef>
+        </p:style>
+        <p:txBody>
+          <a:bodyPr rtlCol="0" anchor="ctr"/>
+          <a:lstStyle/>
+          <a:p>
+            <a:pPr algn="ctr"/>
+            <a:r>
+              <a:rPr lang="en-US" sz="3200" dirty="0" smtClean="0">
+                <a:solidFill>
+                  <a:schemeClr val="bg1"/>
+                </a:solidFill>
+              </a:rPr>
+              <a:t>View</a:t>
+            </a:r>
+            <a:endParaRPr lang="en-US" sz="3200" dirty="0">
+              <a:solidFill>
+                <a:schemeClr val="bg1"/>
+              </a:solidFill>
+            </a:endParaRPr>
+          </a:p>
+        </p:txBody>
+      </p:sp>
+      <p:sp>
+        <p:nvSpPr>
+          <p:cNvPr id="8" name="Oval 7"/>
+          <p:cNvSpPr/>
+          <p:nvPr/>
+        </p:nvSpPr>
+        <p:spPr>
+          <a:xfrm>
+            <a:off x="5486400" y="3505200"/>
+            <a:ext cx="2743200" cy="2590800"/>
+          </a:xfrm>
+          <a:prstGeom prst="ellipse">
+            <a:avLst/>
+          </a:prstGeom>
+        </p:spPr>
+        <p:style>
+          <a:lnRef idx="1">
+            <a:schemeClr val="accent3"/>
+          </a:lnRef>
+          <a:fillRef idx="3">
+            <a:schemeClr val="accent3"/>
+          </a:fillRef>
+          <a:effectRef idx="2">
+            <a:schemeClr val="accent3"/>
+          </a:effectRef>
+          <a:fontRef idx="minor">
+            <a:schemeClr val="lt1"/>
+          </a:fontRef>
+        </p:style>
+        <p:txBody>
+          <a:bodyPr rtlCol="0" anchor="ctr"/>
+          <a:lstStyle/>
+          <a:p>
+            <a:pPr algn="ctr"/>
+            <a:r>
+              <a:rPr lang="en-US" sz="3200" dirty="0" smtClean="0">
+                <a:solidFill>
+                  <a:schemeClr val="bg1"/>
+                </a:solidFill>
+              </a:rPr>
+              <a:t>Controller</a:t>
+            </a:r>
+            <a:endParaRPr lang="en-US" sz="3200" dirty="0">
+              <a:solidFill>
+                <a:schemeClr val="bg1"/>
+              </a:solidFill>
+            </a:endParaRPr>
+          </a:p>
+        </p:txBody>
+      </p:sp>
+      <p:sp>
+        <p:nvSpPr>
+          <p:cNvPr id="9" name="Down Arrow 8"/>
+          <p:cNvSpPr/>
+          <p:nvPr/>
+        </p:nvSpPr>
+        <p:spPr>
+          <a:xfrm rot="13077882">
+            <a:off x="3200400" y="2971800"/>
+            <a:ext cx="381000" cy="381000"/>
+          </a:xfrm>
+          <a:prstGeom prst="downArrow">
+            <a:avLst/>
+          </a:prstGeom>
+        </p:spPr>
+        <p:style>
+          <a:lnRef idx="2">
+            <a:schemeClr val="accent1">
+              <a:shade val="50000"/>
+            </a:schemeClr>
+          </a:lnRef>
+          <a:fillRef idx="1">
+            <a:schemeClr val="accent1"/>
+          </a:fillRef>
+          <a:effectRef idx="0">
+            <a:schemeClr val="accent1"/>
+          </a:effectRef>
+          <a:fontRef idx="minor">
+            <a:schemeClr val="lt1"/>
+          </a:fontRef>
+        </p:style>
+        <p:txBody>
+          <a:bodyPr rtlCol="0" anchor="ctr"/>
+          <a:lstStyle/>
+          <a:p>
+            <a:pPr algn="ctr"/>
+            <a:endParaRPr lang="en-US"/>
+          </a:p>
+        </p:txBody>
+      </p:sp>
+      <p:sp>
+        <p:nvSpPr>
+          <p:cNvPr id="11" name="Down Arrow 10"/>
+          <p:cNvSpPr/>
+          <p:nvPr/>
+        </p:nvSpPr>
+        <p:spPr>
+          <a:xfrm rot="8532530">
+            <a:off x="5791237" y="2513316"/>
+            <a:ext cx="381000" cy="1125338"/>
+          </a:xfrm>
+          <a:prstGeom prst="downArrow">
+            <a:avLst/>
+          </a:prstGeom>
+        </p:spPr>
+        <p:style>
+          <a:lnRef idx="2">
+            <a:schemeClr val="accent1">
+              <a:shade val="50000"/>
+            </a:schemeClr>
+          </a:lnRef>
+          <a:fillRef idx="1">
+            <a:schemeClr val="accent1"/>
+          </a:fillRef>
+          <a:effectRef idx="0">
+            <a:schemeClr val="accent1"/>
+          </a:effectRef>
+          <a:fontRef idx="minor">
+            <a:schemeClr val="lt1"/>
+          </a:fontRef>
+        </p:style>
+        <p:txBody>
+          <a:bodyPr rtlCol="0" anchor="ctr"/>
+          <a:lstStyle/>
+          <a:p>
+            <a:pPr algn="ctr"/>
+            <a:endParaRPr lang="en-US"/>
+          </a:p>
+        </p:txBody>
+      </p:sp>
+      <p:sp>
+        <p:nvSpPr>
+          <p:cNvPr id="12" name="Down Arrow 11"/>
+          <p:cNvSpPr/>
+          <p:nvPr/>
+        </p:nvSpPr>
+        <p:spPr>
+          <a:xfrm rot="5400000">
+            <a:off x="4533900" y="4457700"/>
+            <a:ext cx="381000" cy="762000"/>
+          </a:xfrm>
+          <a:prstGeom prst="downArrow">
+            <a:avLst/>
+          </a:prstGeom>
+        </p:spPr>
+        <p:style>
+          <a:lnRef idx="2">
+            <a:schemeClr val="accent1">
+              <a:shade val="50000"/>
+            </a:schemeClr>
+          </a:lnRef>
+          <a:fillRef idx="1">
+            <a:schemeClr val="accent1"/>
+          </a:fillRef>
+          <a:effectRef idx="0">
+            <a:schemeClr val="accent1"/>
+          </a:effectRef>
+          <a:fontRef idx="minor">
+            <a:schemeClr val="lt1"/>
+          </a:fontRef>
+        </p:style>
+        <p:txBody>
+          <a:bodyPr rtlCol="0" anchor="ctr"/>
+          <a:lstStyle/>
+          <a:p>
+            <a:pPr algn="ctr"/>
+            <a:endParaRPr lang="en-US"/>
+          </a:p>
+        </p:txBody>
+      </p:sp>
+    </p:spTree>
+  </p:cSld>
+  <p:clrMapOvr>
+    <a:masterClrMapping/>
+  </p:clrMapOvr>
+  <p:timing>
+    <p:tnLst>
+      <p:par>
+        <p:cTn id="1" dur="indefinite" restart="never" nodeType="tmRoot"/>
+      </p:par>
+    </p:tnLst>
+  </p:timing>
+</p:sld>
+</file>
+
+<file path=ppt/slides/slide13.xml><?xml version="1.0" encoding="utf-8"?>
+<p:sld xmlns:a="http://schemas.openxmlformats.org/drawingml/2006/main" xmlns:r="http://schemas.openxmlformats.org/officeDocument/2006/relationships" xmlns:p="http://schemas.openxmlformats.org/presentationml/2006/main" showMasterSp="0">
+  <p:cSld>
+    <p:spTree>
+      <p:nvGrpSpPr>
+        <p:cNvPr id="1" name=""/>
+        <p:cNvGrpSpPr/>
+        <p:nvPr/>
+      </p:nvGrpSpPr>
+      <p:grpSpPr>
+        <a:xfrm>
+          <a:off x="0" y="0"/>
+          <a:ext cx="0" cy="0"/>
+          <a:chOff x="0" y="0"/>
+          <a:chExt cx="0" cy="0"/>
+        </a:xfrm>
+      </p:grpSpPr>
+      <p:sp>
+        <p:nvSpPr>
+          <p:cNvPr id="2" name="Title 1"/>
+          <p:cNvSpPr>
+            <a:spLocks noGrp="1"/>
+          </p:cNvSpPr>
+          <p:nvPr>
+            <p:ph type="title"/>
+          </p:nvPr>
+        </p:nvSpPr>
+        <p:spPr/>
+        <p:txBody>
+          <a:bodyPr/>
+          <a:lstStyle/>
+          <a:p>
+            <a:r>
+              <a:rPr lang="en-US" smtClean="0"/>
+              <a:t>What’s going on?</a:t>
+            </a:r>
+            <a:endParaRPr lang="en-US" dirty="0"/>
+          </a:p>
+        </p:txBody>
+      </p:sp>
+      <p:sp>
+        <p:nvSpPr>
+          <p:cNvPr id="3" name="Content Placeholder 2"/>
+          <p:cNvSpPr>
+            <a:spLocks noGrp="1"/>
+          </p:cNvSpPr>
+          <p:nvPr>
+            <p:ph idx="1"/>
+          </p:nvPr>
+        </p:nvSpPr>
+        <p:spPr/>
+        <p:txBody>
+          <a:bodyPr/>
+          <a:lstStyle/>
+          <a:p>
+            <a:r>
+              <a:rPr lang="en-US" smtClean="0"/>
+              <a:t>Browser requests December posts</a:t>
+            </a:r>
+          </a:p>
+          <a:p>
+            <a:r>
+              <a:rPr lang="en-US" smtClean="0"/>
+              <a:t>Route is determined</a:t>
+            </a:r>
+          </a:p>
+          <a:p>
+            <a:r>
+              <a:rPr lang="en-US" smtClean="0"/>
+              <a:t>Controller is activated</a:t>
+            </a:r>
+          </a:p>
+          <a:p>
+            <a:r>
+              <a:rPr lang="en-US" smtClean="0"/>
+              <a:t>Controller renders view</a:t>
+            </a:r>
+            <a:endParaRPr lang="en-US" dirty="0"/>
+          </a:p>
+        </p:txBody>
+      </p:sp>
+    </p:spTree>
+  </p:cSld>
+  <p:clrMapOvr>
+    <a:masterClrMapping/>
+  </p:clrMapOvr>
+  <p:transition/>
+  <p:timing>
+    <p:tnLst>
+      <p:par>
+        <p:cTn id="1" dur="indefinite" restart="never" nodeType="tmRoot"/>
+      </p:par>
+    </p:tnLst>
+  </p:timing>
+</p:sld>
+</file>
+
+<file path=ppt/slides/slide14.xml><?xml version="1.0" encoding="utf-8"?>
+<p:sld xmlns:a="http://schemas.openxmlformats.org/drawingml/2006/main" xmlns:r="http://schemas.openxmlformats.org/officeDocument/2006/relationships" xmlns:p="http://schemas.openxmlformats.org/presentationml/2006/main" showMasterSp="0">
+  <p:cSld>
+    <p:spTree>
+      <p:nvGrpSpPr>
+        <p:cNvPr id="1" name=""/>
+        <p:cNvGrpSpPr/>
+        <p:nvPr/>
+      </p:nvGrpSpPr>
+      <p:grpSpPr>
+        <a:xfrm>
+          <a:off x="0" y="0"/>
+          <a:ext cx="0" cy="0"/>
+          <a:chOff x="0" y="0"/>
+          <a:chExt cx="0" cy="0"/>
+        </a:xfrm>
+      </p:grpSpPr>
+      <p:sp>
+        <p:nvSpPr>
+          <p:cNvPr id="2" name="Title 1"/>
+          <p:cNvSpPr>
+            <a:spLocks noGrp="1"/>
+          </p:cNvSpPr>
+          <p:nvPr>
+            <p:ph type="title"/>
+          </p:nvPr>
+        </p:nvSpPr>
+        <p:spPr>
+          <a:xfrm>
+            <a:off x="914400" y="2819400"/>
+            <a:ext cx="7772400" cy="1447800"/>
+          </a:xfrm>
+        </p:spPr>
+        <p:txBody>
+          <a:bodyPr/>
+          <a:lstStyle/>
+          <a:p>
+            <a:r>
+              <a:rPr lang="en-US" sz="6000" dirty="0" smtClean="0">
+                <a:solidFill>
+                  <a:srgbClr val="FFC000"/>
+                </a:solidFill>
+                <a:latin typeface="Courier New" pitchFamily="49" charset="0"/>
+                <a:cs typeface="Courier New" pitchFamily="49" charset="0"/>
+              </a:rPr>
+              <a:t>&lt;code /&gt;</a:t>
+            </a:r>
+            <a:endParaRPr lang="en-US" sz="6000" dirty="0">
+              <a:solidFill>
+                <a:srgbClr val="FFC000"/>
+              </a:solidFill>
+              <a:latin typeface="Courier New" pitchFamily="49" charset="0"/>
+              <a:cs typeface="Courier New" pitchFamily="49" charset="0"/>
+            </a:endParaRPr>
+          </a:p>
+        </p:txBody>
+      </p:sp>
+    </p:spTree>
+  </p:cSld>
+  <p:clrMapOvr>
+    <a:masterClrMapping/>
+  </p:clrMapOvr>
+  <p:timing>
+    <p:tnLst>
+      <p:par>
+        <p:cTn id="1" dur="indefinite" restart="never" nodeType="tmRoot"/>
+      </p:par>
+    </p:tnLst>
+  </p:timing>
+</p:sld>
+</file>
+
+<file path=ppt/slides/slide15.xml><?xml version="1.0" encoding="utf-8"?>
+<p:sld xmlns:a="http://schemas.openxmlformats.org/drawingml/2006/main" xmlns:r="http://schemas.openxmlformats.org/officeDocument/2006/relationships" xmlns:p="http://schemas.openxmlformats.org/presentationml/2006/main" showMasterSp="0">
+  <p:cSld>
+    <p:spTree>
+      <p:nvGrpSpPr>
+        <p:cNvPr id="1" name=""/>
+        <p:cNvGrpSpPr/>
+        <p:nvPr/>
+      </p:nvGrpSpPr>
+      <p:grpSpPr>
+        <a:xfrm>
+          <a:off x="0" y="0"/>
+          <a:ext cx="0" cy="0"/>
+          <a:chOff x="0" y="0"/>
+          <a:chExt cx="0" cy="0"/>
+        </a:xfrm>
+      </p:grpSpPr>
+      <p:sp>
+        <p:nvSpPr>
+          <p:cNvPr id="2" name="Title 1"/>
+          <p:cNvSpPr>
+            <a:spLocks noGrp="1"/>
+          </p:cNvSpPr>
+          <p:nvPr>
+            <p:ph type="title"/>
+          </p:nvPr>
+        </p:nvSpPr>
+        <p:spPr/>
+        <p:txBody>
+          <a:bodyPr/>
+          <a:lstStyle/>
+          <a:p>
+            <a:r>
+              <a:rPr lang="en-US" dirty="0" smtClean="0"/>
+              <a:t>Resources</a:t>
+            </a:r>
+            <a:endParaRPr lang="en-US" dirty="0"/>
+          </a:p>
+        </p:txBody>
+      </p:sp>
+      <p:sp>
+        <p:nvSpPr>
+          <p:cNvPr id="3" name="Content Placeholder 2"/>
+          <p:cNvSpPr>
+            <a:spLocks noGrp="1"/>
+          </p:cNvSpPr>
+          <p:nvPr>
+            <p:ph idx="1"/>
+          </p:nvPr>
+        </p:nvSpPr>
+        <p:spPr/>
+        <p:txBody>
+          <a:bodyPr/>
+          <a:lstStyle/>
+          <a:p>
+            <a:r>
+              <a:rPr lang="en-US" dirty="0" smtClean="0">
+                <a:hlinkClick r:id="rId3"/>
+              </a:rPr>
+              <a:t>www.asp.net/learn/3.5-extensions-videos/</a:t>
+            </a:r>
+            <a:endParaRPr lang="en-US" dirty="0" smtClean="0"/>
+          </a:p>
+          <a:p>
+            <a:r>
+              <a:rPr lang="en-US" dirty="0" smtClean="0">
+                <a:hlinkClick r:id="rId4"/>
+              </a:rPr>
+              <a:t>www.hanselman.com/blog/</a:t>
+            </a:r>
+            <a:endParaRPr lang="en-US" dirty="0" smtClean="0"/>
+          </a:p>
+          <a:p>
+            <a:r>
+              <a:rPr lang="en-US" dirty="0" smtClean="0">
+                <a:hlinkClick r:id="rId5"/>
+              </a:rPr>
+              <a:t>www.haacked.com</a:t>
+            </a:r>
+            <a:endParaRPr lang="en-US" dirty="0" smtClean="0"/>
+          </a:p>
+          <a:p>
+            <a:r>
+              <a:rPr lang="en-US" dirty="0" smtClean="0">
+                <a:hlinkClick r:id="rId6"/>
+              </a:rPr>
+              <a:t>sessions.visitmix.com/?</a:t>
+            </a:r>
+            <a:r>
+              <a:rPr lang="en-US" dirty="0" err="1" smtClean="0">
+                <a:hlinkClick r:id="rId6"/>
+              </a:rPr>
+              <a:t>selectedSearch</a:t>
+            </a:r>
+            <a:r>
+              <a:rPr lang="en-US" dirty="0" smtClean="0">
+                <a:hlinkClick r:id="rId6"/>
+              </a:rPr>
+              <a:t>=T22</a:t>
+            </a:r>
+            <a:endParaRPr lang="en-US" dirty="0" smtClean="0"/>
+          </a:p>
+          <a:p>
+            <a:r>
+              <a:rPr lang="en-US" dirty="0" smtClean="0">
+                <a:hlinkClick r:id="rId7"/>
+              </a:rPr>
+              <a:t>weblogs.asp.net/</a:t>
+            </a:r>
+            <a:r>
+              <a:rPr lang="en-US" dirty="0" err="1" smtClean="0">
+                <a:hlinkClick r:id="rId7"/>
+              </a:rPr>
+              <a:t>scottgu</a:t>
+            </a:r>
+            <a:r>
+              <a:rPr lang="en-US" dirty="0" smtClean="0">
+                <a:hlinkClick r:id="rId7"/>
+              </a:rPr>
+              <a:t>/</a:t>
+            </a:r>
+            <a:endParaRPr lang="en-US" dirty="0" smtClean="0"/>
+          </a:p>
+          <a:p>
+            <a:endParaRPr lang="en-US" dirty="0"/>
+          </a:p>
+        </p:txBody>
+      </p:sp>
+    </p:spTree>
+  </p:cSld>
+  <p:clrMapOvr>
+    <a:masterClrMapping/>
+  </p:clrMapOvr>
+  <p:timing>
+    <p:tnLst>
+      <p:par>
+        <p:cTn id="1" dur="indefinite" restart="never" nodeType="tmRoot"/>
+      </p:par>
+    </p:tnLst>
+  </p:timing>
+</p:sld>
+</file>
+
+<file path=ppt/slides/slide16.xml><?xml version="1.0" encoding="utf-8"?>
+<p:sld xmlns:a="http://schemas.openxmlformats.org/drawingml/2006/main" xmlns:r="http://schemas.openxmlformats.org/officeDocument/2006/relationships" xmlns:p="http://schemas.openxmlformats.org/presentationml/2006/main" showMasterSp="0">
+  <p:cSld>
+    <p:spTree>
+      <p:nvGrpSpPr>
+        <p:cNvPr id="1" name=""/>
+        <p:cNvGrpSpPr/>
+        <p:nvPr/>
+      </p:nvGrpSpPr>
+      <p:grpSpPr>
+        <a:xfrm>
+          <a:off x="0" y="0"/>
+          <a:ext cx="0" cy="0"/>
+          <a:chOff x="0" y="0"/>
+          <a:chExt cx="0" cy="0"/>
+        </a:xfrm>
+      </p:grpSpPr>
+      <p:sp>
+        <p:nvSpPr>
           <p:cNvPr id="3" name="Title 2"/>
           <p:cNvSpPr>
             <a:spLocks noGrp="1"/>
@@ -6774,6 +9192,21 @@
             <a:br>
               <a:rPr lang="en-US" dirty="0" smtClean="0"/>
             </a:br>
+            <a:r>
+              <a:rPr lang="en-US" dirty="0" smtClean="0"/>
+              <a:t>twitter: </a:t>
+            </a:r>
+            <a:r>
+              <a:rPr lang="en-US" dirty="0" err="1" smtClean="0"/>
+              <a:t>timwingfield</a:t>
+            </a:r>
+            <a:r>
+              <a:rPr lang="en-US" dirty="0" smtClean="0"/>
+              <a:t/>
+            </a:r>
+            <a:br>
+              <a:rPr lang="en-US" dirty="0" smtClean="0"/>
+            </a:br>
             <a:endParaRPr lang="en-US" dirty="0"/>
           </a:p>
         </p:txBody>
@@ -6783,6 +9216,13 @@
   <p:clrMapOvr>
     <a:masterClrMapping/>
   </p:clrMapOvr>
+  <p:timing>
+    <p:tnLst>
+      <p:par>
+        <p:cTn id="1" dur="indefinite" restart="never" nodeType="tmRoot"/>
+      </p:par>
+    </p:tnLst>
+  </p:timing>
 </p:sld>
 </file>
 
@@ -6820,7 +9260,7 @@
           <a:p>
             <a:r>
               <a:rPr lang="en-US" dirty="0" smtClean="0"/>
-              <a:t>What is it?</a:t>
+              <a:t>[new title]</a:t>
             </a:r>
             <a:endParaRPr lang="en-US" dirty="0"/>
           </a:p>
@@ -6841,36 +9281,59 @@
           <a:bodyPr/>
           <a:lstStyle/>
           <a:p>
+            <a:pPr marL="228600" indent="-228600">
+              <a:buAutoNum type="arabicPeriod"/>
+            </a:pPr>
             <a:r>
               <a:rPr lang="en-US" dirty="0" smtClean="0"/>
-              <a:t>New offering for </a:t>
+              <a:t>Test against code behinds</a:t>
+            </a:r>
+          </a:p>
+          <a:p>
+            <a:pPr marL="228600" indent="-228600">
+              <a:buAutoNum type="arabicPeriod"/>
+            </a:pPr>
+            <a:r>
+              <a:rPr lang="en-US" dirty="0" smtClean="0"/>
+              <a:t>Page lifecycle mess</a:t>
+            </a:r>
+          </a:p>
+          <a:p>
+            <a:pPr marL="228600" indent="-228600">
+              <a:buAutoNum type="arabicPeriod"/>
+            </a:pPr>
+            <a:r>
+              <a:rPr lang="en-US" dirty="0" smtClean="0"/>
+              <a:t>Piling up </a:t>
             </a:r>
             <a:r>
               <a:rPr lang="en-US" dirty="0" err="1" smtClean="0"/>
-              <a:t>ASP.Net</a:t>
-            </a:r>
+              <a:t>onLoad</a:t>
+            </a:r>
+            <a:endParaRPr lang="en-US" dirty="0" smtClean="0"/>
+          </a:p>
+          <a:p>
+            <a:pPr marL="228600" indent="-228600">
+              <a:buAutoNum type="arabicPeriod"/>
+            </a:pPr>
             <a:r>
               <a:rPr lang="en-US" dirty="0" smtClean="0"/>
-              <a:t> applications</a:t>
-            </a:r>
-          </a:p>
-          <a:p>
+              <a:t>Mix of logic and presentation in code behinds [picture of </a:t>
+            </a:r>
+            <a:r>
+              <a:rPr lang="en-US" dirty="0" err="1" smtClean="0"/>
+              <a:t>spagetti</a:t>
+            </a:r>
             <a:r>
               <a:rPr lang="en-US" dirty="0" smtClean="0"/>
-              <a:t>Not replacing </a:t>
-            </a:r>
-            <a:r>
-              <a:rPr lang="en-US" dirty="0" err="1" smtClean="0"/>
-              <a:t>WebForms</a:t>
-            </a:r>
+              <a:t>]</a:t>
+            </a:r>
+          </a:p>
+          <a:p>
+            <a:pPr lvl="1">
+              <a:buNone/>
+            </a:pPr>
             <a:endParaRPr lang="en-US" dirty="0" smtClean="0"/>
-          </a:p>
-          <a:p>
-            <a:r>
-              <a:rPr lang="en-US" dirty="0" smtClean="0"/>
-              <a:t>Way cool</a:t>
-            </a:r>
-            <a:endParaRPr lang="en-US" dirty="0"/>
           </a:p>
         </p:txBody>
       </p:sp>
@@ -6923,7 +9386,7 @@
           <a:p>
             <a:r>
               <a:rPr lang="en-US" dirty="0" smtClean="0"/>
-              <a:t>Why is it way cool?</a:t>
+              <a:t>Peer pressure</a:t>
             </a:r>
             <a:endParaRPr lang="en-US" dirty="0"/>
           </a:p>
@@ -6946,26 +9409,48 @@
           <a:p>
             <a:r>
               <a:rPr lang="en-US" dirty="0" smtClean="0"/>
-              <a:t>Increased testability</a:t>
+              <a:t>Ruby – Rails</a:t>
             </a:r>
           </a:p>
           <a:p>
             <a:r>
               <a:rPr lang="en-US" dirty="0" smtClean="0"/>
-              <a:t>More control over your HTML</a:t>
-            </a:r>
-          </a:p>
-          <a:p>
+              <a:t>Python – </a:t>
+            </a:r>
+            <a:r>
+              <a:rPr lang="en-US" dirty="0" err="1" smtClean="0"/>
+              <a:t>Django</a:t>
+            </a:r>
             <a:r>
               <a:rPr lang="en-US" dirty="0" smtClean="0"/>
-              <a:t>Request and Response</a:t>
+              <a:t>, Turbo Gears</a:t>
             </a:r>
           </a:p>
           <a:p>
             <a:r>
               <a:rPr lang="en-US" dirty="0" smtClean="0"/>
-              <a:t>Customizable and Extensible</a:t>
-            </a:r>
+              <a:t>Java – Struts, 80-hundred others</a:t>
+            </a:r>
+          </a:p>
+          <a:p>
+            <a:r>
+              <a:rPr lang="en-US" dirty="0" smtClean="0"/>
+              <a:t>PHP – Cake, others</a:t>
+            </a:r>
+            <a:endParaRPr lang="en-US" dirty="0" smtClean="0"/>
+          </a:p>
+          <a:p>
+            <a:r>
+              <a:rPr lang="en-US" dirty="0" err="1" smtClean="0"/>
+              <a:t>ASP.Net</a:t>
+            </a:r>
+            <a:r>
+              <a:rPr lang="en-US" dirty="0" smtClean="0"/>
+              <a:t> Open Source – Monorail</a:t>
+            </a:r>
+            <a:endParaRPr lang="en-US" dirty="0" smtClean="0"/>
+          </a:p>
+          <a:p>
             <a:endParaRPr lang="en-US" dirty="0"/>
           </a:p>
         </p:txBody>
@@ -6975,13 +9460,6 @@
   <p:clrMapOvr>
     <a:masterClrMapping/>
   </p:clrMapOvr>
-  <p:timing>
-    <p:tnLst>
-      <p:par>
-        <p:cTn id="1" dur="indefinite" restart="never" nodeType="tmRoot"/>
-      </p:par>
-    </p:tnLst>
-  </p:timing>
 </p:sld>
 </file>
 
@@ -7019,7 +9497,15 @@
           <a:p>
             <a:r>
               <a:rPr lang="en-US" dirty="0" smtClean="0"/>
-              <a:t>Why do we need it?</a:t>
+              <a:t>Why </a:t>
+            </a:r>
+            <a:r>
+              <a:rPr lang="en-US" dirty="0" err="1" smtClean="0"/>
+              <a:t>ASP.Net</a:t>
+            </a:r>
+            <a:r>
+              <a:rPr lang="en-US" dirty="0" smtClean="0"/>
+              <a:t> MVC</a:t>
             </a:r>
             <a:endParaRPr lang="en-US" dirty="0"/>
           </a:p>
@@ -7042,48 +9528,39 @@
           <a:p>
             <a:r>
               <a:rPr lang="en-US" dirty="0" smtClean="0"/>
-              <a:t>Everybody else is doing it, man!</a:t>
-            </a:r>
-          </a:p>
-          <a:p>
-            <a:pPr lvl="1"/>
+              <a:t>New offering for </a:t>
+            </a:r>
+            <a:r>
+              <a:rPr lang="en-US" dirty="0" err="1" smtClean="0"/>
+              <a:t>ASP.Net</a:t>
+            </a:r>
             <a:r>
               <a:rPr lang="en-US" dirty="0" smtClean="0"/>
-              <a:t>Ruby on Rails</a:t>
-            </a:r>
-          </a:p>
-          <a:p>
-            <a:pPr lvl="1"/>
+              <a:t> </a:t>
+            </a:r>
             <a:r>
               <a:rPr lang="en-US" dirty="0" smtClean="0"/>
-              <a:t>Castle’s </a:t>
-            </a:r>
-            <a:r>
-              <a:rPr lang="en-US" dirty="0" err="1" smtClean="0"/>
-              <a:t>MonoRail</a:t>
+              <a:t>from M$</a:t>
             </a:r>
             <a:endParaRPr lang="en-US" dirty="0" smtClean="0"/>
           </a:p>
           <a:p>
-            <a:pPr lvl="1"/>
             <a:r>
               <a:rPr lang="en-US" dirty="0" smtClean="0"/>
-              <a:t>PHP has 1,000-ish MVC frameworks</a:t>
-            </a:r>
-          </a:p>
-          <a:p>
-            <a:pPr lvl="1"/>
-            <a:endParaRPr lang="en-US" dirty="0" smtClean="0"/>
-          </a:p>
-          <a:p>
+              <a:t>Alternative to </a:t>
+            </a:r>
             <a:r>
               <a:rPr lang="en-US" dirty="0" err="1" smtClean="0"/>
               <a:t>WebForms</a:t>
             </a:r>
+            <a:endParaRPr lang="en-US" dirty="0" smtClean="0"/>
+          </a:p>
+          <a:p>
             <a:r>
               <a:rPr lang="en-US" dirty="0" smtClean="0"/>
-              <a:t> isn’t perfect?</a:t>
-            </a:r>
+              <a:t>Routing shit</a:t>
+            </a:r>
+            <a:endParaRPr lang="en-US" dirty="0"/>
           </a:p>
         </p:txBody>
       </p:sp>
@@ -7121,90 +9598,271 @@
       </p:grpSpPr>
       <p:sp>
         <p:nvSpPr>
-          <p:cNvPr id="2" name="Title 1"/>
-          <p:cNvSpPr>
-            <a:spLocks noGrp="1"/>
-          </p:cNvSpPr>
-          <p:nvPr>
-            <p:ph type="title"/>
-          </p:nvPr>
-        </p:nvSpPr>
-        <p:spPr/>
-        <p:txBody>
-          <a:bodyPr/>
+          <p:cNvPr id="4" name="Oval 3"/>
+          <p:cNvSpPr/>
+          <p:nvPr/>
+        </p:nvSpPr>
+        <p:spPr>
+          <a:xfrm>
+            <a:off x="3200400" y="457200"/>
+            <a:ext cx="2743200" cy="2590800"/>
+          </a:xfrm>
+          <a:prstGeom prst="ellipse">
+            <a:avLst/>
+          </a:prstGeom>
+        </p:spPr>
+        <p:style>
+          <a:lnRef idx="1">
+            <a:schemeClr val="accent4"/>
+          </a:lnRef>
+          <a:fillRef idx="3">
+            <a:schemeClr val="accent4"/>
+          </a:fillRef>
+          <a:effectRef idx="2">
+            <a:schemeClr val="accent4"/>
+          </a:effectRef>
+          <a:fontRef idx="minor">
+            <a:schemeClr val="lt1"/>
+          </a:fontRef>
+        </p:style>
+        <p:txBody>
+          <a:bodyPr rtlCol="0" anchor="ctr"/>
           <a:lstStyle/>
           <a:p>
-            <a:r>
-              <a:rPr lang="en-US" sz="3600" dirty="0" smtClean="0"/>
-              <a:t>What do you get out of the box?</a:t>
-            </a:r>
-            <a:endParaRPr lang="en-US" sz="3600" dirty="0"/>
-          </a:p>
-        </p:txBody>
-      </p:sp>
-      <p:sp>
-        <p:nvSpPr>
-          <p:cNvPr id="3" name="Content Placeholder 2"/>
-          <p:cNvSpPr>
-            <a:spLocks noGrp="1"/>
-          </p:cNvSpPr>
-          <p:nvPr>
-            <p:ph idx="1"/>
-          </p:nvPr>
-        </p:nvSpPr>
-        <p:spPr/>
-        <p:txBody>
-          <a:bodyPr/>
+            <a:pPr algn="ctr"/>
+            <a:r>
+              <a:rPr lang="en-US" sz="3200" dirty="0" smtClean="0">
+                <a:solidFill>
+                  <a:schemeClr val="bg1"/>
+                </a:solidFill>
+              </a:rPr>
+              <a:t>Model</a:t>
+            </a:r>
+            <a:endParaRPr lang="en-US" sz="3200" dirty="0">
+              <a:solidFill>
+                <a:schemeClr val="bg1"/>
+              </a:solidFill>
+            </a:endParaRPr>
+          </a:p>
+        </p:txBody>
+      </p:sp>
+      <p:sp>
+        <p:nvSpPr>
+          <p:cNvPr id="7" name="Oval 6"/>
+          <p:cNvSpPr/>
+          <p:nvPr/>
+        </p:nvSpPr>
+        <p:spPr>
+          <a:xfrm>
+            <a:off x="838200" y="3352800"/>
+            <a:ext cx="2743200" cy="2590800"/>
+          </a:xfrm>
+          <a:prstGeom prst="ellipse">
+            <a:avLst/>
+          </a:prstGeom>
+        </p:spPr>
+        <p:style>
+          <a:lnRef idx="1">
+            <a:schemeClr val="accent3"/>
+          </a:lnRef>
+          <a:fillRef idx="3">
+            <a:schemeClr val="accent3"/>
+          </a:fillRef>
+          <a:effectRef idx="2">
+            <a:schemeClr val="accent3"/>
+          </a:effectRef>
+          <a:fontRef idx="minor">
+            <a:schemeClr val="lt1"/>
+          </a:fontRef>
+        </p:style>
+        <p:txBody>
+          <a:bodyPr rtlCol="0" anchor="ctr"/>
           <a:lstStyle/>
           <a:p>
-            <a:r>
-              <a:rPr lang="en-US" dirty="0" smtClean="0"/>
-              <a:t>Working sample application</a:t>
-            </a:r>
-          </a:p>
-          <a:p>
-            <a:pPr lvl="1"/>
-            <a:r>
-              <a:rPr lang="en-US" dirty="0" err="1" smtClean="0"/>
-              <a:t>HomeController</a:t>
-            </a:r>
-            <a:endParaRPr lang="en-US" dirty="0" smtClean="0"/>
-          </a:p>
-          <a:p>
-            <a:pPr lvl="1"/>
-            <a:r>
-              <a:rPr lang="en-US" dirty="0" smtClean="0"/>
-              <a:t>Home and About views</a:t>
-            </a:r>
-          </a:p>
-          <a:p>
-            <a:pPr lvl="1"/>
-            <a:r>
-              <a:rPr lang="en-US" dirty="0" smtClean="0"/>
-              <a:t>Default routes</a:t>
-            </a:r>
-          </a:p>
-          <a:p>
-            <a:r>
-              <a:rPr lang="en-US" dirty="0" err="1" smtClean="0"/>
-              <a:t>WebForms</a:t>
-            </a:r>
-            <a:r>
-              <a:rPr lang="en-US" dirty="0" smtClean="0"/>
-              <a:t> </a:t>
-            </a:r>
-            <a:r>
-              <a:rPr lang="en-US" dirty="0" err="1" smtClean="0"/>
-              <a:t>ViewEngineBase</a:t>
-            </a:r>
-            <a:endParaRPr lang="en-US" dirty="0" smtClean="0"/>
-          </a:p>
-          <a:p>
-            <a:r>
-              <a:rPr lang="en-US" dirty="0" smtClean="0"/>
-              <a:t>Test Project</a:t>
-            </a:r>
-            <a:endParaRPr lang="en-US" dirty="0"/>
+            <a:pPr algn="ctr"/>
+            <a:r>
+              <a:rPr lang="en-US" sz="3200" dirty="0" smtClean="0">
+                <a:solidFill>
+                  <a:schemeClr val="bg1"/>
+                </a:solidFill>
+              </a:rPr>
+              <a:t>View</a:t>
+            </a:r>
+            <a:endParaRPr lang="en-US" sz="3200" dirty="0">
+              <a:solidFill>
+                <a:schemeClr val="bg1"/>
+              </a:solidFill>
+            </a:endParaRPr>
+          </a:p>
+        </p:txBody>
+      </p:sp>
+      <p:sp>
+        <p:nvSpPr>
+          <p:cNvPr id="8" name="Oval 7"/>
+          <p:cNvSpPr/>
+          <p:nvPr/>
+        </p:nvSpPr>
+        <p:spPr>
+          <a:xfrm>
+            <a:off x="5486400" y="3505200"/>
+            <a:ext cx="2743200" cy="2590800"/>
+          </a:xfrm>
+          <a:prstGeom prst="ellipse">
+            <a:avLst/>
+          </a:prstGeom>
+        </p:spPr>
+        <p:style>
+          <a:lnRef idx="1">
+            <a:schemeClr val="accent3"/>
+          </a:lnRef>
+          <a:fillRef idx="3">
+            <a:schemeClr val="accent3"/>
+          </a:fillRef>
+          <a:effectRef idx="2">
+            <a:schemeClr val="accent3"/>
+          </a:effectRef>
+          <a:fontRef idx="minor">
+            <a:schemeClr val="lt1"/>
+          </a:fontRef>
+        </p:style>
+        <p:txBody>
+          <a:bodyPr rtlCol="0" anchor="ctr"/>
+          <a:lstStyle/>
+          <a:p>
+            <a:pPr algn="ctr"/>
+            <a:r>
+              <a:rPr lang="en-US" sz="3200" dirty="0" smtClean="0">
+                <a:solidFill>
+                  <a:schemeClr val="bg1"/>
+                </a:solidFill>
+              </a:rPr>
+              <a:t>Controller</a:t>
+            </a:r>
+            <a:endParaRPr lang="en-US" sz="3200" dirty="0">
+              <a:solidFill>
+                <a:schemeClr val="bg1"/>
+              </a:solidFill>
+            </a:endParaRPr>
+          </a:p>
+        </p:txBody>
+      </p:sp>
+      <p:sp>
+        <p:nvSpPr>
+          <p:cNvPr id="9" name="Down Arrow 8"/>
+          <p:cNvSpPr/>
+          <p:nvPr/>
+        </p:nvSpPr>
+        <p:spPr>
+          <a:xfrm rot="13077882">
+            <a:off x="3200400" y="2971800"/>
+            <a:ext cx="381000" cy="381000"/>
+          </a:xfrm>
+          <a:prstGeom prst="downArrow">
+            <a:avLst/>
+          </a:prstGeom>
+        </p:spPr>
+        <p:style>
+          <a:lnRef idx="2">
+            <a:schemeClr val="accent1">
+              <a:shade val="50000"/>
+            </a:schemeClr>
+          </a:lnRef>
+          <a:fillRef idx="1">
+            <a:schemeClr val="accent1"/>
+          </a:fillRef>
+          <a:effectRef idx="0">
+            <a:schemeClr val="accent1"/>
+          </a:effectRef>
+          <a:fontRef idx="minor">
+            <a:schemeClr val="lt1"/>
+          </a:fontRef>
+        </p:style>
+        <p:txBody>
+          <a:bodyPr rtlCol="0" anchor="ctr"/>
+          <a:lstStyle/>
+          <a:p>
+            <a:pPr algn="ctr"/>
+            <a:endParaRPr lang="en-US"/>
+          </a:p>
+        </p:txBody>
+      </p:sp>
+      <p:sp>
+        <p:nvSpPr>
+          <p:cNvPr id="11" name="Down Arrow 10"/>
+          <p:cNvSpPr/>
+          <p:nvPr/>
+        </p:nvSpPr>
+        <p:spPr>
+          <a:xfrm rot="8532530">
+            <a:off x="5791880" y="2972479"/>
+            <a:ext cx="381000" cy="381000"/>
+          </a:xfrm>
+          <a:prstGeom prst="downArrow">
+            <a:avLst/>
+          </a:prstGeom>
+        </p:spPr>
+        <p:style>
+          <a:lnRef idx="2">
+            <a:schemeClr val="accent1">
+              <a:shade val="50000"/>
+            </a:schemeClr>
+          </a:lnRef>
+          <a:fillRef idx="1">
+            <a:schemeClr val="accent1"/>
+          </a:fillRef>
+          <a:effectRef idx="0">
+            <a:schemeClr val="accent1"/>
+          </a:effectRef>
+          <a:fontRef idx="minor">
+            <a:schemeClr val="lt1"/>
+          </a:fontRef>
+        </p:style>
+        <p:txBody>
+          <a:bodyPr rtlCol="0" anchor="ctr"/>
+          <a:lstStyle/>
+          <a:p>
+            <a:pPr algn="ctr"/>
+            <a:endParaRPr lang="en-US"/>
+          </a:p>
+        </p:txBody>
+      </p:sp>
+      <p:sp>
+        <p:nvSpPr>
+          <p:cNvPr id="12" name="Down Arrow 11"/>
+          <p:cNvSpPr/>
+          <p:nvPr/>
+        </p:nvSpPr>
+        <p:spPr>
+          <a:xfrm rot="5400000">
+            <a:off x="4343400" y="4648200"/>
+            <a:ext cx="381000" cy="381000"/>
+          </a:xfrm>
+          <a:prstGeom prst="downArrow">
+            <a:avLst/>
+          </a:prstGeom>
+        </p:spPr>
+        <p:style>
+          <a:lnRef idx="2">
+            <a:schemeClr val="accent1">
+              <a:shade val="50000"/>
+            </a:schemeClr>
+          </a:lnRef>
+          <a:fillRef idx="1">
+            <a:schemeClr val="accent1"/>
+          </a:fillRef>
+          <a:effectRef idx="0">
+            <a:schemeClr val="accent1"/>
+          </a:effectRef>
+          <a:fontRef idx="minor">
+            <a:schemeClr val="lt1"/>
+          </a:fontRef>
+        </p:style>
+        <p:txBody>
+          <a:bodyPr rtlCol="0" anchor="ctr"/>
+          <a:lstStyle/>
+          <a:p>
+            <a:pPr algn="ctr"/>
+            <a:endParaRPr lang="en-US"/>
           </a:p>
         </p:txBody>
       </p:sp>
@@ -7250,19 +9908,62 @@
             <p:ph type="title"/>
           </p:nvPr>
         </p:nvSpPr>
-        <p:spPr>
-          <a:xfrm>
-            <a:off x="914400" y="2438400"/>
-            <a:ext cx="7772400" cy="1447800"/>
-          </a:xfrm>
-        </p:spPr>
+        <p:spPr/>
         <p:txBody>
           <a:bodyPr/>
           <a:lstStyle/>
           <a:p>
             <a:r>
               <a:rPr lang="en-US" dirty="0" smtClean="0"/>
-              <a:t>That’s all fine and dandy…how does it work?</a:t>
+              <a:t>[four different slides]</a:t>
+            </a:r>
+            <a:br>
+              <a:rPr lang="en-US" dirty="0" smtClean="0"/>
+            </a:br>
+            <a:r>
+              <a:rPr lang="en-US" dirty="0" smtClean="0"/>
+              <a:t>[make bullets the title]</a:t>
+            </a:r>
+            <a:endParaRPr lang="en-US" dirty="0"/>
+          </a:p>
+        </p:txBody>
+      </p:sp>
+      <p:sp>
+        <p:nvSpPr>
+          <p:cNvPr id="3" name="Content Placeholder 2"/>
+          <p:cNvSpPr>
+            <a:spLocks noGrp="1"/>
+          </p:cNvSpPr>
+          <p:nvPr>
+            <p:ph idx="1"/>
+          </p:nvPr>
+        </p:nvSpPr>
+        <p:spPr/>
+        <p:txBody>
+          <a:bodyPr/>
+          <a:lstStyle/>
+          <a:p>
+            <a:r>
+              <a:rPr lang="en-US" dirty="0" smtClean="0"/>
+              <a:t>Increased testability</a:t>
+            </a:r>
+          </a:p>
+          <a:p>
+            <a:r>
+              <a:rPr lang="en-US" dirty="0" smtClean="0"/>
+              <a:t>More control over your HTML</a:t>
+            </a:r>
+          </a:p>
+          <a:p>
+            <a:r>
+              <a:rPr lang="en-US" dirty="0" smtClean="0"/>
+              <a:t>Request and Response</a:t>
+            </a:r>
+          </a:p>
+          <a:p>
+            <a:r>
+              <a:rPr lang="en-US" dirty="0" smtClean="0"/>
+              <a:t>Customizable and Extensible</a:t>
             </a:r>
             <a:endParaRPr lang="en-US" dirty="0"/>
           </a:p>
@@ -7302,271 +10003,46 @@
       </p:grpSpPr>
       <p:sp>
         <p:nvSpPr>
-          <p:cNvPr id="4" name="Oval 3"/>
-          <p:cNvSpPr/>
-          <p:nvPr/>
-        </p:nvSpPr>
-        <p:spPr>
-          <a:xfrm>
-            <a:off x="3200400" y="457200"/>
-            <a:ext cx="2743200" cy="2590800"/>
-          </a:xfrm>
-          <a:prstGeom prst="ellipse">
-            <a:avLst/>
-          </a:prstGeom>
-        </p:spPr>
-        <p:style>
-          <a:lnRef idx="1">
-            <a:schemeClr val="accent4"/>
-          </a:lnRef>
-          <a:fillRef idx="3">
-            <a:schemeClr val="accent4"/>
-          </a:fillRef>
-          <a:effectRef idx="2">
-            <a:schemeClr val="accent4"/>
-          </a:effectRef>
-          <a:fontRef idx="minor">
-            <a:schemeClr val="lt1"/>
-          </a:fontRef>
-        </p:style>
-        <p:txBody>
-          <a:bodyPr rtlCol="0" anchor="ctr"/>
+          <p:cNvPr id="2" name="Title 1"/>
+          <p:cNvSpPr>
+            <a:spLocks noGrp="1"/>
+          </p:cNvSpPr>
+          <p:nvPr>
+            <p:ph type="title"/>
+          </p:nvPr>
+        </p:nvSpPr>
+        <p:spPr/>
+        <p:txBody>
+          <a:bodyPr/>
           <a:lstStyle/>
           <a:p>
-            <a:pPr algn="ctr"/>
-            <a:r>
-              <a:rPr lang="en-US" sz="3200" dirty="0" smtClean="0">
-                <a:solidFill>
-                  <a:schemeClr val="bg1"/>
-                </a:solidFill>
-              </a:rPr>
-              <a:t>Model</a:t>
-            </a:r>
-            <a:endParaRPr lang="en-US" sz="3200" dirty="0">
-              <a:solidFill>
-                <a:schemeClr val="bg1"/>
-              </a:solidFill>
-            </a:endParaRPr>
-          </a:p>
-        </p:txBody>
-      </p:sp>
-      <p:sp>
-        <p:nvSpPr>
-          <p:cNvPr id="7" name="Oval 6"/>
-          <p:cNvSpPr/>
-          <p:nvPr/>
-        </p:nvSpPr>
-        <p:spPr>
-          <a:xfrm>
-            <a:off x="838200" y="3352800"/>
-            <a:ext cx="2743200" cy="2590800"/>
-          </a:xfrm>
-          <a:prstGeom prst="ellipse">
-            <a:avLst/>
-          </a:prstGeom>
-        </p:spPr>
-        <p:style>
-          <a:lnRef idx="1">
-            <a:schemeClr val="accent3"/>
-          </a:lnRef>
-          <a:fillRef idx="3">
-            <a:schemeClr val="accent3"/>
-          </a:fillRef>
-          <a:effectRef idx="2">
-            <a:schemeClr val="accent3"/>
-          </a:effectRef>
-          <a:fontRef idx="minor">
-            <a:schemeClr val="lt1"/>
-          </a:fontRef>
-        </p:style>
-        <p:txBody>
-          <a:bodyPr rtlCol="0" anchor="ctr"/>
+            <a:r>
+              <a:rPr lang="en-US" dirty="0" smtClean="0"/>
+              <a:t>Increased testability</a:t>
+            </a:r>
+            <a:br>
+              <a:rPr lang="en-US" dirty="0" smtClean="0"/>
+            </a:br>
+            <a:endParaRPr lang="en-US" dirty="0"/>
+          </a:p>
+        </p:txBody>
+      </p:sp>
+      <p:sp>
+        <p:nvSpPr>
+          <p:cNvPr id="3" name="Content Placeholder 2"/>
+          <p:cNvSpPr>
+            <a:spLocks noGrp="1"/>
+          </p:cNvSpPr>
+          <p:nvPr>
+            <p:ph idx="1"/>
+          </p:nvPr>
+        </p:nvSpPr>
+        <p:spPr/>
+        <p:txBody>
+          <a:bodyPr/>
           <a:lstStyle/>
           <a:p>
-            <a:pPr algn="ctr"/>
-            <a:r>
-              <a:rPr lang="en-US" sz="3200" dirty="0" smtClean="0">
-                <a:solidFill>
-                  <a:schemeClr val="bg1"/>
-                </a:solidFill>
-              </a:rPr>
-              <a:t>View</a:t>
-            </a:r>
-            <a:endParaRPr lang="en-US" sz="3200" dirty="0">
-              <a:solidFill>
-                <a:schemeClr val="bg1"/>
-              </a:solidFill>
-            </a:endParaRPr>
-          </a:p>
-        </p:txBody>
-      </p:sp>
-      <p:sp>
-        <p:nvSpPr>
-          <p:cNvPr id="8" name="Oval 7"/>
-          <p:cNvSpPr/>
-          <p:nvPr/>
-        </p:nvSpPr>
-        <p:spPr>
-          <a:xfrm>
-            <a:off x="5486400" y="3505200"/>
-            <a:ext cx="2743200" cy="2590800"/>
-          </a:xfrm>
-          <a:prstGeom prst="ellipse">
-            <a:avLst/>
-          </a:prstGeom>
-        </p:spPr>
-        <p:style>
-          <a:lnRef idx="1">
-            <a:schemeClr val="accent3"/>
-          </a:lnRef>
-          <a:fillRef idx="3">
-            <a:schemeClr val="accent3"/>
-          </a:fillRef>
-          <a:effectRef idx="2">
-            <a:schemeClr val="accent3"/>
-          </a:effectRef>
-          <a:fontRef idx="minor">
-            <a:schemeClr val="lt1"/>
-          </a:fontRef>
-        </p:style>
-        <p:txBody>
-          <a:bodyPr rtlCol="0" anchor="ctr"/>
-          <a:lstStyle/>
-          <a:p>
-            <a:pPr algn="ctr"/>
-            <a:r>
-              <a:rPr lang="en-US" sz="3200" dirty="0" smtClean="0">
-                <a:solidFill>
-                  <a:schemeClr val="bg1"/>
-                </a:solidFill>
-              </a:rPr>
-              <a:t>Controller</a:t>
-            </a:r>
-            <a:endParaRPr lang="en-US" sz="3200" dirty="0">
-              <a:solidFill>
-                <a:schemeClr val="bg1"/>
-              </a:solidFill>
-            </a:endParaRPr>
-          </a:p>
-        </p:txBody>
-      </p:sp>
-      <p:sp>
-        <p:nvSpPr>
-          <p:cNvPr id="9" name="Down Arrow 8"/>
-          <p:cNvSpPr/>
-          <p:nvPr/>
-        </p:nvSpPr>
-        <p:spPr>
-          <a:xfrm rot="13077882">
-            <a:off x="3200400" y="2971800"/>
-            <a:ext cx="381000" cy="381000"/>
-          </a:xfrm>
-          <a:prstGeom prst="downArrow">
-            <a:avLst/>
-          </a:prstGeom>
-        </p:spPr>
-        <p:style>
-          <a:lnRef idx="2">
-            <a:schemeClr val="accent1">
-              <a:shade val="50000"/>
-            </a:schemeClr>
-          </a:lnRef>
-          <a:fillRef idx="1">
-            <a:schemeClr val="accent1"/>
-          </a:fillRef>
-          <a:effectRef idx="0">
-            <a:schemeClr val="accent1"/>
-          </a:effectRef>
-          <a:fontRef idx="minor">
-            <a:schemeClr val="lt1"/>
-          </a:fontRef>
-        </p:style>
-        <p:txBody>
-          <a:bodyPr rtlCol="0" anchor="ctr"/>
-          <a:lstStyle/>
-          <a:p>
-            <a:pPr algn="ctr"/>
-            <a:endParaRPr lang="en-US"/>
-          </a:p>
-        </p:txBody>
-      </p:sp>
-      <p:sp>
-        <p:nvSpPr>
-          <p:cNvPr id="11" name="Down Arrow 10"/>
-          <p:cNvSpPr/>
-          <p:nvPr/>
-        </p:nvSpPr>
-        <p:spPr>
-          <a:xfrm rot="8532530">
-            <a:off x="5791880" y="2972479"/>
-            <a:ext cx="381000" cy="381000"/>
-          </a:xfrm>
-          <a:prstGeom prst="downArrow">
-            <a:avLst/>
-          </a:prstGeom>
-        </p:spPr>
-        <p:style>
-          <a:lnRef idx="2">
-            <a:schemeClr val="accent1">
-              <a:shade val="50000"/>
-            </a:schemeClr>
-          </a:lnRef>
-          <a:fillRef idx="1">
-            <a:schemeClr val="accent1"/>
-          </a:fillRef>
-          <a:effectRef idx="0">
-            <a:schemeClr val="accent1"/>
-          </a:effectRef>
-          <a:fontRef idx="minor">
-            <a:schemeClr val="lt1"/>
-          </a:fontRef>
-        </p:style>
-        <p:txBody>
-          <a:bodyPr rtlCol="0" anchor="ctr"/>
-          <a:lstStyle/>
-          <a:p>
-            <a:pPr algn="ctr"/>
-            <a:endParaRPr lang="en-US"/>
-          </a:p>
-        </p:txBody>
-      </p:sp>
-      <p:sp>
-        <p:nvSpPr>
-          <p:cNvPr id="12" name="Down Arrow 11"/>
-          <p:cNvSpPr/>
-          <p:nvPr/>
-        </p:nvSpPr>
-        <p:spPr>
-          <a:xfrm rot="5400000">
-            <a:off x="4343400" y="4648200"/>
-            <a:ext cx="381000" cy="381000"/>
-          </a:xfrm>
-          <a:prstGeom prst="downArrow">
-            <a:avLst/>
-          </a:prstGeom>
-        </p:spPr>
-        <p:style>
-          <a:lnRef idx="2">
-            <a:schemeClr val="accent1">
-              <a:shade val="50000"/>
-            </a:schemeClr>
-          </a:lnRef>
-          <a:fillRef idx="1">
-            <a:schemeClr val="accent1"/>
-          </a:fillRef>
-          <a:effectRef idx="0">
-            <a:schemeClr val="accent1"/>
-          </a:effectRef>
-          <a:fontRef idx="minor">
-            <a:schemeClr val="lt1"/>
-          </a:fontRef>
-        </p:style>
-        <p:txBody>
-          <a:bodyPr rtlCol="0" anchor="ctr"/>
-          <a:lstStyle/>
-          <a:p>
-            <a:pPr algn="ctr"/>
-            <a:endParaRPr lang="en-US"/>
+            <a:endParaRPr lang="en-US" dirty="0"/>
           </a:p>
         </p:txBody>
       </p:sp>
@@ -7575,13 +10051,6 @@
   <p:clrMapOvr>
     <a:masterClrMapping/>
   </p:clrMapOvr>
-  <p:timing>
-    <p:tnLst>
-      <p:par>
-        <p:cTn id="1" dur="indefinite" restart="never" nodeType="tmRoot"/>
-      </p:par>
-    </p:tnLst>
-  </p:timing>
 </p:sld>
 </file>
 
@@ -7618,9 +10087,12 @@
           <a:lstStyle/>
           <a:p>
             <a:r>
-              <a:rPr lang="en-US" smtClean="0"/>
-              <a:t>What’s going on?</a:t>
-            </a:r>
+              <a:rPr lang="en-US" dirty="0" smtClean="0"/>
+              <a:t>More control over your HTML</a:t>
+            </a:r>
+            <a:br>
+              <a:rPr lang="en-US" dirty="0" smtClean="0"/>
+            </a:br>
             <a:endParaRPr lang="en-US" dirty="0"/>
           </a:p>
         </p:txBody>
@@ -7640,29 +10112,7 @@
           <a:bodyPr/>
           <a:lstStyle/>
           <a:p>
-            <a:r>
-              <a:rPr lang="en-US" smtClean="0"/>
-              <a:t>Browser requests December posts</a:t>
-            </a:r>
-          </a:p>
-          <a:p>
-            <a:r>
-              <a:rPr lang="en-US" smtClean="0"/>
-              <a:t>Route is determined</a:t>
-            </a:r>
-          </a:p>
-          <a:p>
-            <a:r>
-              <a:rPr lang="en-US" smtClean="0"/>
-              <a:t>Controller is activated</a:t>
-            </a:r>
-          </a:p>
-          <a:p>
-            <a:r>
-              <a:rPr lang="en-US" smtClean="0"/>
-              <a:t>Controller renders view</a:t>
-            </a:r>
-            <a:endParaRPr lang="en-US" dirty="0"/>
+            <a:endParaRPr lang="en-US"/>
           </a:p>
         </p:txBody>
       </p:sp>
@@ -7671,14 +10121,6 @@
   <p:clrMapOvr>
     <a:masterClrMapping/>
   </p:clrMapOvr>
-  <p:transition/>
-  <p:timing>
-    <p:tnLst>
-      <p:par>
-        <p:cTn id="1" dur="indefinite" restart="never" nodeType="tmRoot"/>
-      </p:par>
-    </p:tnLst>
-  </p:timing>
 </p:sld>
 </file>
 
@@ -7709,33 +10151,38 @@
             <p:ph type="title"/>
           </p:nvPr>
         </p:nvSpPr>
-        <p:spPr>
-          <a:xfrm>
-            <a:off x="914400" y="2819400"/>
-            <a:ext cx="7772400" cy="1447800"/>
-          </a:xfrm>
-        </p:spPr>
+        <p:spPr/>
         <p:txBody>
           <a:bodyPr/>
           <a:lstStyle/>
           <a:p>
             <a:r>
-              <a:rPr lang="en-US" sz="6000" dirty="0" smtClean="0">
-                <a:solidFill>
-                  <a:srgbClr val="FFC000"/>
-                </a:solidFill>
-                <a:latin typeface="Courier New" pitchFamily="49" charset="0"/>
-                <a:cs typeface="Courier New" pitchFamily="49" charset="0"/>
-              </a:rPr>
-              <a:t>&lt;code /&gt;</a:t>
-            </a:r>
-            <a:endParaRPr lang="en-US" sz="6000" dirty="0">
-              <a:solidFill>
-                <a:srgbClr val="FFC000"/>
-              </a:solidFill>
-              <a:latin typeface="Courier New" pitchFamily="49" charset="0"/>
-              <a:cs typeface="Courier New" pitchFamily="49" charset="0"/>
-            </a:endParaRPr>
+              <a:rPr lang="en-US" dirty="0" smtClean="0"/>
+              <a:t>Request and Response</a:t>
+            </a:r>
+            <a:br>
+              <a:rPr lang="en-US" dirty="0" smtClean="0"/>
+            </a:br>
+            <a:endParaRPr lang="en-US" dirty="0"/>
+          </a:p>
+        </p:txBody>
+      </p:sp>
+      <p:sp>
+        <p:nvSpPr>
+          <p:cNvPr id="3" name="Content Placeholder 2"/>
+          <p:cNvSpPr>
+            <a:spLocks noGrp="1"/>
+          </p:cNvSpPr>
+          <p:nvPr>
+            <p:ph idx="1"/>
+          </p:nvPr>
+        </p:nvSpPr>
+        <p:spPr/>
+        <p:txBody>
+          <a:bodyPr/>
+          <a:lstStyle/>
+          <a:p>
+            <a:endParaRPr lang="en-US"/>
           </a:p>
         </p:txBody>
       </p:sp>
@@ -7744,13 +10191,6 @@
   <p:clrMapOvr>
     <a:masterClrMapping/>
   </p:clrMapOvr>
-  <p:timing>
-    <p:tnLst>
-      <p:par>
-        <p:cTn id="1" dur="indefinite" restart="never" nodeType="tmRoot"/>
-      </p:par>
-    </p:tnLst>
-  </p:timing>
 </p:sld>
 </file>
 
@@ -8079,4 +10519,287 @@
   <a:objectDefaults/>
   <a:extraClrSchemeLst/>
 </a:theme>
+</file>
+
+<file path=ppt/theme/theme2.xml><?xml version="1.0" encoding="utf-8"?>
+<a:theme xmlns:a="http://schemas.openxmlformats.org/drawingml/2006/main" name="Office Theme">
+  <a:themeElements>
+    <a:clrScheme name="Office">
+      <a:dk1>
+        <a:sysClr val="windowText" lastClr="000000"/>
+      </a:dk1>
+      <a:lt1>
+        <a:sysClr val="window" lastClr="FFFFFF"/>
+      </a:lt1>
+      <a:dk2>
+        <a:srgbClr val="1F497D"/>
+      </a:dk2>
+      <a:lt2>
+        <a:srgbClr val="EEECE1"/>
+      </a:lt2>
+      <a:accent1>
+        <a:srgbClr val="4F81BD"/>
+      </a:accent1>
+      <a:accent2>
+        <a:srgbClr val="C0504D"/>
+      </a:accent2>
+      <a:accent3>
+        <a:srgbClr val="9BBB59"/>
+      </a:accent3>
+      <a:accent4>
+        <a:srgbClr val="8064A2"/>
+      </a:accent4>
+      <a:accent5>
+        <a:srgbClr val="4BACC6"/>
+      </a:accent5>
+      <a:accent6>
+        <a:srgbClr val="F79646"/>
+      </a:accent6>
+      <a:hlink>
+        <a:srgbClr val="0000FF"/>
+      </a:hlink>
+      <a:folHlink>
+        <a:srgbClr val="800080"/>
+      </a:folHlink>
+    </a:clrScheme>
+    <a:fontScheme name="Office">
+      <a:majorFont>
+        <a:latin typeface="Calibri"/>
+        <a:ea typeface=""/>
+        <a:cs typeface=""/>
+        <a:font script="Jpan" typeface="ＭＳ Ｐゴシック"/>
+        <a:font script="Hang" typeface="맑은 고딕"/>
+        <a:font script="Hans" typeface="宋体"/>
+        <a:font script="Hant" typeface="新細明體"/>
+        <a:font script="Arab" typeface="Times New Roman"/>
+        <a:font script="Hebr" typeface="Times New Roman"/>
+        <a:font script="Thai" typeface="Angsana New"/>
+        <a:font script="Ethi" typeface="Nyala"/>
+        <a:font script="Beng" typeface="Vrinda"/>
+        <a:font script="Gujr" typeface="Shruti"/>
+        <a:font script="Khmr" typeface="MoolBoran"/>
+        <a:font script="Knda" typeface="Tunga"/>
+        <a:font script="Guru" typeface="Raavi"/>
+        <a:font script="Cans" typeface="Euphemia"/>
+        <a:font script="Cher" typeface="Plantagenet Cherokee"/>
+        <a:font script="Yiii" typeface="Microsoft Yi Baiti"/>
+        <a:font script="Tibt" typeface="Microsoft Himalaya"/>
+        <a:font script="Thaa" typeface="MV Boli"/>
+        <a:font script="Deva" typeface="Mangal"/>
+        <a:font script="Telu" typeface="Gautami"/>
+        <a:font script="Taml" typeface="Latha"/>
+        <a:font script="Syrc" typeface="Estrangelo Edessa"/>
+        <a:font script="Orya" typeface="Kalinga"/>
+        <a:font script="Mlym" typeface="Kartika"/>
+        <a:font script="Laoo" typeface="DokChampa"/>
+        <a:font script="Sinh" typeface="Iskoola Pota"/>
+        <a:font script="Mong" typeface="Mongolian Baiti"/>
+        <a:font script="Viet" typeface="Times New Roman"/>
+        <a:font script="Uigh" typeface="Microsoft Uighur"/>
+      </a:majorFont>
+      <a:minorFont>
+        <a:latin typeface="Calibri"/>
+        <a:ea typeface=""/>
+        <a:cs typeface=""/>
+        <a:font script="Jpan" typeface="ＭＳ Ｐゴシック"/>
+        <a:font script="Hang" typeface="맑은 고딕"/>
+        <a:font script="Hans" typeface="宋体"/>
+        <a:font script="Hant" typeface="新細明體"/>
+        <a:font script="Arab" typeface="Arial"/>
+        <a:font script="Hebr" typeface="Arial"/>
+        <a:font script="Thai" typeface="Cordia New"/>
+        <a:font script="Ethi" typeface="Nyala"/>
+        <a:font script="Beng" typeface="Vrinda"/>
+        <a:font script="Gujr" typeface="Shruti"/>
+        <a:font script="Khmr" typeface="DaunPenh"/>
+        <a:font script="Knda" typeface="Tunga"/>
+        <a:font script="Guru" typeface="Raavi"/>
+        <a:font script="Cans" typeface="Euphemia"/>
+        <a:font script="Cher" typeface="Plantagenet Cherokee"/>
+        <a:font script="Yiii" typeface="Microsoft Yi Baiti"/>
+        <a:font script="Tibt" typeface="Microsoft Himalaya"/>
+        <a:font script="Thaa" typeface="MV Boli"/>
+        <a:font script="Deva" typeface="Mangal"/>
+        <a:font script="Telu" typeface="Gautami"/>
+        <a:font script="Taml" typeface="Latha"/>
+        <a:font script="Syrc" typeface="Estrangelo Edessa"/>
+        <a:font script="Orya" typeface="Kalinga"/>
+        <a:font script="Mlym" typeface="Kartika"/>
+        <a:font script="Laoo" typeface="DokChampa"/>
+        <a:font script="Sinh" typeface="Iskoola Pota"/>
+        <a:font script="Mong" typeface="Mongolian Baiti"/>
+        <a:font script="Viet" typeface="Arial"/>
+        <a:font script="Uigh" typeface="Microsoft Uighur"/>
+      </a:minorFont>
+    </a:fontScheme>
+    <a:fmtScheme name="Office">
+      <a:fillStyleLst>
+        <a:solidFill>
+          <a:schemeClr val="phClr"/>
+        </a:solidFill>
+        <a:gradFill rotWithShape="1">
+          <a:gsLst>
+            <a:gs pos="0">
+              <a:schemeClr val="phClr">
+                <a:tint val="50000"/>
+                <a:satMod val="300000"/>
+              </a:schemeClr>
+            </a:gs>
+            <a:gs pos="35000">
+              <a:schemeClr val="phClr">
+                <a:tint val="37000"/>
+                <a:satMod val="300000"/>
+              </a:schemeClr>
+            </a:gs>
+            <a:gs pos="100000">
+              <a:schemeClr val="phClr">
+                <a:tint val="15000"/>
+                <a:satMod val="350000"/>
+              </a:schemeClr>
+            </a:gs>
+          </a:gsLst>
+          <a:lin ang="16200000" scaled="1"/>
+        </a:gradFill>
+        <a:gradFill rotWithShape="1">
+          <a:gsLst>
+            <a:gs pos="0">
+              <a:schemeClr val="phClr">
+                <a:shade val="51000"/>
+                <a:satMod val="130000"/>
+              </a:schemeClr>
+            </a:gs>
+            <a:gs pos="80000">
+              <a:schemeClr val="phClr">
+                <a:shade val="93000"/>
+                <a:satMod val="130000"/>
+              </a:schemeClr>
+            </a:gs>
+            <a:gs pos="100000">
+              <a:schemeClr val="phClr">
+                <a:shade val="94000"/>
+                <a:satMod val="135000"/>
+              </a:schemeClr>
+            </a:gs>
+          </a:gsLst>
+          <a:lin ang="16200000" scaled="0"/>
+        </a:gradFill>
+      </a:fillStyleLst>
+      <a:lnStyleLst>
+        <a:ln w="9525" cap="flat" cmpd="sng" algn="ctr">
+          <a:solidFill>
+            <a:schemeClr val="phClr">
+              <a:shade val="95000"/>
+              <a:satMod val="105000"/>
+            </a:schemeClr>
+          </a:solidFill>
+          <a:prstDash val="solid"/>
+        </a:ln>
+        <a:ln w="25400" cap="flat" cmpd="sng" algn="ctr">
+          <a:solidFill>
+            <a:schemeClr val="phClr"/>
+          </a:solidFill>
+          <a:prstDash val="solid"/>
+        </a:ln>
+        <a:ln w="38100" cap="flat" cmpd="sng" algn="ctr">
+          <a:solidFill>
+            <a:schemeClr val="phClr"/>
+          </a:solidFill>
+          <a:prstDash val="solid"/>
+        </a:ln>
+      </a:lnStyleLst>
+      <a:effectStyleLst>
+        <a:effectStyle>
+          <a:effectLst>
+            <a:outerShdw blurRad="40000" dist="20000" dir="5400000" rotWithShape="0">
+              <a:srgbClr val="000000">
+                <a:alpha val="38000"/>
+              </a:srgbClr>
+            </a:outerShdw>
+          </a:effectLst>
+        </a:effectStyle>
+        <a:effectStyle>
+          <a:effectLst>
+            <a:outerShdw blurRad="40000" dist="23000" dir="5400000" rotWithShape="0">
+              <a:srgbClr val="000000">
+                <a:alpha val="35000"/>
+              </a:srgbClr>
+            </a:outerShdw>
+          </a:effectLst>
+        </a:effectStyle>
+        <a:effectStyle>
+          <a:effectLst>
+            <a:outerShdw blurRad="40000" dist="23000" dir="5400000" rotWithShape="0">
+              <a:srgbClr val="000000">
+                <a:alpha val="35000"/>
+              </a:srgbClr>
+            </a:outerShdw>
+          </a:effectLst>
+          <a:scene3d>
+            <a:camera prst="orthographicFront">
+              <a:rot lat="0" lon="0" rev="0"/>
+            </a:camera>
+            <a:lightRig rig="threePt" dir="t">
+              <a:rot lat="0" lon="0" rev="1200000"/>
+            </a:lightRig>
+          </a:scene3d>
+          <a:sp3d>
+            <a:bevelT w="63500" h="25400"/>
+          </a:sp3d>
+        </a:effectStyle>
+      </a:effectStyleLst>
+      <a:bgFillStyleLst>
+        <a:solidFill>
+          <a:schemeClr val="phClr"/>
+        </a:solidFill>
+        <a:gradFill rotWithShape="1">
+          <a:gsLst>
+            <a:gs pos="0">
+              <a:schemeClr val="phClr">
+                <a:tint val="40000"/>
+                <a:satMod val="350000"/>
+              </a:schemeClr>
+            </a:gs>
+            <a:gs pos="40000">
+              <a:schemeClr val="phClr">
+                <a:tint val="45000"/>
+                <a:shade val="99000"/>
+                <a:satMod val="350000"/>
+              </a:schemeClr>
+            </a:gs>
+            <a:gs pos="100000">
+              <a:schemeClr val="phClr">
+                <a:shade val="20000"/>
+                <a:satMod val="255000"/>
+              </a:schemeClr>
+            </a:gs>
+          </a:gsLst>
+          <a:path path="circle">
+            <a:fillToRect l="50000" t="-80000" r="50000" b="180000"/>
+          </a:path>
+        </a:gradFill>
+        <a:gradFill rotWithShape="1">
+          <a:gsLst>
+            <a:gs pos="0">
+              <a:schemeClr val="phClr">
+                <a:tint val="80000"/>
+                <a:satMod val="300000"/>
+              </a:schemeClr>
+            </a:gs>
+            <a:gs pos="100000">
+              <a:schemeClr val="phClr">
+                <a:shade val="30000"/>
+                <a:satMod val="200000"/>
+              </a:schemeClr>
+            </a:gs>
+          </a:gsLst>
+          <a:path path="circle">
+            <a:fillToRect l="50000" t="50000" r="50000" b="50000"/>
+          </a:path>
+        </a:gradFill>
+      </a:bgFillStyleLst>
+    </a:fmtScheme>
+  </a:themeElements>
+  <a:objectDefaults/>
+  <a:extraClrSchemeLst/>
+</a:theme>
 </file>
</xml_diff>

<commit_message>
Deleted "What do you get..." slide. Swapped Customizable slide and Options slide.
</commit_message>
<xml_diff>
--- a/Samples/Getting-Started-With-MVC/Getting Started with MVC.pptx
+++ b/Samples/Getting-Started-With-MVC/Getting Started with MVC.pptx
@@ -5,7 +5,7 @@
     <p:sldMasterId id="2147483672" r:id="rId1"/>
   </p:sldMasterIdLst>
   <p:notesMasterIdLst>
-    <p:notesMasterId r:id="rId20"/>
+    <p:notesMasterId r:id="rId19"/>
   </p:notesMasterIdLst>
   <p:sldIdLst>
     <p:sldId id="256" r:id="rId2"/>
@@ -18,14 +18,13 @@
     <p:sldId id="269" r:id="rId9"/>
     <p:sldId id="270" r:id="rId10"/>
     <p:sldId id="271" r:id="rId11"/>
-    <p:sldId id="277" r:id="rId12"/>
-    <p:sldId id="272" r:id="rId13"/>
+    <p:sldId id="272" r:id="rId12"/>
+    <p:sldId id="277" r:id="rId13"/>
     <p:sldId id="278" r:id="rId14"/>
-    <p:sldId id="259" r:id="rId15"/>
-    <p:sldId id="268" r:id="rId16"/>
-    <p:sldId id="264" r:id="rId17"/>
-    <p:sldId id="265" r:id="rId18"/>
-    <p:sldId id="266" r:id="rId19"/>
+    <p:sldId id="268" r:id="rId15"/>
+    <p:sldId id="264" r:id="rId16"/>
+    <p:sldId id="265" r:id="rId17"/>
+    <p:sldId id="266" r:id="rId18"/>
   </p:sldIdLst>
   <p:sldSz cx="9144000" cy="6858000" type="screen4x3"/>
   <p:notesSz cx="6858000" cy="9144000"/>
@@ -656,37 +655,7 @@
             </a:pPr>
             <a:r>
               <a:rPr lang="en-US" dirty="0" smtClean="0"/>
-              <a:t>Quick and dirty, plain old html. Id replaced</a:t>
-            </a:r>
-            <a:r>
-              <a:rPr lang="en-US" baseline="0" dirty="0" smtClean="0"/>
-              <a:t> by classic asp-</a:t>
-            </a:r>
-            <a:r>
-              <a:rPr lang="en-US" baseline="0" dirty="0" err="1" smtClean="0"/>
-              <a:t>ish</a:t>
-            </a:r>
-            <a:r>
-              <a:rPr lang="en-US" baseline="0" dirty="0" smtClean="0"/>
-              <a:t> code</a:t>
-            </a:r>
-          </a:p>
-          <a:p>
-            <a:pPr marL="685800" lvl="1" indent="-228600">
-              <a:buAutoNum type="arabicPeriod"/>
-            </a:pPr>
-            <a:r>
-              <a:rPr lang="en-US" baseline="0" dirty="0" smtClean="0"/>
-              <a:t>Will work, but magic strings everywhere</a:t>
-            </a:r>
-          </a:p>
-          <a:p>
-            <a:pPr marL="685800" lvl="1" indent="-228600">
-              <a:buAutoNum type="arabicPeriod"/>
-            </a:pPr>
-            <a:r>
-              <a:rPr lang="en-US" baseline="0" dirty="0" smtClean="0"/>
-              <a:t>If your controller changes, refactoring here will be uncovered at runtime</a:t>
+              <a:t>Custom Routing</a:t>
             </a:r>
           </a:p>
           <a:p>
@@ -694,17 +663,12 @@
               <a:buAutoNum type="arabicPeriod"/>
             </a:pPr>
             <a:r>
+              <a:rPr lang="en-US" dirty="0" smtClean="0"/>
+              <a:t>Filter</a:t>
+            </a:r>
+            <a:r>
               <a:rPr lang="en-US" baseline="0" dirty="0" smtClean="0"/>
-              <a:t>Better way, as controller is implied. (Unless needed to move to a different controller)</a:t>
-            </a:r>
-          </a:p>
-          <a:p>
-            <a:pPr marL="685800" lvl="1" indent="-228600">
-              <a:buAutoNum type="arabicPeriod"/>
-            </a:pPr>
-            <a:r>
-              <a:rPr lang="en-US" baseline="0" dirty="0" smtClean="0"/>
-              <a:t>Controller changes will again be uncovered at runtime.</a:t>
+              <a:t> Attribute</a:t>
             </a:r>
           </a:p>
           <a:p>
@@ -713,31 +677,9 @@
             </a:pPr>
             <a:r>
               <a:rPr lang="en-US" baseline="0" dirty="0" smtClean="0"/>
-              <a:t>Best way, the view is strongly typed to the controller. </a:t>
-            </a:r>
-          </a:p>
-          <a:p>
-            <a:pPr marL="685800" lvl="1" indent="-228600">
-              <a:buAutoNum type="arabicPeriod"/>
-            </a:pPr>
-            <a:r>
-              <a:rPr lang="en-US" baseline="0" dirty="0" smtClean="0"/>
-              <a:t>Controller change here will break the build…woo-</a:t>
-            </a:r>
-            <a:r>
-              <a:rPr lang="en-US" baseline="0" dirty="0" err="1" smtClean="0"/>
-              <a:t>hoo</a:t>
-            </a:r>
-            <a:r>
-              <a:rPr lang="en-US" baseline="0" dirty="0" smtClean="0"/>
-              <a:t>! Fail early!</a:t>
-            </a:r>
-          </a:p>
-          <a:p>
-            <a:pPr marL="228600" indent="-228600">
-              <a:buAutoNum type="arabicPeriod"/>
-            </a:pPr>
-            <a:endParaRPr lang="en-US" baseline="0" dirty="0" smtClean="0"/>
+              <a:t>Add Ajax</a:t>
+            </a:r>
+            <a:endParaRPr lang="en-US" dirty="0"/>
           </a:p>
         </p:txBody>
       </p:sp>
@@ -824,7 +766,37 @@
             </a:pPr>
             <a:r>
               <a:rPr lang="en-US" dirty="0" smtClean="0"/>
-              <a:t>Custom Routing</a:t>
+              <a:t>Quick and dirty, plain old html. Id replaced</a:t>
+            </a:r>
+            <a:r>
+              <a:rPr lang="en-US" baseline="0" dirty="0" smtClean="0"/>
+              <a:t> by classic asp-</a:t>
+            </a:r>
+            <a:r>
+              <a:rPr lang="en-US" baseline="0" dirty="0" err="1" smtClean="0"/>
+              <a:t>ish</a:t>
+            </a:r>
+            <a:r>
+              <a:rPr lang="en-US" baseline="0" dirty="0" smtClean="0"/>
+              <a:t> code</a:t>
+            </a:r>
+          </a:p>
+          <a:p>
+            <a:pPr marL="685800" lvl="1" indent="-228600">
+              <a:buAutoNum type="arabicPeriod"/>
+            </a:pPr>
+            <a:r>
+              <a:rPr lang="en-US" baseline="0" dirty="0" smtClean="0"/>
+              <a:t>Will work, but magic strings everywhere</a:t>
+            </a:r>
+          </a:p>
+          <a:p>
+            <a:pPr marL="685800" lvl="1" indent="-228600">
+              <a:buAutoNum type="arabicPeriod"/>
+            </a:pPr>
+            <a:r>
+              <a:rPr lang="en-US" baseline="0" dirty="0" smtClean="0"/>
+              <a:t>If your controller changes, refactoring here will be uncovered at runtime</a:t>
             </a:r>
           </a:p>
           <a:p>
@@ -832,12 +804,17 @@
               <a:buAutoNum type="arabicPeriod"/>
             </a:pPr>
             <a:r>
-              <a:rPr lang="en-US" dirty="0" smtClean="0"/>
-              <a:t>Filter</a:t>
-            </a:r>
-            <a:r>
               <a:rPr lang="en-US" baseline="0" dirty="0" smtClean="0"/>
-              <a:t> Attribute</a:t>
+              <a:t>Better way, as controller is implied. (Unless needed to move to a different controller)</a:t>
+            </a:r>
+          </a:p>
+          <a:p>
+            <a:pPr marL="685800" lvl="1" indent="-228600">
+              <a:buAutoNum type="arabicPeriod"/>
+            </a:pPr>
+            <a:r>
+              <a:rPr lang="en-US" baseline="0" dirty="0" smtClean="0"/>
+              <a:t>Controller changes will again be uncovered at runtime.</a:t>
             </a:r>
           </a:p>
           <a:p>
@@ -846,9 +823,31 @@
             </a:pPr>
             <a:r>
               <a:rPr lang="en-US" baseline="0" dirty="0" smtClean="0"/>
-              <a:t>Add Ajax</a:t>
-            </a:r>
-            <a:endParaRPr lang="en-US" dirty="0"/>
+              <a:t>Best way, the view is strongly typed to the controller. </a:t>
+            </a:r>
+          </a:p>
+          <a:p>
+            <a:pPr marL="685800" lvl="1" indent="-228600">
+              <a:buAutoNum type="arabicPeriod"/>
+            </a:pPr>
+            <a:r>
+              <a:rPr lang="en-US" baseline="0" dirty="0" smtClean="0"/>
+              <a:t>Controller change here will break the build…woo-</a:t>
+            </a:r>
+            <a:r>
+              <a:rPr lang="en-US" baseline="0" dirty="0" err="1" smtClean="0"/>
+              <a:t>hoo</a:t>
+            </a:r>
+            <a:r>
+              <a:rPr lang="en-US" baseline="0" dirty="0" smtClean="0"/>
+              <a:t>! Fail early!</a:t>
+            </a:r>
+          </a:p>
+          <a:p>
+            <a:pPr marL="228600" indent="-228600">
+              <a:buAutoNum type="arabicPeriod"/>
+            </a:pPr>
+            <a:endParaRPr lang="en-US" baseline="0" dirty="0" smtClean="0"/>
           </a:p>
         </p:txBody>
       </p:sp>
@@ -1074,22 +1073,127 @@
           <a:lstStyle/>
           <a:p>
             <a:r>
-              <a:rPr lang="en-US" dirty="0" smtClean="0"/>
-              <a:t>Expand on routing</a:t>
-            </a:r>
-          </a:p>
-          <a:p>
-            <a:r>
-              <a:rPr lang="en-US" dirty="0" smtClean="0"/>
-              <a:t>Find kittens</a:t>
-            </a:r>
-          </a:p>
-          <a:p>
-            <a:r>
-              <a:rPr lang="en-US" dirty="0" smtClean="0"/>
-              <a:t>Explain server controls…can use, not needed. Postback gone</a:t>
-            </a:r>
-            <a:endParaRPr lang="en-US" dirty="0"/>
+              <a:rPr lang="en-US" sz="1200" dirty="0" smtClean="0"/>
+              <a:t>What do you get out of the box?</a:t>
+            </a:r>
+          </a:p>
+          <a:p>
+            <a:pPr marL="228600" indent="-228600">
+              <a:buAutoNum type="arabicPeriod"/>
+            </a:pPr>
+            <a:r>
+              <a:rPr lang="en-US" sz="1200" baseline="0" dirty="0" smtClean="0"/>
+              <a:t>Working Sample App</a:t>
+            </a:r>
+          </a:p>
+          <a:p>
+            <a:pPr marL="685800" lvl="1" indent="-228600">
+              <a:buAutoNum type="arabicPeriod"/>
+            </a:pPr>
+            <a:r>
+              <a:rPr lang="en-US" sz="1200" baseline="0" dirty="0" smtClean="0"/>
+              <a:t>Default Routing</a:t>
+            </a:r>
+          </a:p>
+          <a:p>
+            <a:pPr marL="685800" lvl="1" indent="-228600">
+              <a:buAutoNum type="arabicPeriod"/>
+            </a:pPr>
+            <a:r>
+              <a:rPr lang="en-US" sz="1200" baseline="0" dirty="0" smtClean="0"/>
+              <a:t>Home Controller</a:t>
+            </a:r>
+          </a:p>
+          <a:p>
+            <a:pPr marL="685800" lvl="1" indent="-228600">
+              <a:buAutoNum type="arabicPeriod"/>
+            </a:pPr>
+            <a:r>
+              <a:rPr lang="en-US" sz="1200" baseline="0" dirty="0" smtClean="0"/>
+              <a:t>Home and About Views</a:t>
+            </a:r>
+          </a:p>
+          <a:p>
+            <a:pPr marL="228600" indent="-228600">
+              <a:buAutoNum type="arabicPeriod"/>
+            </a:pPr>
+            <a:r>
+              <a:rPr lang="en-US" sz="1200" baseline="0" dirty="0" err="1" smtClean="0"/>
+              <a:t>WebFormsViewEngine</a:t>
+            </a:r>
+            <a:endParaRPr lang="en-US" sz="1200" baseline="0" dirty="0" smtClean="0"/>
+          </a:p>
+          <a:p>
+            <a:pPr marL="228600" indent="-228600">
+              <a:buAutoNum type="arabicPeriod"/>
+            </a:pPr>
+            <a:r>
+              <a:rPr lang="en-US" sz="1200" baseline="0" dirty="0" smtClean="0"/>
+              <a:t>Test Project</a:t>
+            </a:r>
+          </a:p>
+          <a:p>
+            <a:endParaRPr lang="en-US" sz="1200" baseline="0" dirty="0" smtClean="0"/>
+          </a:p>
+          <a:p>
+            <a:r>
+              <a:rPr lang="en-US" sz="1200" baseline="0" dirty="0" smtClean="0"/>
+              <a:t>What’s Going on?</a:t>
+            </a:r>
+          </a:p>
+          <a:p>
+            <a:pPr marL="228600" indent="-228600">
+              <a:buAutoNum type="arabicPeriod"/>
+            </a:pPr>
+            <a:r>
+              <a:rPr lang="en-US" sz="1200" baseline="0" dirty="0" smtClean="0"/>
+              <a:t>Browser makes request (use Products)</a:t>
+            </a:r>
+          </a:p>
+          <a:p>
+            <a:pPr marL="228600" indent="-228600">
+              <a:buAutoNum type="arabicPeriod"/>
+            </a:pPr>
+            <a:r>
+              <a:rPr lang="en-US" sz="1200" baseline="0" dirty="0" smtClean="0"/>
+              <a:t>Route is determined</a:t>
+            </a:r>
+          </a:p>
+          <a:p>
+            <a:pPr marL="228600" indent="-228600">
+              <a:buAutoNum type="arabicPeriod"/>
+            </a:pPr>
+            <a:r>
+              <a:rPr lang="en-US" sz="1200" baseline="0" dirty="0" smtClean="0"/>
+              <a:t>Controller Activated</a:t>
+            </a:r>
+          </a:p>
+          <a:p>
+            <a:pPr marL="685800" lvl="1" indent="-228600">
+              <a:buAutoNum type="arabicPeriod"/>
+            </a:pPr>
+            <a:r>
+              <a:rPr lang="en-US" sz="1200" baseline="0" dirty="0" smtClean="0"/>
+              <a:t>Gets data from Model</a:t>
+            </a:r>
+          </a:p>
+          <a:p>
+            <a:pPr marL="685800" lvl="1" indent="-228600">
+              <a:buAutoNum type="arabicPeriod"/>
+            </a:pPr>
+            <a:r>
+              <a:rPr lang="en-US" sz="1200" baseline="0" dirty="0" smtClean="0"/>
+              <a:t>Determines View</a:t>
+            </a:r>
+          </a:p>
+          <a:p>
+            <a:pPr marL="228600" lvl="0" indent="-228600">
+              <a:buAutoNum type="arabicPeriod"/>
+            </a:pPr>
+            <a:r>
+              <a:rPr lang="en-US" sz="1200" baseline="0" dirty="0" smtClean="0"/>
+              <a:t>Renders View</a:t>
+            </a:r>
           </a:p>
         </p:txBody>
       </p:sp>
@@ -1171,45 +1275,12 @@
           </a:bodyPr>
           <a:lstStyle/>
           <a:p>
-            <a:r>
-              <a:rPr lang="en-US" sz="1200" dirty="0" smtClean="0"/>
-              <a:t>What do you get out of the box?</a:t>
-            </a:r>
-          </a:p>
-          <a:p>
             <a:pPr marL="228600" indent="-228600">
               <a:buAutoNum type="arabicPeriod"/>
             </a:pPr>
             <a:r>
-              <a:rPr lang="en-US" sz="1200" baseline="0" dirty="0" smtClean="0"/>
-              <a:t>Working Sample App</a:t>
-            </a:r>
-          </a:p>
-          <a:p>
-            <a:pPr marL="685800" lvl="1" indent="-228600">
-              <a:buAutoNum type="arabicPeriod"/>
-            </a:pPr>
-            <a:r>
-              <a:rPr lang="en-US" sz="1200" baseline="0" dirty="0" smtClean="0"/>
-              <a:t>Default Routing</a:t>
-            </a:r>
-          </a:p>
-          <a:p>
-            <a:pPr marL="685800" lvl="1" indent="-228600">
-              <a:buAutoNum type="arabicPeriod"/>
-            </a:pPr>
-            <a:r>
-              <a:rPr lang="en-US" sz="1200" baseline="0" dirty="0" smtClean="0"/>
-              <a:t>Home Controller</a:t>
-            </a:r>
-          </a:p>
-          <a:p>
-            <a:pPr marL="685800" lvl="1" indent="-228600">
-              <a:buAutoNum type="arabicPeriod"/>
-            </a:pPr>
-            <a:r>
-              <a:rPr lang="en-US" sz="1200" baseline="0" dirty="0" smtClean="0"/>
-              <a:t>Home and About Views</a:t>
+              <a:rPr lang="en-US" dirty="0" smtClean="0"/>
+              <a:t>New app</a:t>
             </a:r>
           </a:p>
           <a:p>
@@ -1217,82 +1288,14 @@
               <a:buAutoNum type="arabicPeriod"/>
             </a:pPr>
             <a:r>
-              <a:rPr lang="en-US" sz="1200" baseline="0" dirty="0" err="1" smtClean="0"/>
-              <a:t>WebFormsViewEngine</a:t>
-            </a:r>
-            <a:endParaRPr lang="en-US" sz="1200" baseline="0" dirty="0" smtClean="0"/>
-          </a:p>
-          <a:p>
-            <a:pPr marL="228600" indent="-228600">
-              <a:buAutoNum type="arabicPeriod"/>
-            </a:pPr>
-            <a:r>
-              <a:rPr lang="en-US" sz="1200" baseline="0" dirty="0" smtClean="0"/>
-              <a:t>Test Project</a:t>
-            </a:r>
-          </a:p>
-          <a:p>
-            <a:endParaRPr lang="en-US" sz="1200" baseline="0" dirty="0" smtClean="0"/>
-          </a:p>
-          <a:p>
-            <a:r>
-              <a:rPr lang="en-US" sz="1200" baseline="0" dirty="0" smtClean="0"/>
-              <a:t>What’s Going on?</a:t>
-            </a:r>
-          </a:p>
-          <a:p>
-            <a:pPr marL="228600" indent="-228600">
-              <a:buAutoNum type="arabicPeriod"/>
-            </a:pPr>
-            <a:r>
-              <a:rPr lang="en-US" sz="1200" baseline="0" dirty="0" smtClean="0"/>
-              <a:t>Browser makes request (use Products)</a:t>
-            </a:r>
-          </a:p>
-          <a:p>
-            <a:pPr marL="228600" indent="-228600">
-              <a:buAutoNum type="arabicPeriod"/>
-            </a:pPr>
-            <a:r>
-              <a:rPr lang="en-US" sz="1200" baseline="0" dirty="0" smtClean="0"/>
-              <a:t>Route is determined</a:t>
-            </a:r>
-          </a:p>
-          <a:p>
-            <a:pPr marL="228600" indent="-228600">
-              <a:buAutoNum type="arabicPeriod"/>
-            </a:pPr>
-            <a:r>
-              <a:rPr lang="en-US" sz="1200" baseline="0" dirty="0" smtClean="0"/>
-              <a:t>Controller Activated</a:t>
-            </a:r>
-          </a:p>
-          <a:p>
-            <a:pPr marL="685800" lvl="1" indent="-228600">
-              <a:buAutoNum type="arabicPeriod"/>
-            </a:pPr>
-            <a:r>
-              <a:rPr lang="en-US" sz="1200" baseline="0" dirty="0" smtClean="0"/>
-              <a:t>Gets data from Model</a:t>
-            </a:r>
-          </a:p>
-          <a:p>
-            <a:pPr marL="685800" lvl="1" indent="-228600">
-              <a:buAutoNum type="arabicPeriod"/>
-            </a:pPr>
-            <a:r>
-              <a:rPr lang="en-US" sz="1200" baseline="0" dirty="0" smtClean="0"/>
-              <a:t>Determines View</a:t>
-            </a:r>
-          </a:p>
-          <a:p>
-            <a:pPr marL="228600" lvl="0" indent="-228600">
-              <a:buAutoNum type="arabicPeriod"/>
-            </a:pPr>
-            <a:r>
-              <a:rPr lang="en-US" sz="1200" baseline="0" dirty="0" smtClean="0"/>
-              <a:t>Renders View</a:t>
-            </a:r>
+              <a:rPr lang="en-US" dirty="0" smtClean="0"/>
+              <a:t>Demo</a:t>
+            </a:r>
+            <a:r>
+              <a:rPr lang="en-US" baseline="0" dirty="0" smtClean="0"/>
+              <a:t> app</a:t>
+            </a:r>
+            <a:endParaRPr lang="en-US" dirty="0"/>
           </a:p>
         </p:txBody>
       </p:sp>
@@ -1374,26 +1377,6 @@
           </a:bodyPr>
           <a:lstStyle/>
           <a:p>
-            <a:pPr marL="228600" indent="-228600">
-              <a:buAutoNum type="arabicPeriod"/>
-            </a:pPr>
-            <a:r>
-              <a:rPr lang="en-US" dirty="0" smtClean="0"/>
-              <a:t>New app</a:t>
-            </a:r>
-          </a:p>
-          <a:p>
-            <a:pPr marL="228600" indent="-228600">
-              <a:buAutoNum type="arabicPeriod"/>
-            </a:pPr>
-            <a:r>
-              <a:rPr lang="en-US" dirty="0" smtClean="0"/>
-              <a:t>Demo</a:t>
-            </a:r>
-            <a:r>
-              <a:rPr lang="en-US" baseline="0" dirty="0" smtClean="0"/>
-              <a:t> app</a:t>
-            </a:r>
             <a:endParaRPr lang="en-US" dirty="0"/>
           </a:p>
         </p:txBody>
@@ -1417,88 +1400,6 @@
               <a:rPr lang="en-US" smtClean="0"/>
               <a:pPr/>
               <a:t>16</a:t>
-            </a:fld>
-            <a:endParaRPr lang="en-US"/>
-          </a:p>
-        </p:txBody>
-      </p:sp>
-    </p:spTree>
-  </p:cSld>
-  <p:clrMapOvr>
-    <a:masterClrMapping/>
-  </p:clrMapOvr>
-</p:notes>
-</file>
-
-<file path=ppt/notesSlides/notesSlide16.xml><?xml version="1.0" encoding="utf-8"?>
-<p:notes xmlns:a="http://schemas.openxmlformats.org/drawingml/2006/main" xmlns:r="http://schemas.openxmlformats.org/officeDocument/2006/relationships" xmlns:p="http://schemas.openxmlformats.org/presentationml/2006/main">
-  <p:cSld>
-    <p:spTree>
-      <p:nvGrpSpPr>
-        <p:cNvPr id="1" name=""/>
-        <p:cNvGrpSpPr/>
-        <p:nvPr/>
-      </p:nvGrpSpPr>
-      <p:grpSpPr>
-        <a:xfrm>
-          <a:off x="0" y="0"/>
-          <a:ext cx="0" cy="0"/>
-          <a:chOff x="0" y="0"/>
-          <a:chExt cx="0" cy="0"/>
-        </a:xfrm>
-      </p:grpSpPr>
-      <p:sp>
-        <p:nvSpPr>
-          <p:cNvPr id="2" name="Slide Image Placeholder 1"/>
-          <p:cNvSpPr>
-            <a:spLocks noGrp="1" noRot="1" noChangeAspect="1"/>
-          </p:cNvSpPr>
-          <p:nvPr>
-            <p:ph type="sldImg"/>
-          </p:nvPr>
-        </p:nvSpPr>
-        <p:spPr/>
-      </p:sp>
-      <p:sp>
-        <p:nvSpPr>
-          <p:cNvPr id="3" name="Notes Placeholder 2"/>
-          <p:cNvSpPr>
-            <a:spLocks noGrp="1"/>
-          </p:cNvSpPr>
-          <p:nvPr>
-            <p:ph type="body" idx="1"/>
-          </p:nvPr>
-        </p:nvSpPr>
-        <p:spPr/>
-        <p:txBody>
-          <a:bodyPr>
-            <a:normAutofit/>
-          </a:bodyPr>
-          <a:lstStyle/>
-          <a:p>
-            <a:endParaRPr lang="en-US" dirty="0"/>
-          </a:p>
-        </p:txBody>
-      </p:sp>
-      <p:sp>
-        <p:nvSpPr>
-          <p:cNvPr id="4" name="Slide Number Placeholder 3"/>
-          <p:cNvSpPr>
-            <a:spLocks noGrp="1"/>
-          </p:cNvSpPr>
-          <p:nvPr>
-            <p:ph type="sldNum" sz="quarter" idx="10"/>
-          </p:nvPr>
-        </p:nvSpPr>
-        <p:spPr/>
-        <p:txBody>
-          <a:bodyPr/>
-          <a:lstStyle/>
-          <a:p>
-            <a:fld id="{F8007F4E-10F5-4104-9EF8-E98D370060A3}" type="slidenum">
-              <a:rPr lang="en-US" smtClean="0"/>
-              <a:pPr/>
-              <a:t>17</a:t>
             </a:fld>
             <a:endParaRPr lang="en-US"/>
           </a:p>
@@ -9598,549 +9499,6 @@
           <a:p>
             <a:r>
               <a:rPr lang="en-US" dirty="0" smtClean="0"/>
-              <a:t>You have options</a:t>
-            </a:r>
-            <a:endParaRPr lang="en-US" dirty="0"/>
-          </a:p>
-        </p:txBody>
-      </p:sp>
-      <p:sp>
-        <p:nvSpPr>
-          <p:cNvPr id="4" name="TextBox 3"/>
-          <p:cNvSpPr txBox="1"/>
-          <p:nvPr/>
-        </p:nvSpPr>
-        <p:spPr>
-          <a:xfrm>
-            <a:off x="685800" y="1371600"/>
-            <a:ext cx="5161991" cy="1200329"/>
-          </a:xfrm>
-          <a:prstGeom prst="rect">
-            <a:avLst/>
-          </a:prstGeom>
-          <a:noFill/>
-        </p:spPr>
-        <p:txBody>
-          <a:bodyPr wrap="none" rtlCol="0">
-            <a:spAutoFit/>
-          </a:bodyPr>
-          <a:lstStyle/>
-          <a:p>
-            <a:r>
-              <a:rPr lang="en-US" sz="2400" b="1" dirty="0" smtClean="0">
-                <a:latin typeface="Courier New" pitchFamily="49" charset="0"/>
-                <a:cs typeface="Courier New" pitchFamily="49" charset="0"/>
-              </a:rPr>
-              <a:t>&lt;a </a:t>
-            </a:r>
-            <a:r>
-              <a:rPr lang="en-US" sz="2400" b="1" dirty="0" err="1" smtClean="0">
-                <a:latin typeface="Courier New" pitchFamily="49" charset="0"/>
-                <a:cs typeface="Courier New" pitchFamily="49" charset="0"/>
-              </a:rPr>
-              <a:t>href</a:t>
-            </a:r>
-            <a:r>
-              <a:rPr lang="en-US" sz="2400" b="1" dirty="0" smtClean="0">
-                <a:latin typeface="Courier New" pitchFamily="49" charset="0"/>
-                <a:cs typeface="Courier New" pitchFamily="49" charset="0"/>
-              </a:rPr>
-              <a:t>=“/Product/View/12”&gt;</a:t>
-            </a:r>
-          </a:p>
-          <a:p>
-            <a:r>
-              <a:rPr lang="en-US" sz="2400" b="1" dirty="0" smtClean="0">
-                <a:latin typeface="Courier New" pitchFamily="49" charset="0"/>
-                <a:cs typeface="Courier New" pitchFamily="49" charset="0"/>
-              </a:rPr>
-              <a:t>	</a:t>
-            </a:r>
-            <a:r>
-              <a:rPr lang="en-US" sz="2400" b="1" dirty="0" smtClean="0">
-                <a:latin typeface="Courier New" pitchFamily="49" charset="0"/>
-                <a:cs typeface="Courier New" pitchFamily="49" charset="0"/>
-              </a:rPr>
-              <a:t>View Product</a:t>
-            </a:r>
-          </a:p>
-          <a:p>
-            <a:r>
-              <a:rPr lang="en-US" sz="2400" b="1" dirty="0" smtClean="0">
-                <a:latin typeface="Courier New" pitchFamily="49" charset="0"/>
-                <a:cs typeface="Courier New" pitchFamily="49" charset="0"/>
-              </a:rPr>
-              <a:t>&lt;/a&gt;</a:t>
-            </a:r>
-            <a:endParaRPr lang="en-US" sz="2400" b="1" dirty="0">
-              <a:latin typeface="Courier New" pitchFamily="49" charset="0"/>
-              <a:cs typeface="Courier New" pitchFamily="49" charset="0"/>
-            </a:endParaRPr>
-          </a:p>
-        </p:txBody>
-      </p:sp>
-      <p:sp>
-        <p:nvSpPr>
-          <p:cNvPr id="5" name="TextBox 4"/>
-          <p:cNvSpPr txBox="1"/>
-          <p:nvPr/>
-        </p:nvSpPr>
-        <p:spPr>
-          <a:xfrm>
-            <a:off x="685800" y="3154740"/>
-            <a:ext cx="6821098" cy="1200329"/>
-          </a:xfrm>
-          <a:prstGeom prst="rect">
-            <a:avLst/>
-          </a:prstGeom>
-          <a:noFill/>
-        </p:spPr>
-        <p:txBody>
-          <a:bodyPr wrap="none" rtlCol="0">
-            <a:spAutoFit/>
-          </a:bodyPr>
-          <a:lstStyle/>
-          <a:p>
-            <a:r>
-              <a:rPr lang="en-US" sz="2400" b="1" dirty="0" smtClean="0">
-                <a:latin typeface="Courier New" pitchFamily="49" charset="0"/>
-                <a:cs typeface="Courier New" pitchFamily="49" charset="0"/>
-              </a:rPr>
-              <a:t>&lt;%= </a:t>
-            </a:r>
-            <a:r>
-              <a:rPr lang="en-US" sz="2400" b="1" dirty="0" err="1" smtClean="0">
-                <a:latin typeface="Courier New" pitchFamily="49" charset="0"/>
-                <a:cs typeface="Courier New" pitchFamily="49" charset="0"/>
-              </a:rPr>
-              <a:t>Html.ActionLink</a:t>
-            </a:r>
-            <a:r>
-              <a:rPr lang="en-US" sz="2400" b="1" dirty="0" smtClean="0">
-                <a:latin typeface="Courier New" pitchFamily="49" charset="0"/>
-                <a:cs typeface="Courier New" pitchFamily="49" charset="0"/>
-              </a:rPr>
-              <a:t>(“View Product”, </a:t>
-            </a:r>
-          </a:p>
-          <a:p>
-            <a:r>
-              <a:rPr lang="en-US" sz="2400" b="1" dirty="0" smtClean="0">
-                <a:latin typeface="Courier New" pitchFamily="49" charset="0"/>
-                <a:cs typeface="Courier New" pitchFamily="49" charset="0"/>
-              </a:rPr>
-              <a:t>	</a:t>
-            </a:r>
-            <a:r>
-              <a:rPr lang="en-US" sz="2400" b="1" dirty="0" smtClean="0">
-                <a:latin typeface="Courier New" pitchFamily="49" charset="0"/>
-                <a:cs typeface="Courier New" pitchFamily="49" charset="0"/>
-              </a:rPr>
-              <a:t>“View”, </a:t>
-            </a:r>
-          </a:p>
-          <a:p>
-            <a:r>
-              <a:rPr lang="en-US" sz="2400" b="1" dirty="0" smtClean="0">
-                <a:latin typeface="Courier New" pitchFamily="49" charset="0"/>
-                <a:cs typeface="Courier New" pitchFamily="49" charset="0"/>
-              </a:rPr>
-              <a:t>	</a:t>
-            </a:r>
-            <a:r>
-              <a:rPr lang="en-US" sz="2400" b="1" dirty="0" smtClean="0">
-                <a:latin typeface="Courier New" pitchFamily="49" charset="0"/>
-                <a:cs typeface="Courier New" pitchFamily="49" charset="0"/>
-              </a:rPr>
-              <a:t>new { id=12} ) %&gt;</a:t>
-            </a:r>
-            <a:endParaRPr lang="en-US" sz="2400" b="1" dirty="0">
-              <a:latin typeface="Courier New" pitchFamily="49" charset="0"/>
-              <a:cs typeface="Courier New" pitchFamily="49" charset="0"/>
-            </a:endParaRPr>
-          </a:p>
-        </p:txBody>
-      </p:sp>
-      <p:sp>
-        <p:nvSpPr>
-          <p:cNvPr id="6" name="TextBox 5"/>
-          <p:cNvSpPr txBox="1"/>
-          <p:nvPr/>
-        </p:nvSpPr>
-        <p:spPr>
-          <a:xfrm>
-            <a:off x="762000" y="5105400"/>
-            <a:ext cx="7744428" cy="830997"/>
-          </a:xfrm>
-          <a:prstGeom prst="rect">
-            <a:avLst/>
-          </a:prstGeom>
-          <a:noFill/>
-        </p:spPr>
-        <p:txBody>
-          <a:bodyPr wrap="none" rtlCol="0">
-            <a:spAutoFit/>
-          </a:bodyPr>
-          <a:lstStyle/>
-          <a:p>
-            <a:r>
-              <a:rPr lang="en-US" sz="2400" b="1" dirty="0" smtClean="0">
-                <a:latin typeface="Courier New" pitchFamily="49" charset="0"/>
-                <a:cs typeface="Courier New" pitchFamily="49" charset="0"/>
-              </a:rPr>
-              <a:t>&lt;%= </a:t>
-            </a:r>
-            <a:r>
-              <a:rPr lang="en-US" sz="2400" b="1" dirty="0" err="1" smtClean="0">
-                <a:latin typeface="Courier New" pitchFamily="49" charset="0"/>
-                <a:cs typeface="Courier New" pitchFamily="49" charset="0"/>
-              </a:rPr>
-              <a:t>Html.ActionLink</a:t>
-            </a:r>
-            <a:r>
-              <a:rPr lang="en-US" sz="2400" b="1" dirty="0" smtClean="0">
-                <a:latin typeface="Courier New" pitchFamily="49" charset="0"/>
-                <a:cs typeface="Courier New" pitchFamily="49" charset="0"/>
-              </a:rPr>
-              <a:t>&lt;Product&gt;</a:t>
-            </a:r>
-          </a:p>
-          <a:p>
-            <a:r>
-              <a:rPr lang="en-US" sz="2400" b="1" dirty="0" smtClean="0">
-                <a:latin typeface="Courier New" pitchFamily="49" charset="0"/>
-                <a:cs typeface="Courier New" pitchFamily="49" charset="0"/>
-              </a:rPr>
-              <a:t>	</a:t>
-            </a:r>
-            <a:r>
-              <a:rPr lang="en-US" sz="2400" b="1" dirty="0" smtClean="0">
-                <a:latin typeface="Courier New" pitchFamily="49" charset="0"/>
-                <a:cs typeface="Courier New" pitchFamily="49" charset="0"/>
-              </a:rPr>
-              <a:t>(c =&gt; </a:t>
-            </a:r>
-            <a:r>
-              <a:rPr lang="en-US" sz="2400" b="1" dirty="0" err="1" smtClean="0">
-                <a:latin typeface="Courier New" pitchFamily="49" charset="0"/>
-                <a:cs typeface="Courier New" pitchFamily="49" charset="0"/>
-              </a:rPr>
-              <a:t>c.View</a:t>
-            </a:r>
-            <a:r>
-              <a:rPr lang="en-US" sz="2400" b="1" dirty="0" smtClean="0">
-                <a:latin typeface="Courier New" pitchFamily="49" charset="0"/>
-                <a:cs typeface="Courier New" pitchFamily="49" charset="0"/>
-              </a:rPr>
-              <a:t>(12), “View Product”) %&gt;</a:t>
-            </a:r>
-            <a:endParaRPr lang="en-US" sz="2400" b="1" dirty="0">
-              <a:latin typeface="Courier New" pitchFamily="49" charset="0"/>
-              <a:cs typeface="Courier New" pitchFamily="49" charset="0"/>
-            </a:endParaRPr>
-          </a:p>
-        </p:txBody>
-      </p:sp>
-    </p:spTree>
-  </p:cSld>
-  <p:clrMapOvr>
-    <a:masterClrMapping/>
-  </p:clrMapOvr>
-  <p:timing>
-    <p:tnLst>
-      <p:par>
-        <p:cTn id="1" dur="indefinite" restart="never" nodeType="tmRoot">
-          <p:childTnLst>
-            <p:seq concurrent="1" nextAc="seek">
-              <p:cTn id="2" dur="indefinite" nodeType="mainSeq">
-                <p:childTnLst>
-                  <p:par>
-                    <p:cTn id="3" fill="hold">
-                      <p:stCondLst>
-                        <p:cond delay="indefinite"/>
-                      </p:stCondLst>
-                      <p:childTnLst>
-                        <p:par>
-                          <p:cTn id="4" fill="hold">
-                            <p:stCondLst>
-                              <p:cond delay="0"/>
-                            </p:stCondLst>
-                            <p:childTnLst>
-                              <p:par>
-                                <p:cTn id="5" presetID="10" presetClass="entr" presetSubtype="0" fill="hold" grpId="0" nodeType="clickEffect">
-                                  <p:stCondLst>
-                                    <p:cond delay="0"/>
-                                  </p:stCondLst>
-                                  <p:childTnLst>
-                                    <p:set>
-                                      <p:cBhvr>
-                                        <p:cTn id="6" dur="1" fill="hold">
-                                          <p:stCondLst>
-                                            <p:cond delay="0"/>
-                                          </p:stCondLst>
-                                        </p:cTn>
-                                        <p:tgtEl>
-                                          <p:spTgt spid="4"/>
-                                        </p:tgtEl>
-                                        <p:attrNameLst>
-                                          <p:attrName>style.visibility</p:attrName>
-                                        </p:attrNameLst>
-                                      </p:cBhvr>
-                                      <p:to>
-                                        <p:strVal val="visible"/>
-                                      </p:to>
-                                    </p:set>
-                                    <p:animEffect transition="in" filter="fade">
-                                      <p:cBhvr>
-                                        <p:cTn id="7" dur="2000"/>
-                                        <p:tgtEl>
-                                          <p:spTgt spid="4"/>
-                                        </p:tgtEl>
-                                      </p:cBhvr>
-                                    </p:animEffect>
-                                  </p:childTnLst>
-                                </p:cTn>
-                              </p:par>
-                            </p:childTnLst>
-                          </p:cTn>
-                        </p:par>
-                      </p:childTnLst>
-                    </p:cTn>
-                  </p:par>
-                  <p:par>
-                    <p:cTn id="8" fill="hold">
-                      <p:stCondLst>
-                        <p:cond delay="indefinite"/>
-                      </p:stCondLst>
-                      <p:childTnLst>
-                        <p:par>
-                          <p:cTn id="9" fill="hold">
-                            <p:stCondLst>
-                              <p:cond delay="0"/>
-                            </p:stCondLst>
-                            <p:childTnLst>
-                              <p:par>
-                                <p:cTn id="10" presetID="10" presetClass="entr" presetSubtype="0" fill="hold" grpId="0" nodeType="clickEffect">
-                                  <p:stCondLst>
-                                    <p:cond delay="0"/>
-                                  </p:stCondLst>
-                                  <p:childTnLst>
-                                    <p:set>
-                                      <p:cBhvr>
-                                        <p:cTn id="11" dur="1" fill="hold">
-                                          <p:stCondLst>
-                                            <p:cond delay="0"/>
-                                          </p:stCondLst>
-                                        </p:cTn>
-                                        <p:tgtEl>
-                                          <p:spTgt spid="5"/>
-                                        </p:tgtEl>
-                                        <p:attrNameLst>
-                                          <p:attrName>style.visibility</p:attrName>
-                                        </p:attrNameLst>
-                                      </p:cBhvr>
-                                      <p:to>
-                                        <p:strVal val="visible"/>
-                                      </p:to>
-                                    </p:set>
-                                    <p:animEffect transition="in" filter="fade">
-                                      <p:cBhvr>
-                                        <p:cTn id="12" dur="2000"/>
-                                        <p:tgtEl>
-                                          <p:spTgt spid="5"/>
-                                        </p:tgtEl>
-                                      </p:cBhvr>
-                                    </p:animEffect>
-                                  </p:childTnLst>
-                                </p:cTn>
-                              </p:par>
-                              <p:par>
-                                <p:cTn id="13" presetID="9" presetClass="emph" presetSubtype="0" grpId="1" nodeType="withEffect">
-                                  <p:stCondLst>
-                                    <p:cond delay="0"/>
-                                  </p:stCondLst>
-                                  <p:childTnLst>
-                                    <p:set>
-                                      <p:cBhvr rctx="PPT">
-                                        <p:cTn id="14" dur="indefinite"/>
-                                        <p:tgtEl>
-                                          <p:spTgt spid="4"/>
-                                        </p:tgtEl>
-                                        <p:attrNameLst>
-                                          <p:attrName>style.opacity</p:attrName>
-                                        </p:attrNameLst>
-                                      </p:cBhvr>
-                                      <p:to>
-                                        <p:strVal val="0.25"/>
-                                      </p:to>
-                                    </p:set>
-                                    <p:animEffect filter="image" prLst="opacity: 0.25">
-                                      <p:cBhvr rctx="IE">
-                                        <p:cTn id="15" dur="indefinite"/>
-                                        <p:tgtEl>
-                                          <p:spTgt spid="4"/>
-                                        </p:tgtEl>
-                                      </p:cBhvr>
-                                    </p:animEffect>
-                                  </p:childTnLst>
-                                </p:cTn>
-                              </p:par>
-                            </p:childTnLst>
-                          </p:cTn>
-                        </p:par>
-                      </p:childTnLst>
-                    </p:cTn>
-                  </p:par>
-                  <p:par>
-                    <p:cTn id="16" fill="hold">
-                      <p:stCondLst>
-                        <p:cond delay="indefinite"/>
-                      </p:stCondLst>
-                      <p:childTnLst>
-                        <p:par>
-                          <p:cTn id="17" fill="hold">
-                            <p:stCondLst>
-                              <p:cond delay="0"/>
-                            </p:stCondLst>
-                            <p:childTnLst>
-                              <p:par>
-                                <p:cTn id="18" presetID="10" presetClass="entr" presetSubtype="0" fill="hold" grpId="0" nodeType="clickEffect">
-                                  <p:stCondLst>
-                                    <p:cond delay="0"/>
-                                  </p:stCondLst>
-                                  <p:childTnLst>
-                                    <p:set>
-                                      <p:cBhvr>
-                                        <p:cTn id="19" dur="1" fill="hold">
-                                          <p:stCondLst>
-                                            <p:cond delay="0"/>
-                                          </p:stCondLst>
-                                        </p:cTn>
-                                        <p:tgtEl>
-                                          <p:spTgt spid="6"/>
-                                        </p:tgtEl>
-                                        <p:attrNameLst>
-                                          <p:attrName>style.visibility</p:attrName>
-                                        </p:attrNameLst>
-                                      </p:cBhvr>
-                                      <p:to>
-                                        <p:strVal val="visible"/>
-                                      </p:to>
-                                    </p:set>
-                                    <p:animEffect transition="in" filter="fade">
-                                      <p:cBhvr>
-                                        <p:cTn id="20" dur="2000"/>
-                                        <p:tgtEl>
-                                          <p:spTgt spid="6"/>
-                                        </p:tgtEl>
-                                      </p:cBhvr>
-                                    </p:animEffect>
-                                  </p:childTnLst>
-                                </p:cTn>
-                              </p:par>
-                              <p:par>
-                                <p:cTn id="21" presetID="9" presetClass="emph" presetSubtype="0" grpId="1" nodeType="withEffect">
-                                  <p:stCondLst>
-                                    <p:cond delay="0"/>
-                                  </p:stCondLst>
-                                  <p:childTnLst>
-                                    <p:set>
-                                      <p:cBhvr rctx="PPT">
-                                        <p:cTn id="22" dur="indefinite"/>
-                                        <p:tgtEl>
-                                          <p:spTgt spid="5"/>
-                                        </p:tgtEl>
-                                        <p:attrNameLst>
-                                          <p:attrName>style.opacity</p:attrName>
-                                        </p:attrNameLst>
-                                      </p:cBhvr>
-                                      <p:to>
-                                        <p:strVal val="0.25"/>
-                                      </p:to>
-                                    </p:set>
-                                    <p:animEffect filter="image" prLst="opacity: 0.25">
-                                      <p:cBhvr rctx="IE">
-                                        <p:cTn id="23" dur="indefinite"/>
-                                        <p:tgtEl>
-                                          <p:spTgt spid="5"/>
-                                        </p:tgtEl>
-                                      </p:cBhvr>
-                                    </p:animEffect>
-                                  </p:childTnLst>
-                                </p:cTn>
-                              </p:par>
-                            </p:childTnLst>
-                          </p:cTn>
-                        </p:par>
-                      </p:childTnLst>
-                    </p:cTn>
-                  </p:par>
-                </p:childTnLst>
-              </p:cTn>
-              <p:prevCondLst>
-                <p:cond evt="onPrev" delay="0">
-                  <p:tgtEl>
-                    <p:sldTgt/>
-                  </p:tgtEl>
-                </p:cond>
-              </p:prevCondLst>
-              <p:nextCondLst>
-                <p:cond evt="onNext" delay="0">
-                  <p:tgtEl>
-                    <p:sldTgt/>
-                  </p:tgtEl>
-                </p:cond>
-              </p:nextCondLst>
-            </p:seq>
-          </p:childTnLst>
-        </p:cTn>
-      </p:par>
-    </p:tnLst>
-    <p:bldLst>
-      <p:bldP spid="4" grpId="0"/>
-      <p:bldP spid="4" grpId="1"/>
-      <p:bldP spid="5" grpId="0"/>
-      <p:bldP spid="5" grpId="1"/>
-      <p:bldP spid="6" grpId="0"/>
-    </p:bldLst>
-  </p:timing>
-</p:sld>
-</file>
-
-<file path=ppt/slides/slide12.xml><?xml version="1.0" encoding="utf-8"?>
-<p:sld xmlns:a="http://schemas.openxmlformats.org/drawingml/2006/main" xmlns:r="http://schemas.openxmlformats.org/officeDocument/2006/relationships" xmlns:p="http://schemas.openxmlformats.org/presentationml/2006/main" showMasterSp="0">
-  <p:cSld>
-    <p:spTree>
-      <p:nvGrpSpPr>
-        <p:cNvPr id="1" name=""/>
-        <p:cNvGrpSpPr/>
-        <p:nvPr/>
-      </p:nvGrpSpPr>
-      <p:grpSpPr>
-        <a:xfrm>
-          <a:off x="0" y="0"/>
-          <a:ext cx="0" cy="0"/>
-          <a:chOff x="0" y="0"/>
-          <a:chExt cx="0" cy="0"/>
-        </a:xfrm>
-      </p:grpSpPr>
-      <p:sp>
-        <p:nvSpPr>
-          <p:cNvPr id="2" name="Title 1"/>
-          <p:cNvSpPr>
-            <a:spLocks noGrp="1"/>
-          </p:cNvSpPr>
-          <p:nvPr>
-            <p:ph type="title"/>
-          </p:nvPr>
-        </p:nvSpPr>
-        <p:spPr/>
-        <p:txBody>
-          <a:bodyPr/>
-          <a:lstStyle/>
-          <a:p>
-            <a:r>
-              <a:rPr lang="en-US" dirty="0" smtClean="0"/>
               <a:t>Customizable and Extensible</a:t>
             </a:r>
             <a:br>
@@ -10425,6 +9783,549 @@
 </p:sld>
 </file>
 
+<file path=ppt/slides/slide12.xml><?xml version="1.0" encoding="utf-8"?>
+<p:sld xmlns:a="http://schemas.openxmlformats.org/drawingml/2006/main" xmlns:r="http://schemas.openxmlformats.org/officeDocument/2006/relationships" xmlns:p="http://schemas.openxmlformats.org/presentationml/2006/main" showMasterSp="0">
+  <p:cSld>
+    <p:spTree>
+      <p:nvGrpSpPr>
+        <p:cNvPr id="1" name=""/>
+        <p:cNvGrpSpPr/>
+        <p:nvPr/>
+      </p:nvGrpSpPr>
+      <p:grpSpPr>
+        <a:xfrm>
+          <a:off x="0" y="0"/>
+          <a:ext cx="0" cy="0"/>
+          <a:chOff x="0" y="0"/>
+          <a:chExt cx="0" cy="0"/>
+        </a:xfrm>
+      </p:grpSpPr>
+      <p:sp>
+        <p:nvSpPr>
+          <p:cNvPr id="2" name="Title 1"/>
+          <p:cNvSpPr>
+            <a:spLocks noGrp="1"/>
+          </p:cNvSpPr>
+          <p:nvPr>
+            <p:ph type="title"/>
+          </p:nvPr>
+        </p:nvSpPr>
+        <p:spPr/>
+        <p:txBody>
+          <a:bodyPr/>
+          <a:lstStyle/>
+          <a:p>
+            <a:r>
+              <a:rPr lang="en-US" dirty="0" smtClean="0"/>
+              <a:t>You have options</a:t>
+            </a:r>
+            <a:endParaRPr lang="en-US" dirty="0"/>
+          </a:p>
+        </p:txBody>
+      </p:sp>
+      <p:sp>
+        <p:nvSpPr>
+          <p:cNvPr id="4" name="TextBox 3"/>
+          <p:cNvSpPr txBox="1"/>
+          <p:nvPr/>
+        </p:nvSpPr>
+        <p:spPr>
+          <a:xfrm>
+            <a:off x="685800" y="1371600"/>
+            <a:ext cx="5161991" cy="1200329"/>
+          </a:xfrm>
+          <a:prstGeom prst="rect">
+            <a:avLst/>
+          </a:prstGeom>
+          <a:noFill/>
+        </p:spPr>
+        <p:txBody>
+          <a:bodyPr wrap="none" rtlCol="0">
+            <a:spAutoFit/>
+          </a:bodyPr>
+          <a:lstStyle/>
+          <a:p>
+            <a:r>
+              <a:rPr lang="en-US" sz="2400" b="1" dirty="0" smtClean="0">
+                <a:latin typeface="Courier New" pitchFamily="49" charset="0"/>
+                <a:cs typeface="Courier New" pitchFamily="49" charset="0"/>
+              </a:rPr>
+              <a:t>&lt;a </a:t>
+            </a:r>
+            <a:r>
+              <a:rPr lang="en-US" sz="2400" b="1" dirty="0" err="1" smtClean="0">
+                <a:latin typeface="Courier New" pitchFamily="49" charset="0"/>
+                <a:cs typeface="Courier New" pitchFamily="49" charset="0"/>
+              </a:rPr>
+              <a:t>href</a:t>
+            </a:r>
+            <a:r>
+              <a:rPr lang="en-US" sz="2400" b="1" dirty="0" smtClean="0">
+                <a:latin typeface="Courier New" pitchFamily="49" charset="0"/>
+                <a:cs typeface="Courier New" pitchFamily="49" charset="0"/>
+              </a:rPr>
+              <a:t>=“/Product/View/12”&gt;</a:t>
+            </a:r>
+          </a:p>
+          <a:p>
+            <a:r>
+              <a:rPr lang="en-US" sz="2400" b="1" dirty="0" smtClean="0">
+                <a:latin typeface="Courier New" pitchFamily="49" charset="0"/>
+                <a:cs typeface="Courier New" pitchFamily="49" charset="0"/>
+              </a:rPr>
+              <a:t>	</a:t>
+            </a:r>
+            <a:r>
+              <a:rPr lang="en-US" sz="2400" b="1" dirty="0" smtClean="0">
+                <a:latin typeface="Courier New" pitchFamily="49" charset="0"/>
+                <a:cs typeface="Courier New" pitchFamily="49" charset="0"/>
+              </a:rPr>
+              <a:t>View Product</a:t>
+            </a:r>
+          </a:p>
+          <a:p>
+            <a:r>
+              <a:rPr lang="en-US" sz="2400" b="1" dirty="0" smtClean="0">
+                <a:latin typeface="Courier New" pitchFamily="49" charset="0"/>
+                <a:cs typeface="Courier New" pitchFamily="49" charset="0"/>
+              </a:rPr>
+              <a:t>&lt;/a&gt;</a:t>
+            </a:r>
+            <a:endParaRPr lang="en-US" sz="2400" b="1" dirty="0">
+              <a:latin typeface="Courier New" pitchFamily="49" charset="0"/>
+              <a:cs typeface="Courier New" pitchFamily="49" charset="0"/>
+            </a:endParaRPr>
+          </a:p>
+        </p:txBody>
+      </p:sp>
+      <p:sp>
+        <p:nvSpPr>
+          <p:cNvPr id="5" name="TextBox 4"/>
+          <p:cNvSpPr txBox="1"/>
+          <p:nvPr/>
+        </p:nvSpPr>
+        <p:spPr>
+          <a:xfrm>
+            <a:off x="685800" y="3154740"/>
+            <a:ext cx="6821098" cy="1200329"/>
+          </a:xfrm>
+          <a:prstGeom prst="rect">
+            <a:avLst/>
+          </a:prstGeom>
+          <a:noFill/>
+        </p:spPr>
+        <p:txBody>
+          <a:bodyPr wrap="none" rtlCol="0">
+            <a:spAutoFit/>
+          </a:bodyPr>
+          <a:lstStyle/>
+          <a:p>
+            <a:r>
+              <a:rPr lang="en-US" sz="2400" b="1" dirty="0" smtClean="0">
+                <a:latin typeface="Courier New" pitchFamily="49" charset="0"/>
+                <a:cs typeface="Courier New" pitchFamily="49" charset="0"/>
+              </a:rPr>
+              <a:t>&lt;%= </a:t>
+            </a:r>
+            <a:r>
+              <a:rPr lang="en-US" sz="2400" b="1" dirty="0" err="1" smtClean="0">
+                <a:latin typeface="Courier New" pitchFamily="49" charset="0"/>
+                <a:cs typeface="Courier New" pitchFamily="49" charset="0"/>
+              </a:rPr>
+              <a:t>Html.ActionLink</a:t>
+            </a:r>
+            <a:r>
+              <a:rPr lang="en-US" sz="2400" b="1" dirty="0" smtClean="0">
+                <a:latin typeface="Courier New" pitchFamily="49" charset="0"/>
+                <a:cs typeface="Courier New" pitchFamily="49" charset="0"/>
+              </a:rPr>
+              <a:t>(“View Product”, </a:t>
+            </a:r>
+          </a:p>
+          <a:p>
+            <a:r>
+              <a:rPr lang="en-US" sz="2400" b="1" dirty="0" smtClean="0">
+                <a:latin typeface="Courier New" pitchFamily="49" charset="0"/>
+                <a:cs typeface="Courier New" pitchFamily="49" charset="0"/>
+              </a:rPr>
+              <a:t>	</a:t>
+            </a:r>
+            <a:r>
+              <a:rPr lang="en-US" sz="2400" b="1" dirty="0" smtClean="0">
+                <a:latin typeface="Courier New" pitchFamily="49" charset="0"/>
+                <a:cs typeface="Courier New" pitchFamily="49" charset="0"/>
+              </a:rPr>
+              <a:t>“View”, </a:t>
+            </a:r>
+          </a:p>
+          <a:p>
+            <a:r>
+              <a:rPr lang="en-US" sz="2400" b="1" dirty="0" smtClean="0">
+                <a:latin typeface="Courier New" pitchFamily="49" charset="0"/>
+                <a:cs typeface="Courier New" pitchFamily="49" charset="0"/>
+              </a:rPr>
+              <a:t>	</a:t>
+            </a:r>
+            <a:r>
+              <a:rPr lang="en-US" sz="2400" b="1" dirty="0" smtClean="0">
+                <a:latin typeface="Courier New" pitchFamily="49" charset="0"/>
+                <a:cs typeface="Courier New" pitchFamily="49" charset="0"/>
+              </a:rPr>
+              <a:t>new { id=12} ) %&gt;</a:t>
+            </a:r>
+            <a:endParaRPr lang="en-US" sz="2400" b="1" dirty="0">
+              <a:latin typeface="Courier New" pitchFamily="49" charset="0"/>
+              <a:cs typeface="Courier New" pitchFamily="49" charset="0"/>
+            </a:endParaRPr>
+          </a:p>
+        </p:txBody>
+      </p:sp>
+      <p:sp>
+        <p:nvSpPr>
+          <p:cNvPr id="6" name="TextBox 5"/>
+          <p:cNvSpPr txBox="1"/>
+          <p:nvPr/>
+        </p:nvSpPr>
+        <p:spPr>
+          <a:xfrm>
+            <a:off x="762000" y="5105400"/>
+            <a:ext cx="7744428" cy="830997"/>
+          </a:xfrm>
+          <a:prstGeom prst="rect">
+            <a:avLst/>
+          </a:prstGeom>
+          <a:noFill/>
+        </p:spPr>
+        <p:txBody>
+          <a:bodyPr wrap="none" rtlCol="0">
+            <a:spAutoFit/>
+          </a:bodyPr>
+          <a:lstStyle/>
+          <a:p>
+            <a:r>
+              <a:rPr lang="en-US" sz="2400" b="1" dirty="0" smtClean="0">
+                <a:latin typeface="Courier New" pitchFamily="49" charset="0"/>
+                <a:cs typeface="Courier New" pitchFamily="49" charset="0"/>
+              </a:rPr>
+              <a:t>&lt;%= </a:t>
+            </a:r>
+            <a:r>
+              <a:rPr lang="en-US" sz="2400" b="1" dirty="0" err="1" smtClean="0">
+                <a:latin typeface="Courier New" pitchFamily="49" charset="0"/>
+                <a:cs typeface="Courier New" pitchFamily="49" charset="0"/>
+              </a:rPr>
+              <a:t>Html.ActionLink</a:t>
+            </a:r>
+            <a:r>
+              <a:rPr lang="en-US" sz="2400" b="1" dirty="0" smtClean="0">
+                <a:latin typeface="Courier New" pitchFamily="49" charset="0"/>
+                <a:cs typeface="Courier New" pitchFamily="49" charset="0"/>
+              </a:rPr>
+              <a:t>&lt;Product&gt;</a:t>
+            </a:r>
+          </a:p>
+          <a:p>
+            <a:r>
+              <a:rPr lang="en-US" sz="2400" b="1" dirty="0" smtClean="0">
+                <a:latin typeface="Courier New" pitchFamily="49" charset="0"/>
+                <a:cs typeface="Courier New" pitchFamily="49" charset="0"/>
+              </a:rPr>
+              <a:t>	</a:t>
+            </a:r>
+            <a:r>
+              <a:rPr lang="en-US" sz="2400" b="1" dirty="0" smtClean="0">
+                <a:latin typeface="Courier New" pitchFamily="49" charset="0"/>
+                <a:cs typeface="Courier New" pitchFamily="49" charset="0"/>
+              </a:rPr>
+              <a:t>(c =&gt; </a:t>
+            </a:r>
+            <a:r>
+              <a:rPr lang="en-US" sz="2400" b="1" dirty="0" err="1" smtClean="0">
+                <a:latin typeface="Courier New" pitchFamily="49" charset="0"/>
+                <a:cs typeface="Courier New" pitchFamily="49" charset="0"/>
+              </a:rPr>
+              <a:t>c.View</a:t>
+            </a:r>
+            <a:r>
+              <a:rPr lang="en-US" sz="2400" b="1" dirty="0" smtClean="0">
+                <a:latin typeface="Courier New" pitchFamily="49" charset="0"/>
+                <a:cs typeface="Courier New" pitchFamily="49" charset="0"/>
+              </a:rPr>
+              <a:t>(12), “View Product”) %&gt;</a:t>
+            </a:r>
+            <a:endParaRPr lang="en-US" sz="2400" b="1" dirty="0">
+              <a:latin typeface="Courier New" pitchFamily="49" charset="0"/>
+              <a:cs typeface="Courier New" pitchFamily="49" charset="0"/>
+            </a:endParaRPr>
+          </a:p>
+        </p:txBody>
+      </p:sp>
+    </p:spTree>
+  </p:cSld>
+  <p:clrMapOvr>
+    <a:masterClrMapping/>
+  </p:clrMapOvr>
+  <p:timing>
+    <p:tnLst>
+      <p:par>
+        <p:cTn id="1" dur="indefinite" restart="never" nodeType="tmRoot">
+          <p:childTnLst>
+            <p:seq concurrent="1" nextAc="seek">
+              <p:cTn id="2" dur="indefinite" nodeType="mainSeq">
+                <p:childTnLst>
+                  <p:par>
+                    <p:cTn id="3" fill="hold">
+                      <p:stCondLst>
+                        <p:cond delay="indefinite"/>
+                      </p:stCondLst>
+                      <p:childTnLst>
+                        <p:par>
+                          <p:cTn id="4" fill="hold">
+                            <p:stCondLst>
+                              <p:cond delay="0"/>
+                            </p:stCondLst>
+                            <p:childTnLst>
+                              <p:par>
+                                <p:cTn id="5" presetID="10" presetClass="entr" presetSubtype="0" fill="hold" grpId="0" nodeType="clickEffect">
+                                  <p:stCondLst>
+                                    <p:cond delay="0"/>
+                                  </p:stCondLst>
+                                  <p:childTnLst>
+                                    <p:set>
+                                      <p:cBhvr>
+                                        <p:cTn id="6" dur="1" fill="hold">
+                                          <p:stCondLst>
+                                            <p:cond delay="0"/>
+                                          </p:stCondLst>
+                                        </p:cTn>
+                                        <p:tgtEl>
+                                          <p:spTgt spid="4"/>
+                                        </p:tgtEl>
+                                        <p:attrNameLst>
+                                          <p:attrName>style.visibility</p:attrName>
+                                        </p:attrNameLst>
+                                      </p:cBhvr>
+                                      <p:to>
+                                        <p:strVal val="visible"/>
+                                      </p:to>
+                                    </p:set>
+                                    <p:animEffect transition="in" filter="fade">
+                                      <p:cBhvr>
+                                        <p:cTn id="7" dur="2000"/>
+                                        <p:tgtEl>
+                                          <p:spTgt spid="4"/>
+                                        </p:tgtEl>
+                                      </p:cBhvr>
+                                    </p:animEffect>
+                                  </p:childTnLst>
+                                </p:cTn>
+                              </p:par>
+                            </p:childTnLst>
+                          </p:cTn>
+                        </p:par>
+                      </p:childTnLst>
+                    </p:cTn>
+                  </p:par>
+                  <p:par>
+                    <p:cTn id="8" fill="hold">
+                      <p:stCondLst>
+                        <p:cond delay="indefinite"/>
+                      </p:stCondLst>
+                      <p:childTnLst>
+                        <p:par>
+                          <p:cTn id="9" fill="hold">
+                            <p:stCondLst>
+                              <p:cond delay="0"/>
+                            </p:stCondLst>
+                            <p:childTnLst>
+                              <p:par>
+                                <p:cTn id="10" presetID="10" presetClass="entr" presetSubtype="0" fill="hold" grpId="0" nodeType="clickEffect">
+                                  <p:stCondLst>
+                                    <p:cond delay="0"/>
+                                  </p:stCondLst>
+                                  <p:childTnLst>
+                                    <p:set>
+                                      <p:cBhvr>
+                                        <p:cTn id="11" dur="1" fill="hold">
+                                          <p:stCondLst>
+                                            <p:cond delay="0"/>
+                                          </p:stCondLst>
+                                        </p:cTn>
+                                        <p:tgtEl>
+                                          <p:spTgt spid="5"/>
+                                        </p:tgtEl>
+                                        <p:attrNameLst>
+                                          <p:attrName>style.visibility</p:attrName>
+                                        </p:attrNameLst>
+                                      </p:cBhvr>
+                                      <p:to>
+                                        <p:strVal val="visible"/>
+                                      </p:to>
+                                    </p:set>
+                                    <p:animEffect transition="in" filter="fade">
+                                      <p:cBhvr>
+                                        <p:cTn id="12" dur="2000"/>
+                                        <p:tgtEl>
+                                          <p:spTgt spid="5"/>
+                                        </p:tgtEl>
+                                      </p:cBhvr>
+                                    </p:animEffect>
+                                  </p:childTnLst>
+                                </p:cTn>
+                              </p:par>
+                              <p:par>
+                                <p:cTn id="13" presetID="9" presetClass="emph" presetSubtype="0" grpId="1" nodeType="withEffect">
+                                  <p:stCondLst>
+                                    <p:cond delay="0"/>
+                                  </p:stCondLst>
+                                  <p:childTnLst>
+                                    <p:set>
+                                      <p:cBhvr rctx="PPT">
+                                        <p:cTn id="14" dur="indefinite"/>
+                                        <p:tgtEl>
+                                          <p:spTgt spid="4"/>
+                                        </p:tgtEl>
+                                        <p:attrNameLst>
+                                          <p:attrName>style.opacity</p:attrName>
+                                        </p:attrNameLst>
+                                      </p:cBhvr>
+                                      <p:to>
+                                        <p:strVal val="0.25"/>
+                                      </p:to>
+                                    </p:set>
+                                    <p:animEffect filter="image" prLst="opacity: 0.25">
+                                      <p:cBhvr rctx="IE">
+                                        <p:cTn id="15" dur="indefinite"/>
+                                        <p:tgtEl>
+                                          <p:spTgt spid="4"/>
+                                        </p:tgtEl>
+                                      </p:cBhvr>
+                                    </p:animEffect>
+                                  </p:childTnLst>
+                                </p:cTn>
+                              </p:par>
+                            </p:childTnLst>
+                          </p:cTn>
+                        </p:par>
+                      </p:childTnLst>
+                    </p:cTn>
+                  </p:par>
+                  <p:par>
+                    <p:cTn id="16" fill="hold">
+                      <p:stCondLst>
+                        <p:cond delay="indefinite"/>
+                      </p:stCondLst>
+                      <p:childTnLst>
+                        <p:par>
+                          <p:cTn id="17" fill="hold">
+                            <p:stCondLst>
+                              <p:cond delay="0"/>
+                            </p:stCondLst>
+                            <p:childTnLst>
+                              <p:par>
+                                <p:cTn id="18" presetID="10" presetClass="entr" presetSubtype="0" fill="hold" grpId="0" nodeType="clickEffect">
+                                  <p:stCondLst>
+                                    <p:cond delay="0"/>
+                                  </p:stCondLst>
+                                  <p:childTnLst>
+                                    <p:set>
+                                      <p:cBhvr>
+                                        <p:cTn id="19" dur="1" fill="hold">
+                                          <p:stCondLst>
+                                            <p:cond delay="0"/>
+                                          </p:stCondLst>
+                                        </p:cTn>
+                                        <p:tgtEl>
+                                          <p:spTgt spid="6"/>
+                                        </p:tgtEl>
+                                        <p:attrNameLst>
+                                          <p:attrName>style.visibility</p:attrName>
+                                        </p:attrNameLst>
+                                      </p:cBhvr>
+                                      <p:to>
+                                        <p:strVal val="visible"/>
+                                      </p:to>
+                                    </p:set>
+                                    <p:animEffect transition="in" filter="fade">
+                                      <p:cBhvr>
+                                        <p:cTn id="20" dur="2000"/>
+                                        <p:tgtEl>
+                                          <p:spTgt spid="6"/>
+                                        </p:tgtEl>
+                                      </p:cBhvr>
+                                    </p:animEffect>
+                                  </p:childTnLst>
+                                </p:cTn>
+                              </p:par>
+                              <p:par>
+                                <p:cTn id="21" presetID="9" presetClass="emph" presetSubtype="0" grpId="1" nodeType="withEffect">
+                                  <p:stCondLst>
+                                    <p:cond delay="0"/>
+                                  </p:stCondLst>
+                                  <p:childTnLst>
+                                    <p:set>
+                                      <p:cBhvr rctx="PPT">
+                                        <p:cTn id="22" dur="indefinite"/>
+                                        <p:tgtEl>
+                                          <p:spTgt spid="5"/>
+                                        </p:tgtEl>
+                                        <p:attrNameLst>
+                                          <p:attrName>style.opacity</p:attrName>
+                                        </p:attrNameLst>
+                                      </p:cBhvr>
+                                      <p:to>
+                                        <p:strVal val="0.25"/>
+                                      </p:to>
+                                    </p:set>
+                                    <p:animEffect filter="image" prLst="opacity: 0.25">
+                                      <p:cBhvr rctx="IE">
+                                        <p:cTn id="23" dur="indefinite"/>
+                                        <p:tgtEl>
+                                          <p:spTgt spid="5"/>
+                                        </p:tgtEl>
+                                      </p:cBhvr>
+                                    </p:animEffect>
+                                  </p:childTnLst>
+                                </p:cTn>
+                              </p:par>
+                            </p:childTnLst>
+                          </p:cTn>
+                        </p:par>
+                      </p:childTnLst>
+                    </p:cTn>
+                  </p:par>
+                </p:childTnLst>
+              </p:cTn>
+              <p:prevCondLst>
+                <p:cond evt="onPrev" delay="0">
+                  <p:tgtEl>
+                    <p:sldTgt/>
+                  </p:tgtEl>
+                </p:cond>
+              </p:prevCondLst>
+              <p:nextCondLst>
+                <p:cond evt="onNext" delay="0">
+                  <p:tgtEl>
+                    <p:sldTgt/>
+                  </p:tgtEl>
+                </p:cond>
+              </p:nextCondLst>
+            </p:seq>
+          </p:childTnLst>
+        </p:cTn>
+      </p:par>
+    </p:tnLst>
+    <p:bldLst>
+      <p:bldP spid="4" grpId="0"/>
+      <p:bldP spid="4" grpId="1"/>
+      <p:bldP spid="5" grpId="0"/>
+      <p:bldP spid="5" grpId="1"/>
+      <p:bldP spid="6" grpId="0"/>
+    </p:bldLst>
+  </p:timing>
+</p:sld>
+</file>
+
 <file path=ppt/slides/slide13.xml><?xml version="1.0" encoding="utf-8"?>
 <p:sld xmlns:a="http://schemas.openxmlformats.org/drawingml/2006/main" xmlns:r="http://schemas.openxmlformats.org/officeDocument/2006/relationships" xmlns:p="http://schemas.openxmlformats.org/presentationml/2006/main" showMasterSp="0">
   <p:cSld>
@@ -10529,137 +10430,6 @@
 </file>
 
 <file path=ppt/slides/slide14.xml><?xml version="1.0" encoding="utf-8"?>
-<p:sld xmlns:a="http://schemas.openxmlformats.org/drawingml/2006/main" xmlns:r="http://schemas.openxmlformats.org/officeDocument/2006/relationships" xmlns:p="http://schemas.openxmlformats.org/presentationml/2006/main" showMasterSp="0">
-  <p:cSld>
-    <p:spTree>
-      <p:nvGrpSpPr>
-        <p:cNvPr id="1" name=""/>
-        <p:cNvGrpSpPr/>
-        <p:nvPr/>
-      </p:nvGrpSpPr>
-      <p:grpSpPr>
-        <a:xfrm>
-          <a:off x="0" y="0"/>
-          <a:ext cx="0" cy="0"/>
-          <a:chOff x="0" y="0"/>
-          <a:chExt cx="0" cy="0"/>
-        </a:xfrm>
-      </p:grpSpPr>
-      <p:sp>
-        <p:nvSpPr>
-          <p:cNvPr id="2" name="Title 1"/>
-          <p:cNvSpPr>
-            <a:spLocks noGrp="1"/>
-          </p:cNvSpPr>
-          <p:nvPr>
-            <p:ph type="title"/>
-          </p:nvPr>
-        </p:nvSpPr>
-        <p:spPr/>
-        <p:txBody>
-          <a:bodyPr/>
-          <a:lstStyle/>
-          <a:p>
-            <a:r>
-              <a:rPr lang="en-US" sz="3600" dirty="0" smtClean="0"/>
-              <a:t>What do you get out of the box?</a:t>
-            </a:r>
-            <a:endParaRPr lang="en-US" sz="3600" dirty="0"/>
-          </a:p>
-        </p:txBody>
-      </p:sp>
-      <p:sp>
-        <p:nvSpPr>
-          <p:cNvPr id="3" name="Content Placeholder 2"/>
-          <p:cNvSpPr>
-            <a:spLocks noGrp="1"/>
-          </p:cNvSpPr>
-          <p:nvPr>
-            <p:ph idx="1"/>
-          </p:nvPr>
-        </p:nvSpPr>
-        <p:spPr/>
-        <p:txBody>
-          <a:bodyPr/>
-          <a:lstStyle/>
-          <a:p>
-            <a:r>
-              <a:rPr lang="en-US" dirty="0" smtClean="0"/>
-              <a:t>Working sample </a:t>
-            </a:r>
-            <a:r>
-              <a:rPr lang="en-US" dirty="0" smtClean="0"/>
-              <a:t>application</a:t>
-            </a:r>
-          </a:p>
-          <a:p>
-            <a:pPr lvl="1"/>
-            <a:r>
-              <a:rPr lang="en-US" dirty="0" smtClean="0"/>
-              <a:t>Default routes</a:t>
-            </a:r>
-            <a:endParaRPr lang="en-US" dirty="0" smtClean="0"/>
-          </a:p>
-          <a:p>
-            <a:pPr lvl="1"/>
-            <a:r>
-              <a:rPr lang="en-US" dirty="0" err="1" smtClean="0"/>
-              <a:t>HomeController</a:t>
-            </a:r>
-            <a:endParaRPr lang="en-US" dirty="0" smtClean="0"/>
-          </a:p>
-          <a:p>
-            <a:pPr lvl="1"/>
-            <a:r>
-              <a:rPr lang="en-US" dirty="0" smtClean="0"/>
-              <a:t>Home and About </a:t>
-            </a:r>
-            <a:r>
-              <a:rPr lang="en-US" dirty="0" smtClean="0"/>
-              <a:t>views</a:t>
-            </a:r>
-            <a:endParaRPr lang="en-US" dirty="0" smtClean="0"/>
-          </a:p>
-          <a:p>
-            <a:r>
-              <a:rPr lang="en-US" dirty="0" err="1" smtClean="0"/>
-              <a:t>WebForms</a:t>
-            </a:r>
-            <a:r>
-              <a:rPr lang="en-US" dirty="0" smtClean="0"/>
-              <a:t> </a:t>
-            </a:r>
-            <a:r>
-              <a:rPr lang="en-US" dirty="0" err="1" smtClean="0"/>
-              <a:t>ViewEngineBase</a:t>
-            </a:r>
-            <a:endParaRPr lang="en-US" dirty="0" smtClean="0"/>
-          </a:p>
-          <a:p>
-            <a:r>
-              <a:rPr lang="en-US" dirty="0" smtClean="0"/>
-              <a:t>Test Project</a:t>
-            </a:r>
-            <a:endParaRPr lang="en-US" dirty="0"/>
-          </a:p>
-        </p:txBody>
-      </p:sp>
-    </p:spTree>
-  </p:cSld>
-  <p:clrMapOvr>
-    <a:masterClrMapping/>
-  </p:clrMapOvr>
-  <p:timing>
-    <p:tnLst>
-      <p:par>
-        <p:cTn id="1" dur="indefinite" restart="never" nodeType="tmRoot"/>
-      </p:par>
-    </p:tnLst>
-  </p:timing>
-</p:sld>
-</file>
-
-<file path=ppt/slides/slide15.xml><?xml version="1.0" encoding="utf-8"?>
 <p:sld xmlns:a="http://schemas.openxmlformats.org/drawingml/2006/main" xmlns:r="http://schemas.openxmlformats.org/officeDocument/2006/relationships" xmlns:p="http://schemas.openxmlformats.org/presentationml/2006/main" showMasterSp="0">
   <p:cSld>
     <p:spTree>
@@ -11404,6 +11174,78 @@
 </p:sld>
 </file>
 
+<file path=ppt/slides/slide15.xml><?xml version="1.0" encoding="utf-8"?>
+<p:sld xmlns:a="http://schemas.openxmlformats.org/drawingml/2006/main" xmlns:r="http://schemas.openxmlformats.org/officeDocument/2006/relationships" xmlns:p="http://schemas.openxmlformats.org/presentationml/2006/main" showMasterSp="0">
+  <p:cSld>
+    <p:spTree>
+      <p:nvGrpSpPr>
+        <p:cNvPr id="1" name=""/>
+        <p:cNvGrpSpPr/>
+        <p:nvPr/>
+      </p:nvGrpSpPr>
+      <p:grpSpPr>
+        <a:xfrm>
+          <a:off x="0" y="0"/>
+          <a:ext cx="0" cy="0"/>
+          <a:chOff x="0" y="0"/>
+          <a:chExt cx="0" cy="0"/>
+        </a:xfrm>
+      </p:grpSpPr>
+      <p:sp>
+        <p:nvSpPr>
+          <p:cNvPr id="2" name="Title 1"/>
+          <p:cNvSpPr>
+            <a:spLocks noGrp="1"/>
+          </p:cNvSpPr>
+          <p:nvPr>
+            <p:ph type="title"/>
+          </p:nvPr>
+        </p:nvSpPr>
+        <p:spPr>
+          <a:xfrm>
+            <a:off x="914400" y="2819400"/>
+            <a:ext cx="7772400" cy="1447800"/>
+          </a:xfrm>
+        </p:spPr>
+        <p:txBody>
+          <a:bodyPr/>
+          <a:lstStyle/>
+          <a:p>
+            <a:r>
+              <a:rPr lang="en-US" sz="6000" dirty="0" smtClean="0">
+                <a:solidFill>
+                  <a:srgbClr val="FFC000"/>
+                </a:solidFill>
+                <a:latin typeface="Courier New" pitchFamily="49" charset="0"/>
+                <a:cs typeface="Courier New" pitchFamily="49" charset="0"/>
+              </a:rPr>
+              <a:t>&lt;code /&gt;</a:t>
+            </a:r>
+            <a:endParaRPr lang="en-US" sz="6000" dirty="0">
+              <a:solidFill>
+                <a:srgbClr val="FFC000"/>
+              </a:solidFill>
+              <a:latin typeface="Courier New" pitchFamily="49" charset="0"/>
+              <a:cs typeface="Courier New" pitchFamily="49" charset="0"/>
+            </a:endParaRPr>
+          </a:p>
+        </p:txBody>
+      </p:sp>
+    </p:spTree>
+  </p:cSld>
+  <p:clrMapOvr>
+    <a:masterClrMapping/>
+  </p:clrMapOvr>
+  <p:timing>
+    <p:tnLst>
+      <p:par>
+        <p:cTn id="1" dur="indefinite" restart="never" nodeType="tmRoot"/>
+      </p:par>
+    </p:tnLst>
+  </p:timing>
+</p:sld>
+</file>
+
 <file path=ppt/slides/slide16.xml><?xml version="1.0" encoding="utf-8"?>
 <p:sld xmlns:a="http://schemas.openxmlformats.org/drawingml/2006/main" xmlns:r="http://schemas.openxmlformats.org/officeDocument/2006/relationships" xmlns:p="http://schemas.openxmlformats.org/presentationml/2006/main" showMasterSp="0">
   <p:cSld>
@@ -11431,33 +11273,104 @@
             <p:ph type="title"/>
           </p:nvPr>
         </p:nvSpPr>
-        <p:spPr>
-          <a:xfrm>
-            <a:off x="914400" y="2819400"/>
-            <a:ext cx="7772400" cy="1447800"/>
-          </a:xfrm>
-        </p:spPr>
+        <p:spPr/>
         <p:txBody>
           <a:bodyPr/>
           <a:lstStyle/>
           <a:p>
             <a:r>
-              <a:rPr lang="en-US" sz="6000" dirty="0" smtClean="0">
-                <a:solidFill>
-                  <a:srgbClr val="FFC000"/>
-                </a:solidFill>
-                <a:latin typeface="Courier New" pitchFamily="49" charset="0"/>
-                <a:cs typeface="Courier New" pitchFamily="49" charset="0"/>
+              <a:rPr lang="en-US" dirty="0" smtClean="0"/>
+              <a:t>Resources</a:t>
+            </a:r>
+            <a:endParaRPr lang="en-US" dirty="0"/>
+          </a:p>
+        </p:txBody>
+      </p:sp>
+      <p:sp>
+        <p:nvSpPr>
+          <p:cNvPr id="3" name="Content Placeholder 2"/>
+          <p:cNvSpPr>
+            <a:spLocks noGrp="1"/>
+          </p:cNvSpPr>
+          <p:nvPr>
+            <p:ph idx="1"/>
+          </p:nvPr>
+        </p:nvSpPr>
+        <p:spPr/>
+        <p:txBody>
+          <a:bodyPr/>
+          <a:lstStyle/>
+          <a:p>
+            <a:r>
+              <a:rPr lang="en-US" dirty="0" smtClean="0">
+                <a:hlinkClick r:id="rId3"/>
               </a:rPr>
-              <a:t>&lt;code /&gt;</a:t>
-            </a:r>
-            <a:endParaRPr lang="en-US" sz="6000" dirty="0">
-              <a:solidFill>
-                <a:srgbClr val="FFC000"/>
-              </a:solidFill>
-              <a:latin typeface="Courier New" pitchFamily="49" charset="0"/>
-              <a:cs typeface="Courier New" pitchFamily="49" charset="0"/>
-            </a:endParaRPr>
+              <a:t>www.asp.net/learn/3.5-extensions-videos/</a:t>
+            </a:r>
+            <a:endParaRPr lang="en-US" dirty="0" smtClean="0"/>
+          </a:p>
+          <a:p>
+            <a:r>
+              <a:rPr lang="en-US" dirty="0" smtClean="0">
+                <a:hlinkClick r:id="rId4"/>
+              </a:rPr>
+              <a:t>www.hanselman.com/blog/</a:t>
+            </a:r>
+            <a:endParaRPr lang="en-US" dirty="0" smtClean="0"/>
+          </a:p>
+          <a:p>
+            <a:r>
+              <a:rPr lang="en-US" dirty="0" smtClean="0">
+                <a:hlinkClick r:id="rId5"/>
+              </a:rPr>
+              <a:t>www.haacked.com</a:t>
+            </a:r>
+            <a:endParaRPr lang="en-US" dirty="0" smtClean="0"/>
+          </a:p>
+          <a:p>
+            <a:r>
+              <a:rPr lang="en-US" dirty="0" smtClean="0">
+                <a:hlinkClick r:id="rId6"/>
+              </a:rPr>
+              <a:t>sessions.visitmix.com/?</a:t>
+            </a:r>
+            <a:r>
+              <a:rPr lang="en-US" dirty="0" err="1" smtClean="0">
+                <a:hlinkClick r:id="rId6"/>
+              </a:rPr>
+              <a:t>selectedSearch</a:t>
+            </a:r>
+            <a:r>
+              <a:rPr lang="en-US" dirty="0" smtClean="0">
+                <a:hlinkClick r:id="rId6"/>
+              </a:rPr>
+              <a:t>=T22</a:t>
+            </a:r>
+            <a:endParaRPr lang="en-US" dirty="0" smtClean="0"/>
+          </a:p>
+          <a:p>
+            <a:r>
+              <a:rPr lang="en-US" dirty="0" smtClean="0">
+                <a:hlinkClick r:id="rId7"/>
+              </a:rPr>
+              <a:t>weblogs.asp.net/</a:t>
+            </a:r>
+            <a:r>
+              <a:rPr lang="en-US" dirty="0" err="1" smtClean="0">
+                <a:hlinkClick r:id="rId7"/>
+              </a:rPr>
+              <a:t>scottgu</a:t>
+            </a:r>
+            <a:r>
+              <a:rPr lang="en-US" dirty="0" smtClean="0">
+                <a:hlinkClick r:id="rId7"/>
+              </a:rPr>
+              <a:t>/</a:t>
+            </a:r>
+            <a:endParaRPr lang="en-US" dirty="0" smtClean="0"/>
+          </a:p>
+          <a:p>
+            <a:endParaRPr lang="en-US" dirty="0"/>
           </a:p>
         </p:txBody>
       </p:sp>
@@ -11477,149 +11390,6 @@
 </file>
 
 <file path=ppt/slides/slide17.xml><?xml version="1.0" encoding="utf-8"?>
-<p:sld xmlns:a="http://schemas.openxmlformats.org/drawingml/2006/main" xmlns:r="http://schemas.openxmlformats.org/officeDocument/2006/relationships" xmlns:p="http://schemas.openxmlformats.org/presentationml/2006/main" showMasterSp="0">
-  <p:cSld>
-    <p:spTree>
-      <p:nvGrpSpPr>
-        <p:cNvPr id="1" name=""/>
-        <p:cNvGrpSpPr/>
-        <p:nvPr/>
-      </p:nvGrpSpPr>
-      <p:grpSpPr>
-        <a:xfrm>
-          <a:off x="0" y="0"/>
-          <a:ext cx="0" cy="0"/>
-          <a:chOff x="0" y="0"/>
-          <a:chExt cx="0" cy="0"/>
-        </a:xfrm>
-      </p:grpSpPr>
-      <p:sp>
-        <p:nvSpPr>
-          <p:cNvPr id="2" name="Title 1"/>
-          <p:cNvSpPr>
-            <a:spLocks noGrp="1"/>
-          </p:cNvSpPr>
-          <p:nvPr>
-            <p:ph type="title"/>
-          </p:nvPr>
-        </p:nvSpPr>
-        <p:spPr/>
-        <p:txBody>
-          <a:bodyPr/>
-          <a:lstStyle/>
-          <a:p>
-            <a:r>
-              <a:rPr lang="en-US" dirty="0" smtClean="0"/>
-              <a:t>Resources</a:t>
-            </a:r>
-            <a:endParaRPr lang="en-US" dirty="0"/>
-          </a:p>
-        </p:txBody>
-      </p:sp>
-      <p:sp>
-        <p:nvSpPr>
-          <p:cNvPr id="3" name="Content Placeholder 2"/>
-          <p:cNvSpPr>
-            <a:spLocks noGrp="1"/>
-          </p:cNvSpPr>
-          <p:nvPr>
-            <p:ph idx="1"/>
-          </p:nvPr>
-        </p:nvSpPr>
-        <p:spPr/>
-        <p:txBody>
-          <a:bodyPr/>
-          <a:lstStyle/>
-          <a:p>
-            <a:r>
-              <a:rPr lang="en-US" dirty="0" smtClean="0">
-                <a:hlinkClick r:id="rId3"/>
-              </a:rPr>
-              <a:t>www.asp.net/learn/3.5-extensions-videos/</a:t>
-            </a:r>
-            <a:endParaRPr lang="en-US" dirty="0" smtClean="0"/>
-          </a:p>
-          <a:p>
-            <a:r>
-              <a:rPr lang="en-US" dirty="0" smtClean="0">
-                <a:hlinkClick r:id="rId4"/>
-              </a:rPr>
-              <a:t>www.hanselman.com/blog/</a:t>
-            </a:r>
-            <a:endParaRPr lang="en-US" dirty="0" smtClean="0"/>
-          </a:p>
-          <a:p>
-            <a:r>
-              <a:rPr lang="en-US" dirty="0" smtClean="0">
-                <a:hlinkClick r:id="rId5"/>
-              </a:rPr>
-              <a:t>www.haacked.com</a:t>
-            </a:r>
-            <a:endParaRPr lang="en-US" dirty="0" smtClean="0"/>
-          </a:p>
-          <a:p>
-            <a:r>
-              <a:rPr lang="en-US" dirty="0" smtClean="0">
-                <a:hlinkClick r:id="rId6"/>
-              </a:rPr>
-              <a:t>sessions.visitmix.com/?</a:t>
-            </a:r>
-            <a:r>
-              <a:rPr lang="en-US" dirty="0" err="1" smtClean="0">
-                <a:hlinkClick r:id="rId6"/>
-              </a:rPr>
-              <a:t>selectedSearch</a:t>
-            </a:r>
-            <a:r>
-              <a:rPr lang="en-US" dirty="0" smtClean="0">
-                <a:hlinkClick r:id="rId6"/>
-              </a:rPr>
-              <a:t>=T22</a:t>
-            </a:r>
-            <a:endParaRPr lang="en-US" dirty="0" smtClean="0"/>
-          </a:p>
-          <a:p>
-            <a:r>
-              <a:rPr lang="en-US" dirty="0" smtClean="0">
-                <a:hlinkClick r:id="rId7"/>
-              </a:rPr>
-              <a:t>weblogs.asp.net/</a:t>
-            </a:r>
-            <a:r>
-              <a:rPr lang="en-US" dirty="0" err="1" smtClean="0">
-                <a:hlinkClick r:id="rId7"/>
-              </a:rPr>
-              <a:t>scottgu</a:t>
-            </a:r>
-            <a:r>
-              <a:rPr lang="en-US" dirty="0" smtClean="0">
-                <a:hlinkClick r:id="rId7"/>
-              </a:rPr>
-              <a:t>/</a:t>
-            </a:r>
-            <a:endParaRPr lang="en-US" dirty="0" smtClean="0"/>
-          </a:p>
-          <a:p>
-            <a:endParaRPr lang="en-US" dirty="0"/>
-          </a:p>
-        </p:txBody>
-      </p:sp>
-    </p:spTree>
-  </p:cSld>
-  <p:clrMapOvr>
-    <a:masterClrMapping/>
-  </p:clrMapOvr>
-  <p:timing>
-    <p:tnLst>
-      <p:par>
-        <p:cTn id="1" dur="indefinite" restart="never" nodeType="tmRoot"/>
-      </p:par>
-    </p:tnLst>
-  </p:timing>
-</p:sld>
-</file>
-
-<file path=ppt/slides/slide18.xml><?xml version="1.0" encoding="utf-8"?>
 <p:sld xmlns:a="http://schemas.openxmlformats.org/drawingml/2006/main" xmlns:r="http://schemas.openxmlformats.org/officeDocument/2006/relationships" xmlns:p="http://schemas.openxmlformats.org/presentationml/2006/main" showMasterSp="0">
   <p:cSld>
     <p:spTree>

</xml_diff>

<commit_message>
removed picture of me
</commit_message>
<xml_diff>
--- a/Samples/Getting-Started-With-MVC/Getting Started with MVC.pptx
+++ b/Samples/Getting-Started-With-MVC/Getting Started with MVC.pptx
@@ -5,37 +5,36 @@
     <p:sldMasterId id="2147483672" r:id="rId1"/>
   </p:sldMasterIdLst>
   <p:notesMasterIdLst>
-    <p:notesMasterId r:id="rId30"/>
+    <p:notesMasterId r:id="rId29"/>
   </p:notesMasterIdLst>
   <p:sldIdLst>
     <p:sldId id="256" r:id="rId2"/>
-    <p:sldId id="283" r:id="rId3"/>
-    <p:sldId id="285" r:id="rId4"/>
-    <p:sldId id="284" r:id="rId5"/>
-    <p:sldId id="262" r:id="rId6"/>
-    <p:sldId id="286" r:id="rId7"/>
-    <p:sldId id="287" r:id="rId8"/>
-    <p:sldId id="288" r:id="rId9"/>
-    <p:sldId id="290" r:id="rId10"/>
-    <p:sldId id="291" r:id="rId11"/>
-    <p:sldId id="292" r:id="rId12"/>
-    <p:sldId id="293" r:id="rId13"/>
-    <p:sldId id="289" r:id="rId14"/>
-    <p:sldId id="273" r:id="rId15"/>
-    <p:sldId id="274" r:id="rId16"/>
-    <p:sldId id="275" r:id="rId17"/>
-    <p:sldId id="294" r:id="rId18"/>
-    <p:sldId id="269" r:id="rId19"/>
-    <p:sldId id="270" r:id="rId20"/>
-    <p:sldId id="295" r:id="rId21"/>
-    <p:sldId id="268" r:id="rId22"/>
-    <p:sldId id="271" r:id="rId23"/>
-    <p:sldId id="277" r:id="rId24"/>
-    <p:sldId id="278" r:id="rId25"/>
-    <p:sldId id="282" r:id="rId26"/>
-    <p:sldId id="264" r:id="rId27"/>
-    <p:sldId id="265" r:id="rId28"/>
-    <p:sldId id="266" r:id="rId29"/>
+    <p:sldId id="285" r:id="rId3"/>
+    <p:sldId id="284" r:id="rId4"/>
+    <p:sldId id="262" r:id="rId5"/>
+    <p:sldId id="286" r:id="rId6"/>
+    <p:sldId id="287" r:id="rId7"/>
+    <p:sldId id="288" r:id="rId8"/>
+    <p:sldId id="290" r:id="rId9"/>
+    <p:sldId id="291" r:id="rId10"/>
+    <p:sldId id="292" r:id="rId11"/>
+    <p:sldId id="293" r:id="rId12"/>
+    <p:sldId id="289" r:id="rId13"/>
+    <p:sldId id="273" r:id="rId14"/>
+    <p:sldId id="274" r:id="rId15"/>
+    <p:sldId id="275" r:id="rId16"/>
+    <p:sldId id="294" r:id="rId17"/>
+    <p:sldId id="269" r:id="rId18"/>
+    <p:sldId id="270" r:id="rId19"/>
+    <p:sldId id="295" r:id="rId20"/>
+    <p:sldId id="268" r:id="rId21"/>
+    <p:sldId id="271" r:id="rId22"/>
+    <p:sldId id="277" r:id="rId23"/>
+    <p:sldId id="278" r:id="rId24"/>
+    <p:sldId id="282" r:id="rId25"/>
+    <p:sldId id="264" r:id="rId26"/>
+    <p:sldId id="265" r:id="rId27"/>
+    <p:sldId id="266" r:id="rId28"/>
   </p:sldIdLst>
   <p:sldSz cx="9144000" cy="6858000" type="screen4x3"/>
   <p:notesSz cx="6858000" cy="9144000"/>
@@ -544,8 +543,40 @@
           <a:p>
             <a:r>
               <a:rPr lang="en-US" baseline="0" dirty="0" smtClean="0"/>
-              <a:t>New preview code drop came out on Thursday (4/17)</a:t>
-            </a:r>
+              <a:t>New preview code drop came out on Thursday (4/17</a:t>
+            </a:r>
+            <a:r>
+              <a:rPr lang="en-US" baseline="0" dirty="0" smtClean="0"/>
+              <a:t>)</a:t>
+            </a:r>
+          </a:p>
+          <a:p>
+            <a:endParaRPr lang="en-US" baseline="0" dirty="0" smtClean="0"/>
+          </a:p>
+          <a:p>
+            <a:r>
+              <a:rPr lang="en-US" dirty="0" smtClean="0"/>
+              <a:t>About</a:t>
+            </a:r>
+            <a:r>
+              <a:rPr lang="en-US" baseline="0" dirty="0" smtClean="0"/>
+              <a:t> me</a:t>
+            </a:r>
+          </a:p>
+          <a:p>
+            <a:r>
+              <a:rPr lang="en-US" baseline="0" dirty="0" smtClean="0"/>
+              <a:t>Live in Hilliard, OH</a:t>
+            </a:r>
+          </a:p>
+          <a:p>
+            <a:r>
+              <a:rPr lang="en-US" baseline="0" smtClean="0"/>
+              <a:t>Wife, two boys, and a black lab</a:t>
+            </a:r>
+          </a:p>
+          <a:p>
+            <a:endParaRPr lang="en-US" baseline="0" dirty="0" smtClean="0"/>
           </a:p>
         </p:txBody>
       </p:sp>
@@ -627,9 +658,37 @@
           </a:bodyPr>
           <a:lstStyle/>
           <a:p>
+            <a:pPr marL="0" marR="0" indent="0" algn="l" defTabSz="914400" rtl="0" eaLnBrk="1" fontAlgn="auto" latinLnBrk="0" hangingPunct="1">
+              <a:lnSpc>
+                <a:spcPct val="100000"/>
+              </a:lnSpc>
+              <a:spcBef>
+                <a:spcPts val="0"/>
+              </a:spcBef>
+              <a:spcAft>
+                <a:spcPts val="0"/>
+              </a:spcAft>
+              <a:buClrTx/>
+              <a:buSzTx/>
+              <a:buFontTx/>
+              <a:buNone/>
+              <a:tabLst/>
+              <a:defRPr/>
+            </a:pPr>
+            <a:r>
+              <a:rPr lang="en-US" baseline="0" dirty="0" smtClean="0"/>
+              <a:t>Demand from community for an offering from Microsoft</a:t>
+            </a:r>
+            <a:endParaRPr lang="en-US" dirty="0" smtClean="0"/>
+          </a:p>
+          <a:p>
             <a:r>
               <a:rPr lang="en-US" dirty="0" smtClean="0"/>
-              <a:t>Spring MVC, specifically</a:t>
+              <a:t>Explain why monorail</a:t>
+            </a:r>
+            <a:r>
+              <a:rPr lang="en-US" baseline="0" dirty="0" smtClean="0"/>
+              <a:t> is a valid alternative, but it’s Open Source</a:t>
             </a:r>
             <a:endParaRPr lang="en-US" dirty="0"/>
           </a:p>
@@ -653,7 +712,7 @@
             <a:fld id="{F8007F4E-10F5-4104-9EF8-E98D370060A3}" type="slidenum">
               <a:rPr lang="en-US" smtClean="0"/>
               <a:pPr/>
-              <a:t>11</a:t>
+              <a:t>12</a:t>
             </a:fld>
             <a:endParaRPr lang="en-US"/>
           </a:p>
@@ -713,37 +772,52 @@
           </a:bodyPr>
           <a:lstStyle/>
           <a:p>
-            <a:pPr marL="0" marR="0" indent="0" algn="l" defTabSz="914400" rtl="0" eaLnBrk="1" fontAlgn="auto" latinLnBrk="0" hangingPunct="1">
-              <a:lnSpc>
-                <a:spcPct val="100000"/>
-              </a:lnSpc>
-              <a:spcBef>
-                <a:spcPts val="0"/>
-              </a:spcBef>
-              <a:spcAft>
-                <a:spcPts val="0"/>
-              </a:spcAft>
-              <a:buClrTx/>
-              <a:buSzTx/>
-              <a:buFontTx/>
-              <a:buNone/>
-              <a:tabLst/>
-              <a:defRPr/>
-            </a:pPr>
+            <a:r>
+              <a:rPr lang="en-US" dirty="0" smtClean="0"/>
+              <a:t>“What are we trying to</a:t>
+            </a:r>
             <a:r>
               <a:rPr lang="en-US" baseline="0" dirty="0" smtClean="0"/>
-              <a:t>Demand from community for an offering from Microsoft</a:t>
+              <a:t> solve? What’s wrong with </a:t>
+            </a:r>
+            <a:r>
+              <a:rPr lang="en-US" baseline="0" dirty="0" err="1" smtClean="0"/>
+              <a:t>WebForms</a:t>
+            </a:r>
+            <a:r>
+              <a:rPr lang="en-US" baseline="0" dirty="0" smtClean="0"/>
+              <a:t>?”</a:t>
             </a:r>
             <a:endParaRPr lang="en-US" dirty="0" smtClean="0"/>
           </a:p>
           <a:p>
             <a:r>
-              <a:rPr lang="en-US" dirty="0" smtClean="0"/>
-              <a:t>Explain why monorail</a:t>
+              <a:rPr lang="en-US" dirty="0" err="1" smtClean="0"/>
+              <a:t>WebForms</a:t>
             </a:r>
             <a:r>
               <a:rPr lang="en-US" baseline="0" dirty="0" smtClean="0"/>
-              <a:t> is a valid alternative, but it’s Open Source</a:t>
+              <a:t> tried to move </a:t>
+            </a:r>
+            <a:r>
+              <a:rPr lang="en-US" baseline="0" dirty="0" err="1" smtClean="0"/>
+              <a:t>WinForms</a:t>
+            </a:r>
+            <a:r>
+              <a:rPr lang="en-US" baseline="0" dirty="0" smtClean="0"/>
+              <a:t> to web development</a:t>
+            </a:r>
+          </a:p>
+          <a:p>
+            <a:r>
+              <a:rPr lang="en-US" baseline="0" dirty="0" smtClean="0"/>
+              <a:t>Some developers think this is the way the whole web works</a:t>
+            </a:r>
+          </a:p>
+          <a:p>
+            <a:r>
+              <a:rPr lang="en-US" baseline="0" dirty="0" smtClean="0"/>
+              <a:t>Introduced page event model</a:t>
             </a:r>
             <a:endParaRPr lang="en-US" dirty="0"/>
           </a:p>
@@ -829,51 +903,82 @@
           <a:p>
             <a:r>
               <a:rPr lang="en-US" dirty="0" smtClean="0"/>
-              <a:t>“What are we trying to</a:t>
+              <a:t>Who</a:t>
             </a:r>
             <a:r>
               <a:rPr lang="en-US" baseline="0" dirty="0" smtClean="0"/>
-              <a:t> solve? What’s wrong with </a:t>
+              <a:t> doesn’t love this?</a:t>
+            </a:r>
+          </a:p>
+          <a:p>
+            <a:r>
+              <a:rPr lang="en-US" baseline="0" dirty="0" smtClean="0"/>
+              <a:t>Was that </a:t>
             </a:r>
             <a:r>
               <a:rPr lang="en-US" baseline="0" dirty="0" err="1" smtClean="0"/>
-              <a:t>WebForms</a:t>
+              <a:t>OnPreInit</a:t>
             </a:r>
             <a:r>
               <a:rPr lang="en-US" baseline="0" dirty="0" smtClean="0"/>
-              <a:t>?”</a:t>
-            </a:r>
-            <a:endParaRPr lang="en-US" dirty="0" smtClean="0"/>
-          </a:p>
-          <a:p>
-            <a:r>
-              <a:rPr lang="en-US" dirty="0" err="1" smtClean="0"/>
-              <a:t>WebForms</a:t>
+              <a:t> or </a:t>
+            </a:r>
+            <a:r>
+              <a:rPr lang="en-US" baseline="0" dirty="0" err="1" smtClean="0"/>
+              <a:t>OnPreLoad</a:t>
             </a:r>
             <a:r>
               <a:rPr lang="en-US" baseline="0" dirty="0" smtClean="0"/>
-              <a:t> tried to move </a:t>
-            </a:r>
+              <a:t>?</a:t>
+            </a:r>
+          </a:p>
+          <a:p>
+            <a:pPr marL="228600" indent="-228600">
+              <a:buFont typeface="+mj-lt"/>
+              <a:buNone/>
+            </a:pPr>
+            <a:r>
+              <a:rPr lang="en-US" baseline="0" dirty="0" smtClean="0"/>
+              <a:t>Page Lifecycle brings state to the web, not totally a bad thing, but we all know the web is stateless</a:t>
+            </a:r>
+          </a:p>
+          <a:p>
             <a:r>
               <a:rPr lang="en-US" baseline="0" dirty="0" err="1" smtClean="0"/>
-              <a:t>WinForms</a:t>
+              <a:t>Runat</a:t>
             </a:r>
             <a:r>
               <a:rPr lang="en-US" baseline="0" dirty="0" smtClean="0"/>
-              <a:t> to web development</a:t>
+              <a:t>=server</a:t>
             </a:r>
           </a:p>
           <a:p>
             <a:r>
               <a:rPr lang="en-US" baseline="0" dirty="0" smtClean="0"/>
-              <a:t>Some developers think this is the way the whole web works</a:t>
+              <a:t>AJAX comes along, more client interaction</a:t>
             </a:r>
           </a:p>
           <a:p>
             <a:r>
               <a:rPr lang="en-US" baseline="0" dirty="0" smtClean="0"/>
-              <a:t>Introduced page event model</a:t>
-            </a:r>
+              <a:t>Naming Container in </a:t>
+            </a:r>
+            <a:r>
+              <a:rPr lang="en-US" baseline="0" dirty="0" err="1" smtClean="0"/>
+              <a:t>javascript</a:t>
+            </a:r>
+            <a:r>
+              <a:rPr lang="en-US" baseline="0" dirty="0" smtClean="0"/>
+              <a:t> &lt;% %&gt; all over the place</a:t>
+            </a:r>
+          </a:p>
+          <a:p>
+            <a:r>
+              <a:rPr lang="en-US" baseline="0" dirty="0" smtClean="0"/>
+              <a:t>Atlas adds update panel, whole new set of problems</a:t>
+            </a:r>
+          </a:p>
+          <a:p>
             <a:endParaRPr lang="en-US" dirty="0"/>
           </a:p>
         </p:txBody>
@@ -958,34 +1063,96 @@
           <a:p>
             <a:r>
               <a:rPr lang="en-US" dirty="0" smtClean="0"/>
-              <a:t>Who</a:t>
+              <a:t>The spaghetti</a:t>
             </a:r>
             <a:r>
               <a:rPr lang="en-US" baseline="0" dirty="0" smtClean="0"/>
-              <a:t> doesn’t love this?</a:t>
-            </a:r>
-          </a:p>
-          <a:p>
+              <a:t> of the </a:t>
+            </a:r>
+            <a:r>
+              <a:rPr lang="en-US" baseline="0" dirty="0" err="1" smtClean="0"/>
+              <a:t>page_load</a:t>
+            </a:r>
             <a:r>
               <a:rPr lang="en-US" baseline="0" dirty="0" smtClean="0"/>
-              <a:t>Was that </a:t>
+              <a:t>. (</a:t>
+            </a:r>
+            <a:r>
+              <a:rPr lang="en-US" dirty="0" smtClean="0"/>
+              <a:t>A steaming pile of </a:t>
+            </a:r>
+            <a:r>
+              <a:rPr lang="en-US" dirty="0" err="1" smtClean="0"/>
+              <a:t>Page_Load</a:t>
+            </a:r>
+            <a:r>
+              <a:rPr lang="en-US" dirty="0" smtClean="0"/>
+              <a:t>)</a:t>
+            </a:r>
+          </a:p>
+          <a:p>
+            <a:r>
+              <a:rPr lang="en-US" dirty="0" smtClean="0"/>
+              <a:t>Neal</a:t>
+            </a:r>
+            <a:r>
+              <a:rPr lang="en-US" baseline="0" dirty="0" smtClean="0"/>
+              <a:t> Ford: “Bad developer will move heaven and Earth to do the wrong thing.”</a:t>
+            </a:r>
+          </a:p>
+          <a:p>
+            <a:r>
+              <a:rPr lang="en-US" baseline="0" dirty="0" smtClean="0"/>
+              <a:t>Mix of presentation and logic in the code behind, no Separation of Concerns</a:t>
+            </a:r>
+          </a:p>
+          <a:p>
+            <a:r>
+              <a:rPr lang="en-US" baseline="0" dirty="0" smtClean="0"/>
+              <a:t>Extremely difficult to test code behinds</a:t>
+            </a:r>
+          </a:p>
+          <a:p>
+            <a:pPr marL="228600" indent="-228600">
+              <a:buFont typeface="+mj-lt"/>
+              <a:buAutoNum type="arabicPeriod"/>
+            </a:pPr>
+            <a:r>
+              <a:rPr lang="en-US" baseline="0" dirty="0" smtClean="0"/>
+              <a:t>Dependent on web server to run</a:t>
+            </a:r>
+          </a:p>
+          <a:p>
+            <a:pPr marL="228600" indent="-228600">
+              <a:buFont typeface="+mj-lt"/>
+              <a:buAutoNum type="arabicPeriod"/>
+            </a:pPr>
+            <a:r>
+              <a:rPr lang="en-US" baseline="0" dirty="0" smtClean="0"/>
+              <a:t>Concrete classes on the web server run </a:t>
             </a:r>
             <a:r>
               <a:rPr lang="en-US" baseline="0" dirty="0" err="1" smtClean="0"/>
-              <a:t>OnPreInit</a:t>
-            </a:r>
+              <a:t>WebForms</a:t>
+            </a:r>
+            <a:endParaRPr lang="en-US" baseline="0" dirty="0" smtClean="0"/>
+          </a:p>
+          <a:p>
+            <a:pPr marL="228600" indent="-228600">
+              <a:buFont typeface="+mj-lt"/>
+              <a:buAutoNum type="arabicPeriod"/>
+            </a:pPr>
             <a:r>
               <a:rPr lang="en-US" baseline="0" dirty="0" smtClean="0"/>
-              <a:t> or </a:t>
-            </a:r>
-            <a:r>
-              <a:rPr lang="en-US" baseline="0" dirty="0" err="1" smtClean="0"/>
-              <a:t>OnPreLoad</a:t>
-            </a:r>
-            <a:r>
-              <a:rPr lang="en-US" baseline="0" dirty="0" smtClean="0"/>
-              <a:t>?</a:t>
-            </a:r>
+              <a:t>No way to fake or mock those classes</a:t>
+            </a:r>
+          </a:p>
+          <a:p>
+            <a:pPr marL="228600" indent="-228600">
+              <a:buFont typeface="+mj-lt"/>
+              <a:buAutoNum type="arabicPeriod"/>
+            </a:pPr>
+            <a:endParaRPr lang="en-US" baseline="0" dirty="0" smtClean="0"/>
           </a:p>
           <a:p>
             <a:pPr marL="228600" indent="-228600">
@@ -994,47 +1161,8 @@
             </a:pPr>
             <a:r>
               <a:rPr lang="en-US" baseline="0" dirty="0" smtClean="0"/>
-              <a:t>Page Lifecycle brings state to the web, not totally a bad thing, but we all know the web is stateless</a:t>
-            </a:r>
-          </a:p>
-          <a:p>
-            <a:r>
-              <a:rPr lang="en-US" baseline="0" dirty="0" err="1" smtClean="0"/>
-              <a:t>Runat</a:t>
-            </a:r>
-            <a:r>
-              <a:rPr lang="en-US" baseline="0" dirty="0" smtClean="0"/>
-              <a:t>=server</a:t>
-            </a:r>
-          </a:p>
-          <a:p>
-            <a:r>
-              <a:rPr lang="en-US" baseline="0" dirty="0" smtClean="0"/>
-              <a:t>AJAX comes along, more client interaction</a:t>
-            </a:r>
-          </a:p>
-          <a:p>
-            <a:r>
-              <a:rPr lang="en-US" baseline="0" dirty="0" smtClean="0"/>
-              <a:t>Naming Container in </a:t>
-            </a:r>
-            <a:r>
-              <a:rPr lang="en-US" baseline="0" dirty="0" err="1" smtClean="0"/>
-              <a:t>javascript</a:t>
-            </a:r>
-            <a:r>
-              <a:rPr lang="en-US" baseline="0" dirty="0" smtClean="0"/>
-              <a:t> &lt;% %&gt; all over the place</a:t>
-            </a:r>
-          </a:p>
-          <a:p>
-            <a:r>
-              <a:rPr lang="en-US" baseline="0" dirty="0" smtClean="0"/>
-              <a:t>Atlas adds update panel, whole new set of problems</a:t>
-            </a:r>
-          </a:p>
-          <a:p>
-            <a:endParaRPr lang="en-US" dirty="0"/>
+              <a:t>Speaking Point: “So</a:t>
+            </a:r>
           </a:p>
         </p:txBody>
       </p:sp>
@@ -1118,73 +1246,35 @@
           <a:p>
             <a:r>
               <a:rPr lang="en-US" dirty="0" smtClean="0"/>
-              <a:t>The spaghetti</a:t>
+              <a:t>New offering from Microsoft</a:t>
+            </a:r>
+          </a:p>
+          <a:p>
+            <a:r>
+              <a:rPr lang="en-US" dirty="0" smtClean="0"/>
+              <a:t>Shared source project</a:t>
             </a:r>
             <a:r>
               <a:rPr lang="en-US" baseline="0" dirty="0" smtClean="0"/>
-              <a:t> of the </a:t>
-            </a:r>
-            <a:r>
-              <a:rPr lang="en-US" baseline="0" dirty="0" err="1" smtClean="0"/>
-              <a:t>page_load</a:t>
-            </a:r>
+              <a:t> (similar to the AJAX Toolkit, which is the first I remember)</a:t>
+            </a:r>
+            <a:endParaRPr lang="en-US" dirty="0" smtClean="0"/>
+          </a:p>
+          <a:p>
+            <a:r>
+              <a:rPr lang="en-US" dirty="0" smtClean="0"/>
+              <a:t>Expand on not a replacement to </a:t>
+            </a:r>
+            <a:r>
+              <a:rPr lang="en-US" dirty="0" err="1" smtClean="0"/>
+              <a:t>WebForms</a:t>
+            </a:r>
+            <a:endParaRPr lang="en-US" dirty="0" smtClean="0"/>
+          </a:p>
+          <a:p>
             <a:r>
               <a:rPr lang="en-US" baseline="0" dirty="0" smtClean="0"/>
-              <a:t>. (</a:t>
-            </a:r>
-            <a:r>
-              <a:rPr lang="en-US" dirty="0" smtClean="0"/>
-              <a:t>A steaming pile of </a:t>
-            </a:r>
-            <a:r>
-              <a:rPr lang="en-US" dirty="0" err="1" smtClean="0"/>
-              <a:t>Page_Load</a:t>
-            </a:r>
-            <a:r>
-              <a:rPr lang="en-US" dirty="0" smtClean="0"/>
-              <a:t>)</a:t>
-            </a:r>
-          </a:p>
-          <a:p>
-            <a:r>
-              <a:rPr lang="en-US" dirty="0" smtClean="0"/>
-              <a:t>Neal</a:t>
-            </a:r>
-            <a:r>
-              <a:rPr lang="en-US" baseline="0" dirty="0" smtClean="0"/>
-              <a:t> Ford: “Bad developer will move heaven and Earth to do the wrong thing.”</a:t>
-            </a:r>
-          </a:p>
-          <a:p>
-            <a:r>
-              <a:rPr lang="en-US" baseline="0" dirty="0" smtClean="0"/>
-              <a:t>Mix of presentation and logic in the code behind, no Separation of Concerns</a:t>
-            </a:r>
-          </a:p>
-          <a:p>
-            <a:r>
-              <a:rPr lang="en-US" baseline="0" dirty="0" smtClean="0"/>
-              <a:t>Extremely difficult to test code behinds</a:t>
-            </a:r>
-          </a:p>
-          <a:p>
-            <a:pPr marL="228600" indent="-228600">
-              <a:buFont typeface="+mj-lt"/>
-              <a:buAutoNum type="arabicPeriod"/>
-            </a:pPr>
-            <a:r>
-              <a:rPr lang="en-US" baseline="0" dirty="0" smtClean="0"/>
-              <a:t>Dependent on web server to run</a:t>
-            </a:r>
-          </a:p>
-          <a:p>
-            <a:pPr marL="228600" indent="-228600">
-              <a:buFont typeface="+mj-lt"/>
-              <a:buAutoNum type="arabicPeriod"/>
-            </a:pPr>
-            <a:r>
-              <a:rPr lang="en-US" baseline="0" dirty="0" smtClean="0"/>
-              <a:t>Concrete classes on the web server run </a:t>
+              <a:t> - Alternative to </a:t>
             </a:r>
             <a:r>
               <a:rPr lang="en-US" baseline="0" dirty="0" err="1" smtClean="0"/>
@@ -1193,30 +1283,31 @@
             <a:endParaRPr lang="en-US" baseline="0" dirty="0" smtClean="0"/>
           </a:p>
           <a:p>
-            <a:pPr marL="228600" indent="-228600">
-              <a:buFont typeface="+mj-lt"/>
-              <a:buAutoNum type="arabicPeriod"/>
-            </a:pPr>
             <a:r>
               <a:rPr lang="en-US" baseline="0" dirty="0" smtClean="0"/>
-              <a:t>No way to fake or mock those classes</a:t>
-            </a:r>
-          </a:p>
-          <a:p>
-            <a:pPr marL="228600" indent="-228600">
-              <a:buFont typeface="+mj-lt"/>
-              <a:buAutoNum type="arabicPeriod"/>
-            </a:pPr>
-            <a:endParaRPr lang="en-US" baseline="0" dirty="0" smtClean="0"/>
-          </a:p>
-          <a:p>
-            <a:pPr marL="228600" indent="-228600">
-              <a:buFont typeface="+mj-lt"/>
-              <a:buNone/>
-            </a:pPr>
+              <a:t> - </a:t>
+            </a:r>
+            <a:r>
+              <a:rPr lang="en-US" baseline="0" dirty="0" err="1" smtClean="0"/>
+              <a:t>WebForms</a:t>
+            </a:r>
             <a:r>
               <a:rPr lang="en-US" baseline="0" dirty="0" smtClean="0"/>
-              <a:t>Speaking Point: “So</a:t>
+              <a:t> not going away</a:t>
+            </a:r>
+          </a:p>
+          <a:p>
+            <a:r>
+              <a:rPr lang="en-US" baseline="0" dirty="0" smtClean="0"/>
+              <a:t> - Not </a:t>
+            </a:r>
+            <a:r>
+              <a:rPr lang="en-US" baseline="0" dirty="0" err="1" smtClean="0"/>
+              <a:t>WebForms</a:t>
+            </a:r>
+            <a:r>
+              <a:rPr lang="en-US" baseline="0" dirty="0" smtClean="0"/>
+              <a:t> 4.0</a:t>
             </a:r>
           </a:p>
         </p:txBody>
@@ -1299,71 +1390,75 @@
           </a:bodyPr>
           <a:lstStyle/>
           <a:p>
+            <a:pPr marL="228600" indent="-228600">
+              <a:buNone/>
+            </a:pPr>
             <a:r>
               <a:rPr lang="en-US" dirty="0" smtClean="0"/>
-              <a:t>New offering from Microsoft</a:t>
-            </a:r>
-          </a:p>
-          <a:p>
-            <a:r>
-              <a:rPr lang="en-US" dirty="0" smtClean="0"/>
-              <a:t>Shared source project</a:t>
+              <a:t>Encourage</a:t>
             </a:r>
             <a:r>
               <a:rPr lang="en-US" baseline="0" dirty="0" smtClean="0"/>
-              <a:t> (similar to the AJAX Toolkit, which is the first I remember)</a:t>
-            </a:r>
-            <a:endParaRPr lang="en-US" dirty="0" smtClean="0"/>
-          </a:p>
-          <a:p>
-            <a:r>
-              <a:rPr lang="en-US" dirty="0" smtClean="0"/>
-              <a:t>Expand on not a replacement to </a:t>
-            </a:r>
-            <a:r>
-              <a:rPr lang="en-US" dirty="0" err="1" smtClean="0"/>
-              <a:t>WebForms</a:t>
-            </a:r>
-            <a:endParaRPr lang="en-US" dirty="0" smtClean="0"/>
-          </a:p>
-          <a:p>
+              <a:t> use of OOP principles</a:t>
+            </a:r>
+          </a:p>
+          <a:p>
+            <a:pPr marL="685800" lvl="1" indent="-228600">
+              <a:buAutoNum type="arabicPeriod"/>
+            </a:pPr>
             <a:r>
               <a:rPr lang="en-US" baseline="0" dirty="0" smtClean="0"/>
-              <a:t> - Alternative to </a:t>
+              <a:t>Separation of Concerns</a:t>
+            </a:r>
+          </a:p>
+          <a:p>
+            <a:pPr marL="685800" lvl="1" indent="-228600">
+              <a:buAutoNum type="arabicPeriod"/>
+            </a:pPr>
+            <a:r>
+              <a:rPr lang="en-US" baseline="0" dirty="0" smtClean="0"/>
+              <a:t>Single </a:t>
             </a:r>
             <a:r>
               <a:rPr lang="en-US" baseline="0" dirty="0" err="1" smtClean="0"/>
-              <a:t>WebForms</a:t>
+              <a:t>Responsibilty</a:t>
             </a:r>
             <a:endParaRPr lang="en-US" baseline="0" dirty="0" smtClean="0"/>
           </a:p>
           <a:p>
+            <a:pPr marL="685800" lvl="1" indent="-228600">
+              <a:buAutoNum type="arabicPeriod"/>
+            </a:pPr>
             <a:r>
               <a:rPr lang="en-US" baseline="0" dirty="0" smtClean="0"/>
-              <a:t> - </a:t>
+              <a:t>Dependencies are abstracted out to </a:t>
             </a:r>
             <a:r>
               <a:rPr lang="en-US" baseline="0" dirty="0" err="1" smtClean="0"/>
-              <a:t>WebForms</a:t>
+              <a:t>HttpContextBase</a:t>
             </a:r>
             <a:r>
               <a:rPr lang="en-US" baseline="0" dirty="0" smtClean="0"/>
-              <a:t> not going away</a:t>
-            </a:r>
-          </a:p>
-          <a:p>
+              <a:t>, </a:t>
+            </a:r>
+            <a:r>
+              <a:rPr lang="en-US" baseline="0" dirty="0" err="1" smtClean="0"/>
+              <a:t>HttpRequestBase</a:t>
+            </a:r>
             <a:r>
               <a:rPr lang="en-US" baseline="0" dirty="0" smtClean="0"/>
-              <a:t> - Not </a:t>
-            </a:r>
-            <a:r>
-              <a:rPr lang="en-US" baseline="0" dirty="0" err="1" smtClean="0"/>
-              <a:t>WebForms</a:t>
-            </a:r>
+              <a:t>, etc</a:t>
+            </a:r>
+          </a:p>
+          <a:p>
+            <a:pPr marL="685800" lvl="1" indent="-228600">
+              <a:buAutoNum type="arabicPeriod"/>
+            </a:pPr>
             <a:r>
               <a:rPr lang="en-US" baseline="0" dirty="0" smtClean="0"/>
-              <a:t> 4.0</a:t>
-            </a:r>
+              <a:t>All Http classes now easily mocked</a:t>
+            </a:r>
+            <a:endParaRPr lang="en-US" dirty="0"/>
           </a:p>
         </p:txBody>
       </p:sp>
@@ -1449,70 +1544,82 @@
               <a:buNone/>
             </a:pPr>
             <a:r>
+              <a:rPr lang="en-US" baseline="0" dirty="0" smtClean="0"/>
+              <a:t>More control over your HTML</a:t>
+            </a:r>
+          </a:p>
+          <a:p>
+            <a:pPr marL="228600" indent="-228600">
+              <a:buNone/>
+            </a:pPr>
+            <a:r>
+              <a:rPr lang="en-US" baseline="0" dirty="0" smtClean="0"/>
+              <a:t>Bye </a:t>
+            </a:r>
+            <a:r>
+              <a:rPr lang="en-US" baseline="0" dirty="0" err="1" smtClean="0"/>
+              <a:t>bye</a:t>
+            </a:r>
+            <a:r>
+              <a:rPr lang="en-US" baseline="0" dirty="0" smtClean="0"/>
+              <a:t> naming container</a:t>
+            </a:r>
+          </a:p>
+          <a:p>
+            <a:pPr marL="228600" indent="-228600">
+              <a:buNone/>
+            </a:pPr>
+            <a:r>
+              <a:rPr lang="en-US" baseline="0" dirty="0" err="1" smtClean="0"/>
+              <a:t>Runat</a:t>
+            </a:r>
+            <a:r>
+              <a:rPr lang="en-US" baseline="0" dirty="0" smtClean="0"/>
+              <a:t>=server no longer needed</a:t>
+            </a:r>
+            <a:endParaRPr lang="en-US" dirty="0" smtClean="0"/>
+          </a:p>
+          <a:p>
+            <a:pPr marL="228600" indent="-228600">
+              <a:buNone/>
+            </a:pPr>
+            <a:r>
               <a:rPr lang="en-US" dirty="0" smtClean="0"/>
-              <a:t>Encourage</a:t>
+              <a:t>Separation of concerns, keep business logic out</a:t>
             </a:r>
             <a:r>
               <a:rPr lang="en-US" baseline="0" dirty="0" smtClean="0"/>
-              <a:t> use of OOP principles</a:t>
-            </a:r>
-          </a:p>
-          <a:p>
-            <a:pPr marL="685800" lvl="1" indent="-228600">
-              <a:buAutoNum type="arabicPeriod"/>
+              <a:t> of</a:t>
+            </a:r>
+            <a:r>
+              <a:rPr lang="en-US" dirty="0" smtClean="0"/>
+              <a:t> your presentation code</a:t>
+            </a:r>
+          </a:p>
+          <a:p>
+            <a:pPr marL="228600" indent="-228600">
+              <a:buNone/>
             </a:pPr>
             <a:r>
+              <a:rPr lang="en-US" dirty="0" smtClean="0"/>
+              <a:t>Use</a:t>
+            </a:r>
+            <a:r>
               <a:rPr lang="en-US" baseline="0" dirty="0" smtClean="0"/>
-              <a:t>Separation of Concerns</a:t>
-            </a:r>
-          </a:p>
-          <a:p>
-            <a:pPr marL="685800" lvl="1" indent="-228600">
-              <a:buAutoNum type="arabicPeriod"/>
+              <a:t> of CSS easier</a:t>
+            </a:r>
+          </a:p>
+          <a:p>
+            <a:pPr marL="228600" indent="-228600">
+              <a:buNone/>
             </a:pPr>
             <a:r>
               <a:rPr lang="en-US" baseline="0" dirty="0" smtClean="0"/>
-              <a:t>Single </a:t>
-            </a:r>
-            <a:r>
-              <a:rPr lang="en-US" baseline="0" dirty="0" err="1" smtClean="0"/>
-              <a:t>Responsibilty</a:t>
-            </a:r>
-            <a:endParaRPr lang="en-US" baseline="0" dirty="0" smtClean="0"/>
-          </a:p>
-          <a:p>
-            <a:pPr marL="685800" lvl="1" indent="-228600">
-              <a:buAutoNum type="arabicPeriod"/>
-            </a:pPr>
-            <a:r>
-              <a:rPr lang="en-US" baseline="0" dirty="0" smtClean="0"/>
-              <a:t>Dependencies are abstracted out to </a:t>
-            </a:r>
-            <a:r>
-              <a:rPr lang="en-US" baseline="0" dirty="0" err="1" smtClean="0"/>
-              <a:t>HttpContextBase</a:t>
-            </a:r>
-            <a:r>
-              <a:rPr lang="en-US" baseline="0" dirty="0" smtClean="0"/>
-              <a:t>, </a:t>
-            </a:r>
-            <a:r>
-              <a:rPr lang="en-US" baseline="0" dirty="0" err="1" smtClean="0"/>
-              <a:t>HttpRequestBase</a:t>
-            </a:r>
-            <a:r>
-              <a:rPr lang="en-US" baseline="0" dirty="0" smtClean="0"/>
-              <a:t>, etc</a:t>
-            </a:r>
-          </a:p>
-          <a:p>
-            <a:pPr marL="685800" lvl="1" indent="-228600">
-              <a:buAutoNum type="arabicPeriod"/>
-            </a:pPr>
-            <a:r>
-              <a:rPr lang="en-US" baseline="0" dirty="0" smtClean="0"/>
-              <a:t>All Http classes now easily mocked</a:t>
-            </a:r>
+              <a:t>Notice return of “Classic ASP” type code</a:t>
+            </a:r>
+            <a:endParaRPr lang="en-US" dirty="0" smtClean="0"/>
+          </a:p>
+          <a:p>
             <a:endParaRPr lang="en-US" dirty="0"/>
           </a:p>
         </p:txBody>
@@ -1595,87 +1702,72 @@
           </a:bodyPr>
           <a:lstStyle/>
           <a:p>
-            <a:pPr marL="228600" indent="-228600">
-              <a:buNone/>
+            <a:r>
+              <a:rPr lang="en-US" baseline="0" dirty="0" smtClean="0"/>
+              <a:t>Routing</a:t>
+            </a:r>
+            <a:endParaRPr lang="en-US" dirty="0" smtClean="0"/>
+          </a:p>
+          <a:p>
+            <a:pPr lvl="1">
+              <a:buFont typeface="Arial" pitchFamily="34" charset="0"/>
+              <a:buChar char="•"/>
             </a:pPr>
             <a:r>
+              <a:rPr lang="en-US" dirty="0" smtClean="0"/>
+              <a:t>Maps incoming URLs to the correct Controllers</a:t>
+            </a:r>
+          </a:p>
+          <a:p>
+            <a:pPr lvl="1">
+              <a:buFont typeface="Arial" pitchFamily="34" charset="0"/>
+              <a:buChar char="•"/>
+            </a:pPr>
+            <a:r>
+              <a:rPr lang="en-US" dirty="0" smtClean="0"/>
+              <a:t>Maps outgoing URLs so they can be called back</a:t>
+            </a:r>
+          </a:p>
+          <a:p>
+            <a:pPr lvl="1">
+              <a:buFont typeface="Arial" pitchFamily="34" charset="0"/>
+              <a:buChar char="•"/>
+            </a:pPr>
+            <a:r>
+              <a:rPr lang="en-US" dirty="0" smtClean="0"/>
+              <a:t>Originally part of </a:t>
+            </a:r>
+            <a:r>
+              <a:rPr lang="en-US" dirty="0" err="1" smtClean="0"/>
+              <a:t>mvc</a:t>
+            </a:r>
+            <a:r>
+              <a:rPr lang="en-US" dirty="0" smtClean="0"/>
+              <a:t> namespace, has</a:t>
+            </a:r>
+            <a:r>
               <a:rPr lang="en-US" baseline="0" dirty="0" smtClean="0"/>
-              <a:t>More control over your HTML</a:t>
-            </a:r>
-          </a:p>
-          <a:p>
-            <a:pPr marL="228600" indent="-228600">
-              <a:buNone/>
+              <a:t> been moved “up” to web namespace</a:t>
+            </a:r>
+          </a:p>
+          <a:p>
+            <a:pPr lvl="1">
+              <a:buFont typeface="Arial" pitchFamily="34" charset="0"/>
+              <a:buChar char="•"/>
             </a:pPr>
             <a:r>
               <a:rPr lang="en-US" baseline="0" dirty="0" smtClean="0"/>
-              <a:t>Bye </a:t>
+              <a:t>RESTFUL – uses get and post out of the box (Adam </a:t>
             </a:r>
             <a:r>
               <a:rPr lang="en-US" baseline="0" dirty="0" err="1" smtClean="0"/>
-              <a:t>bye</a:t>
+              <a:t>Tybor’s</a:t>
             </a:r>
             <a:r>
               <a:rPr lang="en-US" baseline="0" dirty="0" smtClean="0"/>
-              <a:t> naming container</a:t>
-            </a:r>
-          </a:p>
-          <a:p>
-            <a:pPr marL="228600" indent="-228600">
-              <a:buNone/>
-            </a:pPr>
-            <a:r>
-              <a:rPr lang="en-US" baseline="0" dirty="0" err="1" smtClean="0"/>
-              <a:t>Runat</a:t>
-            </a:r>
-            <a:r>
-              <a:rPr lang="en-US" baseline="0" dirty="0" smtClean="0"/>
-              <a:t>=server no longer needed</a:t>
+              <a:t> blog post)</a:t>
             </a:r>
             <a:endParaRPr lang="en-US" dirty="0" smtClean="0"/>
-          </a:p>
-          <a:p>
-            <a:pPr marL="228600" indent="-228600">
-              <a:buNone/>
-            </a:pPr>
-            <a:r>
-              <a:rPr lang="en-US" dirty="0" smtClean="0"/>
-              <a:t>Separation of concerns, keep business logic out</a:t>
-            </a:r>
-            <a:r>
-              <a:rPr lang="en-US" baseline="0" dirty="0" smtClean="0"/>
-              <a:t> of</a:t>
-            </a:r>
-            <a:r>
-              <a:rPr lang="en-US" dirty="0" smtClean="0"/>
-              <a:t> your presentation code</a:t>
-            </a:r>
-          </a:p>
-          <a:p>
-            <a:pPr marL="228600" indent="-228600">
-              <a:buNone/>
-            </a:pPr>
-            <a:r>
-              <a:rPr lang="en-US" dirty="0" smtClean="0"/>
-              <a:t>Use</a:t>
-            </a:r>
-            <a:r>
-              <a:rPr lang="en-US" baseline="0" dirty="0" smtClean="0"/>
-              <a:t> of CSS easier</a:t>
-            </a:r>
-          </a:p>
-          <a:p>
-            <a:pPr marL="228600" indent="-228600">
-              <a:buNone/>
-            </a:pPr>
-            <a:r>
-              <a:rPr lang="en-US" baseline="0" dirty="0" smtClean="0"/>
-              <a:t>Notice return of “Classic ASP” type code</a:t>
-            </a:r>
-            <a:endParaRPr lang="en-US" dirty="0" smtClean="0"/>
-          </a:p>
-          <a:p>
-            <a:endParaRPr lang="en-US" dirty="0"/>
           </a:p>
         </p:txBody>
       </p:sp>
@@ -1758,71 +1850,64 @@
           <a:lstStyle/>
           <a:p>
             <a:r>
-              <a:rPr lang="en-US" baseline="0" dirty="0" smtClean="0"/>
-              <a:t>Routing</a:t>
-            </a:r>
-            <a:endParaRPr lang="en-US" dirty="0" smtClean="0"/>
-          </a:p>
-          <a:p>
-            <a:pPr lvl="1">
-              <a:buFont typeface="Arial" pitchFamily="34" charset="0"/>
-              <a:buChar char="•"/>
+              <a:rPr lang="en-US" sz="1200" dirty="0" smtClean="0"/>
+              <a:t>What do you get out of the box?</a:t>
+            </a:r>
+          </a:p>
+          <a:p>
+            <a:pPr marL="228600" indent="-228600">
+              <a:buAutoNum type="arabicPeriod"/>
             </a:pPr>
             <a:r>
-              <a:rPr lang="en-US" dirty="0" smtClean="0"/>
-              <a:t>Maps incoming URLs to the correct Controllers</a:t>
-            </a:r>
-          </a:p>
-          <a:p>
-            <a:pPr lvl="1">
-              <a:buFont typeface="Arial" pitchFamily="34" charset="0"/>
-              <a:buChar char="•"/>
+              <a:rPr lang="en-US" sz="1200" baseline="0" dirty="0" smtClean="0"/>
+              <a:t>Working Sample App</a:t>
+            </a:r>
+          </a:p>
+          <a:p>
+            <a:pPr marL="685800" lvl="1" indent="-228600">
+              <a:buAutoNum type="arabicPeriod"/>
             </a:pPr>
             <a:r>
-              <a:rPr lang="en-US" dirty="0" smtClean="0"/>
-              <a:t>Maps outgoing URLs so they can be called back</a:t>
-            </a:r>
-          </a:p>
-          <a:p>
-            <a:pPr lvl="1">
-              <a:buFont typeface="Arial" pitchFamily="34" charset="0"/>
-              <a:buChar char="•"/>
+              <a:rPr lang="en-US" sz="1200" baseline="0" dirty="0" smtClean="0"/>
+              <a:t>Default Routing</a:t>
+            </a:r>
+          </a:p>
+          <a:p>
+            <a:pPr marL="685800" lvl="1" indent="-228600">
+              <a:buAutoNum type="arabicPeriod"/>
             </a:pPr>
             <a:r>
-              <a:rPr lang="en-US" dirty="0" smtClean="0"/>
-              <a:t>Originally part of </a:t>
-            </a:r>
-            <a:r>
-              <a:rPr lang="en-US" dirty="0" err="1" smtClean="0"/>
-              <a:t>mvc</a:t>
-            </a:r>
-            <a:r>
-              <a:rPr lang="en-US" dirty="0" smtClean="0"/>
-              <a:t> namespace, has</a:t>
-            </a:r>
-            <a:r>
-              <a:rPr lang="en-US" baseline="0" dirty="0" smtClean="0"/>
-              <a:t> been moved “up” to web namespace</a:t>
-            </a:r>
-          </a:p>
-          <a:p>
-            <a:pPr lvl="1">
-              <a:buFont typeface="Arial" pitchFamily="34" charset="0"/>
-              <a:buChar char="•"/>
+              <a:rPr lang="en-US" sz="1200" baseline="0" dirty="0" smtClean="0"/>
+              <a:t>Home Controller</a:t>
+            </a:r>
+          </a:p>
+          <a:p>
+            <a:pPr marL="685800" lvl="1" indent="-228600">
+              <a:buAutoNum type="arabicPeriod"/>
             </a:pPr>
             <a:r>
-              <a:rPr lang="en-US" baseline="0" dirty="0" smtClean="0"/>
-              <a:t>RESTFUL – uses get and post out of the box (Adam </a:t>
-            </a:r>
-            <a:r>
-              <a:rPr lang="en-US" baseline="0" dirty="0" err="1" smtClean="0"/>
-              <a:t>Tybor’s</a:t>
-            </a:r>
-            <a:r>
-              <a:rPr lang="en-US" baseline="0" dirty="0" smtClean="0"/>
-              <a:t> blog post)</a:t>
-            </a:r>
-            <a:endParaRPr lang="en-US" dirty="0" smtClean="0"/>
+              <a:rPr lang="en-US" sz="1200" baseline="0" dirty="0" smtClean="0"/>
+              <a:t>Home and About Views</a:t>
+            </a:r>
+          </a:p>
+          <a:p>
+            <a:pPr marL="228600" indent="-228600">
+              <a:buAutoNum type="arabicPeriod"/>
+            </a:pPr>
+            <a:r>
+              <a:rPr lang="en-US" sz="1200" baseline="0" dirty="0" err="1" smtClean="0"/>
+              <a:t>WebFormsViewEngine</a:t>
+            </a:r>
+            <a:endParaRPr lang="en-US" sz="1200" baseline="0" dirty="0" smtClean="0"/>
+          </a:p>
+          <a:p>
+            <a:pPr marL="228600" indent="-228600">
+              <a:buAutoNum type="arabicPeriod"/>
+            </a:pPr>
+            <a:r>
+              <a:rPr lang="en-US" sz="1200" baseline="0" dirty="0" smtClean="0"/>
+              <a:t>Test Project</a:t>
+            </a:r>
           </a:p>
         </p:txBody>
       </p:sp>
@@ -1905,8 +1990,20 @@
           <a:lstStyle/>
           <a:p>
             <a:r>
-              <a:rPr lang="en-US" sz="1200" dirty="0" smtClean="0"/>
-              <a:t>What do you get out of the box?</a:t>
+              <a:rPr lang="en-US" dirty="0" smtClean="0"/>
+              <a:t>Back</a:t>
+            </a:r>
+            <a:r>
+              <a:rPr lang="en-US" baseline="0" dirty="0" smtClean="0"/>
+              <a:t> to </a:t>
+            </a:r>
+            <a:r>
+              <a:rPr lang="en-US" baseline="0" dirty="0" err="1" smtClean="0"/>
+              <a:t>Requset</a:t>
+            </a:r>
+            <a:r>
+              <a:rPr lang="en-US" baseline="0" dirty="0" smtClean="0"/>
+              <a:t> and Response</a:t>
             </a:r>
           </a:p>
           <a:p>
@@ -1914,35 +2011,8 @@
               <a:buAutoNum type="arabicPeriod"/>
             </a:pPr>
             <a:r>
-              <a:rPr lang="en-US" sz="1200" baseline="0" dirty="0" smtClean="0"/>
-              <a:t>Working Sample App</a:t>
-            </a:r>
-          </a:p>
-          <a:p>
-            <a:pPr marL="685800" lvl="1" indent="-228600">
-              <a:buAutoNum type="arabicPeriod"/>
-            </a:pPr>
-            <a:r>
-              <a:rPr lang="en-US" sz="1200" baseline="0" dirty="0" smtClean="0"/>
-              <a:t>Default Routing</a:t>
-            </a:r>
-          </a:p>
-          <a:p>
-            <a:pPr marL="685800" lvl="1" indent="-228600">
-              <a:buAutoNum type="arabicPeriod"/>
-            </a:pPr>
-            <a:r>
-              <a:rPr lang="en-US" sz="1200" baseline="0" dirty="0" smtClean="0"/>
-              <a:t>Home Controller</a:t>
-            </a:r>
-          </a:p>
-          <a:p>
-            <a:pPr marL="685800" lvl="1" indent="-228600">
-              <a:buAutoNum type="arabicPeriod"/>
-            </a:pPr>
-            <a:r>
-              <a:rPr lang="en-US" sz="1200" baseline="0" dirty="0" smtClean="0"/>
-              <a:t>Home and About Views</a:t>
+              <a:rPr lang="en-US" baseline="0" dirty="0" smtClean="0"/>
+              <a:t>Request comes in</a:t>
             </a:r>
           </a:p>
           <a:p>
@@ -1950,18 +2020,59 @@
               <a:buAutoNum type="arabicPeriod"/>
             </a:pPr>
             <a:r>
-              <a:rPr lang="en-US" sz="1200" baseline="0" dirty="0" err="1" smtClean="0"/>
-              <a:t>WebFormsViewEngine</a:t>
-            </a:r>
-            <a:endParaRPr lang="en-US" sz="1200" baseline="0" dirty="0" smtClean="0"/>
+              <a:rPr lang="en-US" baseline="0" dirty="0" smtClean="0"/>
+              <a:t>Controller interprets the request and decides what to do</a:t>
+            </a:r>
           </a:p>
           <a:p>
             <a:pPr marL="228600" indent="-228600">
               <a:buAutoNum type="arabicPeriod"/>
             </a:pPr>
             <a:r>
-              <a:rPr lang="en-US" sz="1200" baseline="0" dirty="0" smtClean="0"/>
-              <a:t>Test Project</a:t>
+              <a:rPr lang="en-US" baseline="0" dirty="0" smtClean="0"/>
+              <a:t>Application does something cool</a:t>
+            </a:r>
+          </a:p>
+          <a:p>
+            <a:pPr marL="228600" indent="-228600">
+              <a:buAutoNum type="arabicPeriod"/>
+            </a:pPr>
+            <a:r>
+              <a:rPr lang="en-US" baseline="0" dirty="0" smtClean="0"/>
+              <a:t>Response is sent back to the Internets</a:t>
+            </a:r>
+          </a:p>
+          <a:p>
+            <a:pPr marL="228600" indent="-228600">
+              <a:buAutoNum type="arabicPeriod"/>
+            </a:pPr>
+            <a:endParaRPr lang="en-US" baseline="0" dirty="0" smtClean="0"/>
+          </a:p>
+          <a:p>
+            <a:pPr marL="228600" indent="-228600">
+              <a:buNone/>
+            </a:pPr>
+            <a:r>
+              <a:rPr lang="en-US" baseline="0" dirty="0" smtClean="0"/>
+              <a:t>No Postback</a:t>
+            </a:r>
+          </a:p>
+          <a:p>
+            <a:pPr marL="228600" indent="-228600">
+              <a:buNone/>
+            </a:pPr>
+            <a:r>
+              <a:rPr lang="en-US" baseline="0" dirty="0" smtClean="0"/>
+              <a:t>Page lifecycle still happens (look at trace)</a:t>
+            </a:r>
+          </a:p>
+          <a:p>
+            <a:pPr marL="228600" indent="-228600">
+              <a:buNone/>
+            </a:pPr>
+            <a:r>
+              <a:rPr lang="en-US" baseline="0" dirty="0" smtClean="0"/>
+              <a:t>Still based on asp.net</a:t>
             </a:r>
           </a:p>
         </p:txBody>
@@ -2046,27 +2157,8 @@
           <a:p>
             <a:r>
               <a:rPr lang="en-US" dirty="0" smtClean="0"/>
-              <a:t>About</a:t>
-            </a:r>
-            <a:r>
-              <a:rPr lang="en-US" baseline="0" dirty="0" smtClean="0"/>
-              <a:t> me</a:t>
-            </a:r>
-          </a:p>
-          <a:p>
-            <a:r>
-              <a:rPr lang="en-US" baseline="0" dirty="0" smtClean="0"/>
-              <a:t>Live in Hilliard, OH</a:t>
-            </a:r>
-          </a:p>
-          <a:p>
-            <a:r>
-              <a:rPr lang="en-US" baseline="0" dirty="0" smtClean="0"/>
-              <a:t>Wife, two boys, and a black lab</a:t>
-            </a:r>
-          </a:p>
-          <a:p>
-            <a:endParaRPr lang="en-US" dirty="0"/>
+              <a:t>Love hockey, especially this guy…pay a lot to see him, at least.</a:t>
+            </a:r>
           </a:p>
         </p:txBody>
       </p:sp>
@@ -2148,30 +2240,42 @@
           </a:bodyPr>
           <a:lstStyle/>
           <a:p>
-            <a:r>
-              <a:rPr lang="en-US" dirty="0" smtClean="0"/>
-              <a:t>Back</a:t>
-            </a:r>
-            <a:r>
-              <a:rPr lang="en-US" baseline="0" dirty="0" smtClean="0"/>
-              <a:t> to </a:t>
-            </a:r>
-            <a:r>
-              <a:rPr lang="en-US" baseline="0" dirty="0" err="1" smtClean="0"/>
-              <a:t>Requset</a:t>
-            </a:r>
-            <a:r>
-              <a:rPr lang="en-US" baseline="0" dirty="0" smtClean="0"/>
-              <a:t> and Response</a:t>
-            </a:r>
-          </a:p>
-          <a:p>
             <a:pPr marL="228600" indent="-228600">
               <a:buAutoNum type="arabicPeriod"/>
             </a:pPr>
             <a:r>
+              <a:rPr lang="en-US" dirty="0" smtClean="0"/>
+              <a:t>Quick and dirty, plain old html. Id replaced</a:t>
+            </a:r>
+            <a:r>
               <a:rPr lang="en-US" baseline="0" dirty="0" smtClean="0"/>
-              <a:t>Request comes in</a:t>
+              <a:t> by classic asp-</a:t>
+            </a:r>
+            <a:r>
+              <a:rPr lang="en-US" baseline="0" dirty="0" err="1" smtClean="0"/>
+              <a:t>ish</a:t>
+            </a:r>
+            <a:r>
+              <a:rPr lang="en-US" baseline="0" dirty="0" smtClean="0"/>
+              <a:t> code</a:t>
+            </a:r>
+          </a:p>
+          <a:p>
+            <a:pPr marL="685800" lvl="1" indent="-228600">
+              <a:buAutoNum type="arabicPeriod"/>
+            </a:pPr>
+            <a:r>
+              <a:rPr lang="en-US" baseline="0" dirty="0" smtClean="0"/>
+              <a:t>Will work, but magic strings everywhere</a:t>
+            </a:r>
+          </a:p>
+          <a:p>
+            <a:pPr marL="685800" lvl="1" indent="-228600">
+              <a:buAutoNum type="arabicPeriod"/>
+            </a:pPr>
+            <a:r>
+              <a:rPr lang="en-US" baseline="0" dirty="0" smtClean="0"/>
+              <a:t>If your controller changes, refactoring here will be uncovered at runtime</a:t>
             </a:r>
           </a:p>
           <a:p>
@@ -2180,7 +2284,16 @@
             </a:pPr>
             <a:r>
               <a:rPr lang="en-US" baseline="0" dirty="0" smtClean="0"/>
-              <a:t>Controller interprets the request and decides what to do</a:t>
+              <a:t>Better way, as controller is implied. (Unless needed to move to a different controller)</a:t>
+            </a:r>
+          </a:p>
+          <a:p>
+            <a:pPr marL="685800" lvl="1" indent="-228600">
+              <a:buAutoNum type="arabicPeriod"/>
+            </a:pPr>
+            <a:r>
+              <a:rPr lang="en-US" baseline="0" dirty="0" smtClean="0"/>
+              <a:t>Controller changes will again be uncovered at runtime.</a:t>
             </a:r>
           </a:p>
           <a:p>
@@ -2189,16 +2302,24 @@
             </a:pPr>
             <a:r>
               <a:rPr lang="en-US" baseline="0" dirty="0" smtClean="0"/>
-              <a:t>Application does something cool</a:t>
-            </a:r>
-          </a:p>
-          <a:p>
-            <a:pPr marL="228600" indent="-228600">
+              <a:t>Best way, the view is strongly typed to the controller. </a:t>
+            </a:r>
+          </a:p>
+          <a:p>
+            <a:pPr marL="685800" lvl="1" indent="-228600">
               <a:buAutoNum type="arabicPeriod"/>
             </a:pPr>
             <a:r>
               <a:rPr lang="en-US" baseline="0" dirty="0" smtClean="0"/>
-              <a:t>Response is sent back to the Internets</a:t>
+              <a:t>Controller change here will break the build…woo-</a:t>
+            </a:r>
+            <a:r>
+              <a:rPr lang="en-US" baseline="0" dirty="0" err="1" smtClean="0"/>
+              <a:t>hoo</a:t>
+            </a:r>
+            <a:r>
+              <a:rPr lang="en-US" baseline="0" dirty="0" smtClean="0"/>
+              <a:t>! Fail early!</a:t>
             </a:r>
           </a:p>
           <a:p>
@@ -2206,33 +2327,6 @@
               <a:buAutoNum type="arabicPeriod"/>
             </a:pPr>
             <a:endParaRPr lang="en-US" baseline="0" dirty="0" smtClean="0"/>
-          </a:p>
-          <a:p>
-            <a:pPr marL="228600" indent="-228600">
-              <a:buNone/>
-            </a:pPr>
-            <a:r>
-              <a:rPr lang="en-US" baseline="0" dirty="0" smtClean="0"/>
-              <a:t>No Postback</a:t>
-            </a:r>
-          </a:p>
-          <a:p>
-            <a:pPr marL="228600" indent="-228600">
-              <a:buNone/>
-            </a:pPr>
-            <a:r>
-              <a:rPr lang="en-US" baseline="0" dirty="0" smtClean="0"/>
-              <a:t>Page lifecycle still happens (look at trace)</a:t>
-            </a:r>
-          </a:p>
-          <a:p>
-            <a:pPr marL="228600" indent="-228600">
-              <a:buNone/>
-            </a:pPr>
-            <a:r>
-              <a:rPr lang="en-US" baseline="0" dirty="0" smtClean="0"/>
-              <a:t>Still based on asp.net</a:t>
-            </a:r>
           </a:p>
         </p:txBody>
       </p:sp>
@@ -2314,93 +2408,68 @@
           </a:bodyPr>
           <a:lstStyle/>
           <a:p>
-            <a:pPr marL="228600" indent="-228600">
-              <a:buAutoNum type="arabicPeriod"/>
-            </a:pPr>
             <a:r>
               <a:rPr lang="en-US" dirty="0" smtClean="0"/>
-              <a:t>Quick and dirty, plain old html. Id replaced</a:t>
+              <a:t>Open source project</a:t>
             </a:r>
             <a:r>
               <a:rPr lang="en-US" baseline="0" dirty="0" smtClean="0"/>
-              <a:t> by classic asp-</a:t>
+              <a:t> on </a:t>
             </a:r>
             <a:r>
               <a:rPr lang="en-US" baseline="0" dirty="0" err="1" smtClean="0"/>
-              <a:t>ish</a:t>
+              <a:t>CodePlex</a:t>
+            </a:r>
+            <a:endParaRPr lang="en-US" baseline="0" dirty="0" smtClean="0"/>
+          </a:p>
+          <a:p>
+            <a:r>
+              <a:rPr lang="en-US" dirty="0" smtClean="0"/>
+              <a:t>Adding code for</a:t>
             </a:r>
             <a:r>
               <a:rPr lang="en-US" baseline="0" dirty="0" smtClean="0"/>
-              <a:t> code</a:t>
-            </a:r>
-          </a:p>
-          <a:p>
-            <a:pPr marL="685800" lvl="1" indent="-228600">
-              <a:buAutoNum type="arabicPeriod"/>
-            </a:pPr>
+              <a:t> MVC to work with Castle, </a:t>
+            </a:r>
+            <a:r>
+              <a:rPr lang="en-US" baseline="0" dirty="0" err="1" smtClean="0"/>
+              <a:t>Spring.Net</a:t>
+            </a:r>
             <a:r>
               <a:rPr lang="en-US" baseline="0" dirty="0" smtClean="0"/>
-              <a:t>Will work, but magic strings everywhere</a:t>
-            </a:r>
-          </a:p>
-          <a:p>
-            <a:pPr marL="685800" lvl="1" indent="-228600">
-              <a:buAutoNum type="arabicPeriod"/>
-            </a:pPr>
+              <a:t>, Structure Map, etc.</a:t>
+            </a:r>
+          </a:p>
+          <a:p>
             <a:r>
               <a:rPr lang="en-US" baseline="0" dirty="0" smtClean="0"/>
-              <a:t>If your controller changes, refactoring here will be uncovered at runtime</a:t>
-            </a:r>
-          </a:p>
-          <a:p>
-            <a:pPr marL="228600" indent="-228600">
-              <a:buAutoNum type="arabicPeriod"/>
-            </a:pPr>
+              <a:t>Original </a:t>
+            </a:r>
+            <a:r>
+              <a:rPr lang="en-US" baseline="0" dirty="0" err="1" smtClean="0"/>
+              <a:t>HtmlHelpers</a:t>
+            </a:r>
             <a:r>
               <a:rPr lang="en-US" baseline="0" dirty="0" smtClean="0"/>
-              <a:t>Better way, as controller is implied. (Unless needed to move to a different controller)</a:t>
-            </a:r>
-          </a:p>
-          <a:p>
-            <a:pPr marL="685800" lvl="1" indent="-228600">
-              <a:buAutoNum type="arabicPeriod"/>
-            </a:pPr>
+              <a:t> folded into release 2, </a:t>
+            </a:r>
+            <a:r>
+              <a:rPr lang="en-US" baseline="0" dirty="0" err="1" smtClean="0"/>
+              <a:t>MvcContrib</a:t>
+            </a:r>
             <a:r>
               <a:rPr lang="en-US" baseline="0" dirty="0" smtClean="0"/>
-              <a:t>Controller changes will again be uncovered at runtime.</a:t>
-            </a:r>
-          </a:p>
-          <a:p>
-            <a:pPr marL="228600" indent="-228600">
-              <a:buAutoNum type="arabicPeriod"/>
-            </a:pPr>
+              <a:t> picking up where they left off</a:t>
+            </a:r>
+          </a:p>
+          <a:p>
             <a:r>
               <a:rPr lang="en-US" baseline="0" dirty="0" smtClean="0"/>
-              <a:t>Best way, the view is strongly typed to the controller. </a:t>
-            </a:r>
-          </a:p>
-          <a:p>
-            <a:pPr marL="685800" lvl="1" indent="-228600">
-              <a:buAutoNum type="arabicPeriod"/>
-            </a:pPr>
-            <a:r>
-              <a:rPr lang="en-US" baseline="0" dirty="0" smtClean="0"/>
-              <a:t>Controller change here will break the build…woo-</a:t>
-            </a:r>
-            <a:r>
-              <a:rPr lang="en-US" baseline="0" dirty="0" err="1" smtClean="0"/>
-              <a:t>hoo</a:t>
-            </a:r>
-            <a:r>
-              <a:rPr lang="en-US" baseline="0" dirty="0" smtClean="0"/>
-              <a:t>! Fail early!</a:t>
-            </a:r>
-          </a:p>
-          <a:p>
-            <a:pPr marL="228600" indent="-228600">
-              <a:buAutoNum type="arabicPeriod"/>
-            </a:pPr>
-            <a:endParaRPr lang="en-US" baseline="0" dirty="0" smtClean="0"/>
+              <a:t>Add on code for VS and for R#</a:t>
+            </a:r>
+          </a:p>
+          <a:p>
+            <a:endParaRPr lang="en-US" dirty="0"/>
           </a:p>
         </p:txBody>
       </p:sp>
@@ -2482,67 +2551,97 @@
           </a:bodyPr>
           <a:lstStyle/>
           <a:p>
-            <a:r>
-              <a:rPr lang="en-US" dirty="0" smtClean="0"/>
-              <a:t>Open source project</a:t>
-            </a:r>
+            <a:pPr marL="228600" indent="-228600">
+              <a:buAutoNum type="arabicPeriod"/>
+            </a:pPr>
             <a:r>
               <a:rPr lang="en-US" baseline="0" dirty="0" smtClean="0"/>
-              <a:t> on </a:t>
+              <a:t>Still going to fit larger, data driven sites better. (At least for now.)</a:t>
+            </a:r>
+          </a:p>
+          <a:p>
+            <a:pPr marL="228600" indent="-228600">
+              <a:buAutoNum type="arabicPeriod"/>
+            </a:pPr>
+            <a:r>
+              <a:rPr lang="en-US" baseline="0" dirty="0" smtClean="0"/>
+              <a:t>Much more mature framework to build </a:t>
             </a:r>
             <a:r>
               <a:rPr lang="en-US" baseline="0" dirty="0" err="1" smtClean="0"/>
-              <a:t>CodePlex</a:t>
+              <a:t>ASP.Net</a:t>
+            </a:r>
+            <a:r>
+              <a:rPr lang="en-US" baseline="0" dirty="0" smtClean="0"/>
+              <a:t> apps on</a:t>
+            </a:r>
+          </a:p>
+          <a:p>
+            <a:pPr marL="228600" indent="-228600">
+              <a:buAutoNum type="arabicPeriod"/>
+            </a:pPr>
+            <a:r>
+              <a:rPr lang="en-US" baseline="0" dirty="0" smtClean="0"/>
+              <a:t>Quicker deployment, more drag and drop</a:t>
+            </a:r>
+          </a:p>
+          <a:p>
+            <a:pPr marL="228600" indent="-228600">
+              <a:buAutoNum type="arabicPeriod"/>
+            </a:pPr>
+            <a:r>
+              <a:rPr lang="en-US" baseline="0" dirty="0" smtClean="0"/>
+              <a:t>More Better UI controls available.</a:t>
+            </a:r>
+          </a:p>
+          <a:p>
+            <a:pPr marL="228600" indent="-228600">
+              <a:buAutoNum type="arabicPeriod"/>
+            </a:pPr>
+            <a:r>
+              <a:rPr lang="en-US" baseline="0" dirty="0" smtClean="0"/>
+              <a:t>Lots of 3</a:t>
+            </a:r>
+            <a:r>
+              <a:rPr lang="en-US" baseline="30000" dirty="0" smtClean="0"/>
+              <a:t>rd</a:t>
+            </a:r>
+            <a:r>
+              <a:rPr lang="en-US" baseline="0" dirty="0" smtClean="0"/>
+              <a:t> party controls available…like our Friends at </a:t>
+            </a:r>
+            <a:r>
+              <a:rPr lang="en-US" baseline="0" dirty="0" err="1" smtClean="0"/>
+              <a:t>Telerik</a:t>
             </a:r>
             <a:endParaRPr lang="en-US" baseline="0" dirty="0" smtClean="0"/>
           </a:p>
           <a:p>
-            <a:r>
-              <a:rPr lang="en-US" dirty="0" smtClean="0"/>
-              <a:t>Adding code for</a:t>
-            </a:r>
+            <a:pPr marL="228600" indent="-228600">
+              <a:buAutoNum type="arabicPeriod"/>
+            </a:pPr>
             <a:r>
               <a:rPr lang="en-US" baseline="0" dirty="0" smtClean="0"/>
-              <a:t> MVC to work with Castle, </a:t>
-            </a:r>
-            <a:r>
-              <a:rPr lang="en-US" baseline="0" dirty="0" err="1" smtClean="0"/>
-              <a:t>Spring.Net</a:t>
-            </a:r>
+              <a:t>Better Documentation</a:t>
+            </a:r>
+          </a:p>
+          <a:p>
+            <a:pPr marL="228600" indent="-228600">
+              <a:buAutoNum type="arabicPeriod"/>
+            </a:pPr>
             <a:r>
               <a:rPr lang="en-US" baseline="0" dirty="0" smtClean="0"/>
-              <a:t>, Structure Map, etc.</a:t>
-            </a:r>
-          </a:p>
-          <a:p>
+              <a:t>More examples and code samples to draw from</a:t>
+            </a:r>
+          </a:p>
+          <a:p>
+            <a:pPr marL="228600" indent="-228600">
+              <a:buAutoNum type="arabicPeriod"/>
+            </a:pPr>
             <a:r>
               <a:rPr lang="en-US" baseline="0" dirty="0" smtClean="0"/>
-              <a:t>Original </a:t>
-            </a:r>
-            <a:r>
-              <a:rPr lang="en-US" baseline="0" dirty="0" err="1" smtClean="0"/>
-              <a:t>HtmlHelpers</a:t>
-            </a:r>
-            <a:r>
-              <a:rPr lang="en-US" baseline="0" dirty="0" smtClean="0"/>
-              <a:t> folded into release 2, </a:t>
-            </a:r>
-            <a:r>
-              <a:rPr lang="en-US" baseline="0" dirty="0" err="1" smtClean="0"/>
-              <a:t>MvcContrib</a:t>
-            </a:r>
-            <a:r>
-              <a:rPr lang="en-US" baseline="0" dirty="0" smtClean="0"/>
-              <a:t> picking up where they left off</a:t>
-            </a:r>
-          </a:p>
-          <a:p>
-            <a:r>
-              <a:rPr lang="en-US" baseline="0" dirty="0" smtClean="0"/>
-              <a:t>Add on code for VS and for R#</a:t>
-            </a:r>
-          </a:p>
-          <a:p>
+              <a:t>And, of course, the update panel!</a:t>
+            </a:r>
             <a:endParaRPr lang="en-US" dirty="0"/>
           </a:p>
         </p:txBody>
@@ -2629,8 +2728,8 @@
               <a:buAutoNum type="arabicPeriod"/>
             </a:pPr>
             <a:r>
-              <a:rPr lang="en-US" baseline="0" dirty="0" smtClean="0"/>
-              <a:t>Still going to fit larger, data driven sites better. (At least for now.)</a:t>
+              <a:rPr lang="en-US" dirty="0" smtClean="0"/>
+              <a:t>New app</a:t>
             </a:r>
           </a:p>
           <a:p>
@@ -2638,83 +2737,12 @@
               <a:buAutoNum type="arabicPeriod"/>
             </a:pPr>
             <a:r>
+              <a:rPr lang="en-US" dirty="0" smtClean="0"/>
+              <a:t>Demo</a:t>
+            </a:r>
+            <a:r>
               <a:rPr lang="en-US" baseline="0" dirty="0" smtClean="0"/>
-              <a:t>Much more mature framework to build </a:t>
-            </a:r>
-            <a:r>
-              <a:rPr lang="en-US" baseline="0" dirty="0" err="1" smtClean="0"/>
-              <a:t>ASP.Net</a:t>
-            </a:r>
-            <a:r>
-              <a:rPr lang="en-US" baseline="0" dirty="0" smtClean="0"/>
-              <a:t> apps on</a:t>
-            </a:r>
-          </a:p>
-          <a:p>
-            <a:pPr marL="228600" indent="-228600">
-              <a:buAutoNum type="arabicPeriod"/>
-            </a:pPr>
-            <a:r>
-              <a:rPr lang="en-US" baseline="0" dirty="0" smtClean="0"/>
-              <a:t>Quicker deployment, more drag and drop</a:t>
-            </a:r>
-          </a:p>
-          <a:p>
-            <a:pPr marL="228600" indent="-228600">
-              <a:buAutoNum type="arabicPeriod"/>
-            </a:pPr>
-            <a:r>
-              <a:rPr lang="en-US" baseline="0" dirty="0" smtClean="0"/>
-              <a:t>More Better UI controls available.</a:t>
-            </a:r>
-          </a:p>
-          <a:p>
-            <a:pPr marL="228600" indent="-228600">
-              <a:buAutoNum type="arabicPeriod"/>
-            </a:pPr>
-            <a:r>
-              <a:rPr lang="en-US" baseline="0" dirty="0" smtClean="0"/>
-              <a:t>Lots of 3</a:t>
-            </a:r>
-            <a:r>
-              <a:rPr lang="en-US" baseline="30000" dirty="0" smtClean="0"/>
-              <a:t>rd</a:t>
-            </a:r>
-            <a:r>
-              <a:rPr lang="en-US" baseline="0" dirty="0" smtClean="0"/>
-              <a:t> party controls available…like our Friends at </a:t>
-            </a:r>
-            <a:r>
-              <a:rPr lang="en-US" baseline="0" dirty="0" err="1" smtClean="0"/>
-              <a:t>Telerik</a:t>
-            </a:r>
-            <a:endParaRPr lang="en-US" baseline="0" dirty="0" smtClean="0"/>
-          </a:p>
-          <a:p>
-            <a:pPr marL="228600" indent="-228600">
-              <a:buAutoNum type="arabicPeriod"/>
-            </a:pPr>
-            <a:r>
-              <a:rPr lang="en-US" baseline="0" dirty="0" smtClean="0"/>
-              <a:t>Better Documentation</a:t>
-            </a:r>
-          </a:p>
-          <a:p>
-            <a:pPr marL="228600" indent="-228600">
-              <a:buAutoNum type="arabicPeriod"/>
-            </a:pPr>
-            <a:r>
-              <a:rPr lang="en-US" baseline="0" dirty="0" smtClean="0"/>
-              <a:t>More examples and code samples to draw from</a:t>
-            </a:r>
-          </a:p>
-          <a:p>
-            <a:pPr marL="228600" indent="-228600">
-              <a:buAutoNum type="arabicPeriod"/>
-            </a:pPr>
-            <a:r>
-              <a:rPr lang="en-US" baseline="0" dirty="0" smtClean="0"/>
-              <a:t>And, of course, the update panel!</a:t>
+              <a:t> app</a:t>
             </a:r>
             <a:endParaRPr lang="en-US" dirty="0"/>
           </a:p>
@@ -2798,26 +2826,6 @@
           </a:bodyPr>
           <a:lstStyle/>
           <a:p>
-            <a:pPr marL="228600" indent="-228600">
-              <a:buAutoNum type="arabicPeriod"/>
-            </a:pPr>
-            <a:r>
-              <a:rPr lang="en-US" dirty="0" smtClean="0"/>
-              <a:t>New app</a:t>
-            </a:r>
-          </a:p>
-          <a:p>
-            <a:pPr marL="228600" indent="-228600">
-              <a:buAutoNum type="arabicPeriod"/>
-            </a:pPr>
-            <a:r>
-              <a:rPr lang="en-US" dirty="0" smtClean="0"/>
-              <a:t>Demo</a:t>
-            </a:r>
-            <a:r>
-              <a:rPr lang="en-US" baseline="0" dirty="0" smtClean="0"/>
-              <a:t> app</a:t>
-            </a:r>
             <a:endParaRPr lang="en-US" dirty="0"/>
           </a:p>
         </p:txBody>
@@ -2841,88 +2849,6 @@
               <a:rPr lang="en-US" smtClean="0"/>
               <a:pPr/>
               <a:t>26</a:t>
-            </a:fld>
-            <a:endParaRPr lang="en-US"/>
-          </a:p>
-        </p:txBody>
-      </p:sp>
-    </p:spTree>
-  </p:cSld>
-  <p:clrMapOvr>
-    <a:masterClrMapping/>
-  </p:clrMapOvr>
-</p:notes>
-</file>
-
-<file path=ppt/notesSlides/notesSlide25.xml><?xml version="1.0" encoding="utf-8"?>
-<p:notes xmlns:a="http://schemas.openxmlformats.org/drawingml/2006/main" xmlns:r="http://schemas.openxmlformats.org/officeDocument/2006/relationships" xmlns:p="http://schemas.openxmlformats.org/presentationml/2006/main">
-  <p:cSld>
-    <p:spTree>
-      <p:nvGrpSpPr>
-        <p:cNvPr id="1" name=""/>
-        <p:cNvGrpSpPr/>
-        <p:nvPr/>
-      </p:nvGrpSpPr>
-      <p:grpSpPr>
-        <a:xfrm>
-          <a:off x="0" y="0"/>
-          <a:ext cx="0" cy="0"/>
-          <a:chOff x="0" y="0"/>
-          <a:chExt cx="0" cy="0"/>
-        </a:xfrm>
-      </p:grpSpPr>
-      <p:sp>
-        <p:nvSpPr>
-          <p:cNvPr id="2" name="Slide Image Placeholder 1"/>
-          <p:cNvSpPr>
-            <a:spLocks noGrp="1" noRot="1" noChangeAspect="1"/>
-          </p:cNvSpPr>
-          <p:nvPr>
-            <p:ph type="sldImg"/>
-          </p:nvPr>
-        </p:nvSpPr>
-        <p:spPr/>
-      </p:sp>
-      <p:sp>
-        <p:nvSpPr>
-          <p:cNvPr id="3" name="Notes Placeholder 2"/>
-          <p:cNvSpPr>
-            <a:spLocks noGrp="1"/>
-          </p:cNvSpPr>
-          <p:nvPr>
-            <p:ph type="body" idx="1"/>
-          </p:nvPr>
-        </p:nvSpPr>
-        <p:spPr/>
-        <p:txBody>
-          <a:bodyPr>
-            <a:normAutofit/>
-          </a:bodyPr>
-          <a:lstStyle/>
-          <a:p>
-            <a:endParaRPr lang="en-US" dirty="0"/>
-          </a:p>
-        </p:txBody>
-      </p:sp>
-      <p:sp>
-        <p:nvSpPr>
-          <p:cNvPr id="4" name="Slide Number Placeholder 3"/>
-          <p:cNvSpPr>
-            <a:spLocks noGrp="1"/>
-          </p:cNvSpPr>
-          <p:nvPr>
-            <p:ph type="sldNum" sz="quarter" idx="10"/>
-          </p:nvPr>
-        </p:nvSpPr>
-        <p:spPr/>
-        <p:txBody>
-          <a:bodyPr/>
-          <a:lstStyle/>
-          <a:p>
-            <a:fld id="{F8007F4E-10F5-4104-9EF8-E98D370060A3}" type="slidenum">
-              <a:rPr lang="en-US" smtClean="0"/>
-              <a:pPr/>
-              <a:t>27</a:t>
             </a:fld>
             <a:endParaRPr lang="en-US"/>
           </a:p>
@@ -2984,8 +2910,25 @@
           <a:p>
             <a:r>
               <a:rPr lang="en-US" dirty="0" smtClean="0"/>
-              <a:t>Love hockey, especially this guy…pay a lot to see him, at least.</a:t>
-            </a:r>
+              <a:t>Professionally, I work for Quick Solutions,</a:t>
+            </a:r>
+            <a:r>
+              <a:rPr lang="en-US" baseline="0" dirty="0" smtClean="0"/>
+              <a:t> even though none of these people do.</a:t>
+            </a:r>
+          </a:p>
+          <a:p>
+            <a:r>
+              <a:rPr lang="en-US" baseline="0" dirty="0" smtClean="0"/>
+              <a:t>Been with Quick for four years, all in the App Dev Group started by BHP.</a:t>
+            </a:r>
+          </a:p>
+          <a:p>
+            <a:r>
+              <a:rPr lang="en-US" baseline="0" dirty="0" smtClean="0"/>
+              <a:t>Been developing for over 10 years, all in Columbus.</a:t>
+            </a:r>
+            <a:endParaRPr lang="en-US" dirty="0"/>
           </a:p>
         </p:txBody>
       </p:sp>
@@ -3069,25 +3012,24 @@
           <a:p>
             <a:r>
               <a:rPr lang="en-US" dirty="0" smtClean="0"/>
-              <a:t>Professionally, I work for Quick Solutions,</a:t>
+              <a:t>Obligatory 3 circle diagram</a:t>
+            </a:r>
+          </a:p>
+          <a:p>
+            <a:r>
+              <a:rPr lang="en-US" dirty="0" smtClean="0"/>
+              <a:t>Smalltalk</a:t>
             </a:r>
             <a:r>
               <a:rPr lang="en-US" baseline="0" dirty="0" smtClean="0"/>
-              <a:t> even though none of these people do.</a:t>
+              <a:t> 1979</a:t>
             </a:r>
           </a:p>
           <a:p>
             <a:r>
               <a:rPr lang="en-US" baseline="0" dirty="0" smtClean="0"/>
-              <a:t>Been with Quick for four years, all in the App Dev Group started by BHP.</a:t>
-            </a:r>
-          </a:p>
-          <a:p>
-            <a:r>
-              <a:rPr lang="en-US" baseline="0" dirty="0" smtClean="0"/>
-              <a:t>Been developing for over 10 years, all in Columbus.</a:t>
-            </a:r>
-            <a:endParaRPr lang="en-US" dirty="0"/>
+              <a:t>Separation of concerns</a:t>
+            </a:r>
           </a:p>
         </p:txBody>
       </p:sp>
@@ -3169,26 +3111,41 @@
           </a:bodyPr>
           <a:lstStyle/>
           <a:p>
-            <a:r>
-              <a:rPr lang="en-US" dirty="0" smtClean="0"/>
-              <a:t>Obligatory 3 circle diagram</a:t>
-            </a:r>
-          </a:p>
-          <a:p>
-            <a:r>
-              <a:rPr lang="en-US" dirty="0" smtClean="0"/>
-              <a:t>Smalltalk</a:t>
-            </a:r>
+            <a:pPr marL="228600" indent="-228600">
+              <a:buAutoNum type="arabicPeriod"/>
+            </a:pPr>
             <a:r>
               <a:rPr lang="en-US" baseline="0" dirty="0" smtClean="0"/>
-              <a:t> 1979</a:t>
-            </a:r>
-          </a:p>
-          <a:p>
+              <a:t>Controller runs the show</a:t>
+            </a:r>
+          </a:p>
+          <a:p>
+            <a:pPr marL="228600" indent="-228600">
+              <a:buAutoNum type="arabicPeriod"/>
+            </a:pPr>
             <a:r>
               <a:rPr lang="en-US" baseline="0" dirty="0" smtClean="0"/>
-              <a:t>Separation of concerns</a:t>
-            </a:r>
+              <a:t>It handles the request</a:t>
+            </a:r>
+          </a:p>
+          <a:p>
+            <a:pPr marL="228600" indent="-228600">
+              <a:buAutoNum type="arabicPeriod"/>
+            </a:pPr>
+            <a:r>
+              <a:rPr lang="en-US" baseline="0" dirty="0" smtClean="0"/>
+              <a:t>Determines view</a:t>
+            </a:r>
+          </a:p>
+          <a:p>
+            <a:pPr marL="228600" indent="-228600">
+              <a:buAutoNum type="arabicPeriod"/>
+            </a:pPr>
+            <a:r>
+              <a:rPr lang="en-US" baseline="0" dirty="0" smtClean="0"/>
+              <a:t>Determines data to load the view</a:t>
+            </a:r>
+            <a:endParaRPr lang="en-US" dirty="0"/>
           </a:p>
         </p:txBody>
       </p:sp>
@@ -3275,7 +3232,7 @@
             </a:pPr>
             <a:r>
               <a:rPr lang="en-US" baseline="0" dirty="0" smtClean="0"/>
-              <a:t>Controller runs the show</a:t>
+              <a:t>The view is only the presentation to the user</a:t>
             </a:r>
           </a:p>
           <a:p>
@@ -3284,7 +3241,7 @@
             </a:pPr>
             <a:r>
               <a:rPr lang="en-US" baseline="0" dirty="0" smtClean="0"/>
-              <a:t>It handles the request</a:t>
+              <a:t>Any logic should only be presentation logic (check boxes checked, dropdowns set, etc)</a:t>
             </a:r>
           </a:p>
           <a:p>
@@ -3293,18 +3250,8 @@
             </a:pPr>
             <a:r>
               <a:rPr lang="en-US" baseline="0" dirty="0" smtClean="0"/>
-              <a:t>Determines view</a:t>
-            </a:r>
-          </a:p>
-          <a:p>
-            <a:pPr marL="228600" indent="-228600">
-              <a:buAutoNum type="arabicPeriod"/>
-            </a:pPr>
-            <a:r>
-              <a:rPr lang="en-US" baseline="0" dirty="0" smtClean="0"/>
-              <a:t>Determines data to load the view</a:t>
-            </a:r>
-            <a:endParaRPr lang="en-US" dirty="0"/>
+              <a:t>asp.net version, view can be strongly typed to the model</a:t>
+            </a:r>
           </a:p>
         </p:txBody>
       </p:sp>
@@ -3391,7 +3338,7 @@
             </a:pPr>
             <a:r>
               <a:rPr lang="en-US" baseline="0" dirty="0" smtClean="0"/>
-              <a:t>The view is only the presentation to the user</a:t>
+              <a:t>Model returns information as requested, doesn’t know to what view or what controller has called</a:t>
             </a:r>
           </a:p>
           <a:p>
@@ -3400,17 +3347,33 @@
             </a:pPr>
             <a:r>
               <a:rPr lang="en-US" baseline="0" dirty="0" smtClean="0"/>
-              <a:t>Any logic should only be presentation logic (check boxes checked, dropdowns set, etc)</a:t>
+              <a:t>Model everything that’s not view and controller – business logic, data, not just the db</a:t>
             </a:r>
           </a:p>
           <a:p>
             <a:pPr marL="228600" indent="-228600">
               <a:buAutoNum type="arabicPeriod"/>
             </a:pPr>
+            <a:endParaRPr lang="en-US" baseline="0" dirty="0" smtClean="0"/>
+          </a:p>
+          <a:p>
+            <a:pPr marL="228600" indent="-228600">
+              <a:buNone/>
+            </a:pPr>
             <a:r>
               <a:rPr lang="en-US" baseline="0" dirty="0" smtClean="0"/>
-              <a:t>asp.net version, view can be strongly typed to the model</a:t>
-            </a:r>
+              <a:t>Speaking point:</a:t>
+            </a:r>
+          </a:p>
+          <a:p>
+            <a:pPr marL="228600" indent="-228600">
+              <a:buNone/>
+            </a:pPr>
+            <a:r>
+              <a:rPr lang="en-US" baseline="0" dirty="0" smtClean="0"/>
+              <a:t>You’re thinking, “OK, great. So what? Why now?”</a:t>
+            </a:r>
+            <a:endParaRPr lang="en-US" dirty="0"/>
           </a:p>
         </p:txBody>
       </p:sp>
@@ -3492,46 +3455,17 @@
           </a:bodyPr>
           <a:lstStyle/>
           <a:p>
-            <a:pPr marL="228600" indent="-228600">
-              <a:buAutoNum type="arabicPeriod"/>
-            </a:pPr>
+            <a:r>
+              <a:rPr lang="en-US" dirty="0" smtClean="0"/>
+              <a:t>PHP lists 35 different MVC implementations</a:t>
+            </a:r>
             <a:r>
               <a:rPr lang="en-US" baseline="0" dirty="0" smtClean="0"/>
-              <a:t>Model returns information as requested, doesn’t know to what view or what controller has called</a:t>
-            </a:r>
-          </a:p>
-          <a:p>
-            <a:pPr marL="228600" indent="-228600">
-              <a:buAutoNum type="arabicPeriod"/>
-            </a:pPr>
-            <a:r>
-              <a:rPr lang="en-US" baseline="0" dirty="0" smtClean="0"/>
-              <a:t>Model everything that’s not view and controller – business logic, data, not just the db</a:t>
-            </a:r>
-          </a:p>
-          <a:p>
-            <a:pPr marL="228600" indent="-228600">
-              <a:buAutoNum type="arabicPeriod"/>
-            </a:pPr>
-            <a:endParaRPr lang="en-US" baseline="0" dirty="0" smtClean="0"/>
-          </a:p>
-          <a:p>
-            <a:pPr marL="228600" indent="-228600">
-              <a:buNone/>
-            </a:pPr>
-            <a:r>
-              <a:rPr lang="en-US" baseline="0" dirty="0" smtClean="0"/>
-              <a:t>Speaking point:</a:t>
-            </a:r>
-          </a:p>
-          <a:p>
-            <a:pPr marL="228600" indent="-228600">
-              <a:buNone/>
-            </a:pPr>
-            <a:r>
-              <a:rPr lang="en-US" baseline="0" dirty="0" smtClean="0"/>
-              <a:t>You’re thinking, “OK, great. So what? Why now?”</a:t>
-            </a:r>
+              <a:t> on Wikipedia</a:t>
+            </a:r>
+            <a:endParaRPr lang="en-US" dirty="0" smtClean="0"/>
+          </a:p>
+          <a:p>
             <a:endParaRPr lang="en-US" dirty="0"/>
           </a:p>
         </p:txBody>
@@ -3554,7 +3488,7 @@
             <a:fld id="{F8007F4E-10F5-4104-9EF8-E98D370060A3}" type="slidenum">
               <a:rPr lang="en-US" smtClean="0"/>
               <a:pPr/>
-              <a:t>8</a:t>
+              <a:t>9</a:t>
             </a:fld>
             <a:endParaRPr lang="en-US"/>
           </a:p>
@@ -3616,15 +3550,8 @@
           <a:p>
             <a:r>
               <a:rPr lang="en-US" dirty="0" smtClean="0"/>
-              <a:t>PHP lists 35 different MVC implementations</a:t>
-            </a:r>
-            <a:r>
-              <a:rPr lang="en-US" baseline="0" dirty="0" smtClean="0"/>
-              <a:t> on Wikipedia</a:t>
-            </a:r>
-            <a:endParaRPr lang="en-US" dirty="0" smtClean="0"/>
-          </a:p>
-          <a:p>
+              <a:t>Spring MVC, specifically</a:t>
+            </a:r>
             <a:endParaRPr lang="en-US" dirty="0"/>
           </a:p>
         </p:txBody>
@@ -9799,116 +9726,6 @@
       </p:grpSpPr>
       <p:pic>
         <p:nvPicPr>
-          <p:cNvPr id="2" name="Picture 13" descr="C:\Users\Tim\Pictures\presentation graphics\mvc getting started\php_logo.png"/>
-          <p:cNvPicPr>
-            <a:picLocks noChangeAspect="1" noChangeArrowheads="1"/>
-          </p:cNvPicPr>
-          <p:nvPr/>
-        </p:nvPicPr>
-        <p:blipFill>
-          <a:blip r:embed="rId3"/>
-          <a:srcRect/>
-          <a:stretch>
-            <a:fillRect/>
-          </a:stretch>
-        </p:blipFill>
-        <p:spPr bwMode="auto">
-          <a:xfrm>
-            <a:off x="533400" y="609600"/>
-            <a:ext cx="3617088" cy="1905000"/>
-          </a:xfrm>
-          <a:prstGeom prst="rect">
-            <a:avLst/>
-          </a:prstGeom>
-          <a:noFill/>
-        </p:spPr>
-      </p:pic>
-      <p:pic>
-        <p:nvPicPr>
-          <p:cNvPr id="3" name="Picture 14" descr="C:\Users\Tim\Pictures\presentation graphics\mvc getting started\cake-logo.png"/>
-          <p:cNvPicPr>
-            <a:picLocks noChangeAspect="1" noChangeArrowheads="1"/>
-          </p:cNvPicPr>
-          <p:nvPr/>
-        </p:nvPicPr>
-        <p:blipFill>
-          <a:blip r:embed="rId4"/>
-          <a:srcRect/>
-          <a:stretch>
-            <a:fillRect/>
-          </a:stretch>
-        </p:blipFill>
-        <p:spPr bwMode="auto">
-          <a:xfrm>
-            <a:off x="6019800" y="1295400"/>
-            <a:ext cx="1905000" cy="1905000"/>
-          </a:xfrm>
-          <a:prstGeom prst="rect">
-            <a:avLst/>
-          </a:prstGeom>
-          <a:noFill/>
-        </p:spPr>
-      </p:pic>
-      <p:pic>
-        <p:nvPicPr>
-          <p:cNvPr id="4" name="Picture 15" descr="C:\Users\Tim\Pictures\presentation graphics\mvc getting started\zend_framework_logo.png"/>
-          <p:cNvPicPr>
-            <a:picLocks noChangeAspect="1" noChangeArrowheads="1"/>
-          </p:cNvPicPr>
-          <p:nvPr/>
-        </p:nvPicPr>
-        <p:blipFill>
-          <a:blip r:embed="rId5"/>
-          <a:srcRect/>
-          <a:stretch>
-            <a:fillRect/>
-          </a:stretch>
-        </p:blipFill>
-        <p:spPr bwMode="auto">
-          <a:xfrm>
-            <a:off x="6096000" y="3657600"/>
-            <a:ext cx="2362200" cy="1240383"/>
-          </a:xfrm>
-          <a:prstGeom prst="rect">
-            <a:avLst/>
-          </a:prstGeom>
-          <a:noFill/>
-        </p:spPr>
-      </p:pic>
-    </p:spTree>
-  </p:cSld>
-  <p:clrMapOvr>
-    <a:masterClrMapping/>
-  </p:clrMapOvr>
-  <p:timing>
-    <p:tnLst>
-      <p:par>
-        <p:cTn id="1" dur="indefinite" restart="never" nodeType="tmRoot"/>
-      </p:par>
-    </p:tnLst>
-  </p:timing>
-</p:sld>
-</file>
-
-<file path=ppt/slides/slide11.xml><?xml version="1.0" encoding="utf-8"?>
-<p:sld xmlns:a="http://schemas.openxmlformats.org/drawingml/2006/main" xmlns:r="http://schemas.openxmlformats.org/officeDocument/2006/relationships" xmlns:p="http://schemas.openxmlformats.org/presentationml/2006/main">
-  <p:cSld>
-    <p:spTree>
-      <p:nvGrpSpPr>
-        <p:cNvPr id="1" name=""/>
-        <p:cNvGrpSpPr/>
-        <p:nvPr/>
-      </p:nvGrpSpPr>
-      <p:grpSpPr>
-        <a:xfrm>
-          <a:off x="0" y="0"/>
-          <a:ext cx="0" cy="0"/>
-          <a:chOff x="0" y="0"/>
-          <a:chExt cx="0" cy="0"/>
-        </a:xfrm>
-      </p:grpSpPr>
-      <p:pic>
-        <p:nvPicPr>
           <p:cNvPr id="2" name="Picture 9" descr="C:\Users\Tim\Pictures\presentation graphics\mvc getting started\javalogo.png"/>
           <p:cNvPicPr>
             <a:picLocks noChangeAspect="1" noChangeArrowheads="1"/>
@@ -10000,7 +9817,7 @@
 </p:sld>
 </file>
 
-<file path=ppt/slides/slide12.xml><?xml version="1.0" encoding="utf-8"?>
+<file path=ppt/slides/slide11.xml><?xml version="1.0" encoding="utf-8"?>
 <p:sld xmlns:a="http://schemas.openxmlformats.org/drawingml/2006/main" xmlns:r="http://schemas.openxmlformats.org/officeDocument/2006/relationships" xmlns:p="http://schemas.openxmlformats.org/presentationml/2006/main">
   <p:cSld>
     <p:spTree>
@@ -10084,7 +9901,7 @@
 </p:sld>
 </file>
 
-<file path=ppt/slides/slide13.xml><?xml version="1.0" encoding="utf-8"?>
+<file path=ppt/slides/slide12.xml><?xml version="1.0" encoding="utf-8"?>
 <p:sld xmlns:a="http://schemas.openxmlformats.org/drawingml/2006/main" xmlns:r="http://schemas.openxmlformats.org/officeDocument/2006/relationships" xmlns:p="http://schemas.openxmlformats.org/presentationml/2006/main">
   <p:cSld>
     <p:spTree>
@@ -10142,7 +9959,7 @@
 </p:sld>
 </file>
 
-<file path=ppt/slides/slide14.xml><?xml version="1.0" encoding="utf-8"?>
+<file path=ppt/slides/slide13.xml><?xml version="1.0" encoding="utf-8"?>
 <p:sld xmlns:a="http://schemas.openxmlformats.org/drawingml/2006/main" xmlns:r="http://schemas.openxmlformats.org/officeDocument/2006/relationships" xmlns:p="http://schemas.openxmlformats.org/presentationml/2006/main">
   <p:cSld>
     <p:spTree>
@@ -10293,7 +10110,7 @@
 </p:sld>
 </file>
 
-<file path=ppt/slides/slide15.xml><?xml version="1.0" encoding="utf-8"?>
+<file path=ppt/slides/slide14.xml><?xml version="1.0" encoding="utf-8"?>
 <p:sld xmlns:a="http://schemas.openxmlformats.org/drawingml/2006/main" xmlns:r="http://schemas.openxmlformats.org/officeDocument/2006/relationships" xmlns:p="http://schemas.openxmlformats.org/presentationml/2006/main">
   <p:cSld>
     <p:spTree>
@@ -10351,7 +10168,7 @@
 </p:sld>
 </file>
 
-<file path=ppt/slides/slide16.xml><?xml version="1.0" encoding="utf-8"?>
+<file path=ppt/slides/slide15.xml><?xml version="1.0" encoding="utf-8"?>
 <p:sld xmlns:a="http://schemas.openxmlformats.org/drawingml/2006/main" xmlns:r="http://schemas.openxmlformats.org/officeDocument/2006/relationships" xmlns:p="http://schemas.openxmlformats.org/presentationml/2006/main">
   <p:cSld>
     <p:spTree>
@@ -10636,7 +10453,7 @@
 </p:sld>
 </file>
 
-<file path=ppt/slides/slide17.xml><?xml version="1.0" encoding="utf-8"?>
+<file path=ppt/slides/slide16.xml><?xml version="1.0" encoding="utf-8"?>
 <p:sld xmlns:a="http://schemas.openxmlformats.org/drawingml/2006/main" xmlns:r="http://schemas.openxmlformats.org/officeDocument/2006/relationships" xmlns:p="http://schemas.openxmlformats.org/presentationml/2006/main">
   <p:cSld>
     <p:spTree>
@@ -10687,7 +10504,7 @@
 </p:sld>
 </file>
 
-<file path=ppt/slides/slide18.xml><?xml version="1.0" encoding="utf-8"?>
+<file path=ppt/slides/slide17.xml><?xml version="1.0" encoding="utf-8"?>
 <p:sld xmlns:a="http://schemas.openxmlformats.org/drawingml/2006/main" xmlns:r="http://schemas.openxmlformats.org/officeDocument/2006/relationships" xmlns:p="http://schemas.openxmlformats.org/presentationml/2006/main">
   <p:cSld>
     <p:spTree>
@@ -10745,7 +10562,7 @@
 </p:sld>
 </file>
 
-<file path=ppt/slides/slide19.xml><?xml version="1.0" encoding="utf-8"?>
+<file path=ppt/slides/slide18.xml><?xml version="1.0" encoding="utf-8"?>
 <p:sld xmlns:a="http://schemas.openxmlformats.org/drawingml/2006/main" xmlns:r="http://schemas.openxmlformats.org/officeDocument/2006/relationships" xmlns:p="http://schemas.openxmlformats.org/presentationml/2006/main">
   <p:cSld>
     <p:spTree>
@@ -10803,65 +10620,7 @@
 </p:sld>
 </file>
 
-<file path=ppt/slides/slide2.xml><?xml version="1.0" encoding="utf-8"?>
-<p:sld xmlns:a="http://schemas.openxmlformats.org/drawingml/2006/main" xmlns:r="http://schemas.openxmlformats.org/officeDocument/2006/relationships" xmlns:p="http://schemas.openxmlformats.org/presentationml/2006/main">
-  <p:cSld>
-    <p:spTree>
-      <p:nvGrpSpPr>
-        <p:cNvPr id="1" name=""/>
-        <p:cNvGrpSpPr/>
-        <p:nvPr/>
-      </p:nvGrpSpPr>
-      <p:grpSpPr>
-        <a:xfrm>
-          <a:off x="0" y="0"/>
-          <a:ext cx="0" cy="0"/>
-          <a:chOff x="0" y="0"/>
-          <a:chExt cx="0" cy="0"/>
-        </a:xfrm>
-      </p:grpSpPr>
-      <p:pic>
-        <p:nvPicPr>
-          <p:cNvPr id="1026" name="Picture 2" descr="C:\Users\Tim\Pictures\me_in_seward.JPG"/>
-          <p:cNvPicPr>
-            <a:picLocks noChangeAspect="1" noChangeArrowheads="1"/>
-          </p:cNvPicPr>
-          <p:nvPr/>
-        </p:nvPicPr>
-        <p:blipFill>
-          <a:blip r:embed="rId3"/>
-          <a:srcRect/>
-          <a:stretch>
-            <a:fillRect/>
-          </a:stretch>
-        </p:blipFill>
-        <p:spPr bwMode="auto">
-          <a:xfrm>
-            <a:off x="-971044" y="0"/>
-            <a:ext cx="10115044" cy="6858000"/>
-          </a:xfrm>
-          <a:prstGeom prst="rect">
-            <a:avLst/>
-          </a:prstGeom>
-          <a:noFill/>
-        </p:spPr>
-      </p:pic>
-    </p:spTree>
-  </p:cSld>
-  <p:clrMapOvr>
-    <a:masterClrMapping/>
-  </p:clrMapOvr>
-  <p:timing>
-    <p:tnLst>
-      <p:par>
-        <p:cTn id="1" dur="indefinite" restart="never" nodeType="tmRoot"/>
-      </p:par>
-    </p:tnLst>
-  </p:timing>
-</p:sld>
-</file>
-
-<file path=ppt/slides/slide20.xml><?xml version="1.0" encoding="utf-8"?>
+<file path=ppt/slides/slide19.xml><?xml version="1.0" encoding="utf-8"?>
 <p:sld xmlns:a="http://schemas.openxmlformats.org/drawingml/2006/main" xmlns:r="http://schemas.openxmlformats.org/officeDocument/2006/relationships" xmlns:p="http://schemas.openxmlformats.org/presentationml/2006/main">
   <p:cSld>
     <p:spTree>
@@ -10912,7 +10671,7 @@
 </p:sld>
 </file>
 
-<file path=ppt/slides/slide21.xml><?xml version="1.0" encoding="utf-8"?>
+<file path=ppt/slides/slide2.xml><?xml version="1.0" encoding="utf-8"?>
 <p:sld xmlns:a="http://schemas.openxmlformats.org/drawingml/2006/main" xmlns:r="http://schemas.openxmlformats.org/officeDocument/2006/relationships" xmlns:p="http://schemas.openxmlformats.org/presentationml/2006/main">
   <p:cSld>
     <p:spTree>
@@ -10929,46 +10688,32 @@
           <a:chExt cx="0" cy="0"/>
         </a:xfrm>
       </p:grpSpPr>
-      <p:sp>
-        <p:nvSpPr>
-          <p:cNvPr id="12" name="Title 1"/>
-          <p:cNvSpPr>
-            <a:spLocks noGrp="1"/>
-          </p:cNvSpPr>
-          <p:nvPr>
-            <p:ph type="title"/>
-          </p:nvPr>
-        </p:nvSpPr>
-        <p:spPr>
+      <p:pic>
+        <p:nvPicPr>
+          <p:cNvPr id="2050" name="Picture 2" descr="C:\Users\Tim\Pictures\presentation graphics\mvc getting started\nash.jpg"/>
+          <p:cNvPicPr>
+            <a:picLocks noChangeAspect="1" noChangeArrowheads="1"/>
+          </p:cNvPicPr>
+          <p:nvPr/>
+        </p:nvPicPr>
+        <p:blipFill>
+          <a:blip r:embed="rId3"/>
+          <a:srcRect/>
+          <a:stretch>
+            <a:fillRect/>
+          </a:stretch>
+        </p:blipFill>
+        <p:spPr bwMode="auto">
           <a:xfrm>
-            <a:off x="914400" y="2819400"/>
-            <a:ext cx="7772400" cy="1447800"/>
+            <a:off x="-1143000" y="0"/>
+            <a:ext cx="11181522" cy="6858000"/>
           </a:xfrm>
+          <a:prstGeom prst="rect">
+            <a:avLst/>
+          </a:prstGeom>
+          <a:noFill/>
         </p:spPr>
-        <p:txBody>
-          <a:bodyPr/>
-          <a:lstStyle/>
-          <a:p>
-            <a:r>
-              <a:rPr lang="en-US" sz="6000" dirty="0" smtClean="0">
-                <a:solidFill>
-                  <a:srgbClr val="FFC000"/>
-                </a:solidFill>
-                <a:latin typeface="Courier New" pitchFamily="49" charset="0"/>
-                <a:cs typeface="Courier New" pitchFamily="49" charset="0"/>
-              </a:rPr>
-              <a:t>&lt;code /&gt;</a:t>
-            </a:r>
-            <a:endParaRPr lang="en-US" sz="6000" dirty="0">
-              <a:solidFill>
-                <a:srgbClr val="FFC000"/>
-              </a:solidFill>
-              <a:latin typeface="Courier New" pitchFamily="49" charset="0"/>
-              <a:cs typeface="Courier New" pitchFamily="49" charset="0"/>
-            </a:endParaRPr>
-          </a:p>
-        </p:txBody>
-      </p:sp>
+      </p:pic>
     </p:spTree>
   </p:cSld>
   <p:clrMapOvr>
@@ -10984,7 +10729,79 @@
 </p:sld>
 </file>
 
-<file path=ppt/slides/slide22.xml><?xml version="1.0" encoding="utf-8"?>
+<file path=ppt/slides/slide20.xml><?xml version="1.0" encoding="utf-8"?>
+<p:sld xmlns:a="http://schemas.openxmlformats.org/drawingml/2006/main" xmlns:r="http://schemas.openxmlformats.org/officeDocument/2006/relationships" xmlns:p="http://schemas.openxmlformats.org/presentationml/2006/main">
+  <p:cSld>
+    <p:spTree>
+      <p:nvGrpSpPr>
+        <p:cNvPr id="1" name=""/>
+        <p:cNvGrpSpPr/>
+        <p:nvPr/>
+      </p:nvGrpSpPr>
+      <p:grpSpPr>
+        <a:xfrm>
+          <a:off x="0" y="0"/>
+          <a:ext cx="0" cy="0"/>
+          <a:chOff x="0" y="0"/>
+          <a:chExt cx="0" cy="0"/>
+        </a:xfrm>
+      </p:grpSpPr>
+      <p:sp>
+        <p:nvSpPr>
+          <p:cNvPr id="12" name="Title 1"/>
+          <p:cNvSpPr>
+            <a:spLocks noGrp="1"/>
+          </p:cNvSpPr>
+          <p:nvPr>
+            <p:ph type="title"/>
+          </p:nvPr>
+        </p:nvSpPr>
+        <p:spPr>
+          <a:xfrm>
+            <a:off x="914400" y="2819400"/>
+            <a:ext cx="7772400" cy="1447800"/>
+          </a:xfrm>
+        </p:spPr>
+        <p:txBody>
+          <a:bodyPr/>
+          <a:lstStyle/>
+          <a:p>
+            <a:r>
+              <a:rPr lang="en-US" sz="6000" dirty="0" smtClean="0">
+                <a:solidFill>
+                  <a:srgbClr val="FFC000"/>
+                </a:solidFill>
+                <a:latin typeface="Courier New" pitchFamily="49" charset="0"/>
+                <a:cs typeface="Courier New" pitchFamily="49" charset="0"/>
+              </a:rPr>
+              <a:t>&lt;code /&gt;</a:t>
+            </a:r>
+            <a:endParaRPr lang="en-US" sz="6000" dirty="0">
+              <a:solidFill>
+                <a:srgbClr val="FFC000"/>
+              </a:solidFill>
+              <a:latin typeface="Courier New" pitchFamily="49" charset="0"/>
+              <a:cs typeface="Courier New" pitchFamily="49" charset="0"/>
+            </a:endParaRPr>
+          </a:p>
+        </p:txBody>
+      </p:sp>
+    </p:spTree>
+  </p:cSld>
+  <p:clrMapOvr>
+    <a:masterClrMapping/>
+  </p:clrMapOvr>
+  <p:timing>
+    <p:tnLst>
+      <p:par>
+        <p:cTn id="1" dur="indefinite" restart="never" nodeType="tmRoot"/>
+      </p:par>
+    </p:tnLst>
+  </p:timing>
+</p:sld>
+</file>
+
+<file path=ppt/slides/slide21.xml><?xml version="1.0" encoding="utf-8"?>
 <p:sld xmlns:a="http://schemas.openxmlformats.org/drawingml/2006/main" xmlns:r="http://schemas.openxmlformats.org/officeDocument/2006/relationships" xmlns:p="http://schemas.openxmlformats.org/presentationml/2006/main">
   <p:cSld>
     <p:spTree>
@@ -11267,7 +11084,7 @@
 </p:sld>
 </file>
 
-<file path=ppt/slides/slide23.xml><?xml version="1.0" encoding="utf-8"?>
+<file path=ppt/slides/slide22.xml><?xml version="1.0" encoding="utf-8"?>
 <p:sld xmlns:a="http://schemas.openxmlformats.org/drawingml/2006/main" xmlns:r="http://schemas.openxmlformats.org/officeDocument/2006/relationships" xmlns:p="http://schemas.openxmlformats.org/presentationml/2006/main">
   <p:cSld>
     <p:spTree>
@@ -11782,7 +11599,7 @@
 </p:sld>
 </file>
 
-<file path=ppt/slides/slide24.xml><?xml version="1.0" encoding="utf-8"?>
+<file path=ppt/slides/slide23.xml><?xml version="1.0" encoding="utf-8"?>
 <p:sld xmlns:a="http://schemas.openxmlformats.org/drawingml/2006/main" xmlns:r="http://schemas.openxmlformats.org/officeDocument/2006/relationships" xmlns:p="http://schemas.openxmlformats.org/presentationml/2006/main">
   <p:cSld>
     <p:spTree>
@@ -11881,7 +11698,7 @@
 </p:sld>
 </file>
 
-<file path=ppt/slides/slide25.xml><?xml version="1.0" encoding="utf-8"?>
+<file path=ppt/slides/slide24.xml><?xml version="1.0" encoding="utf-8"?>
 <p:sld xmlns:a="http://schemas.openxmlformats.org/drawingml/2006/main" xmlns:r="http://schemas.openxmlformats.org/officeDocument/2006/relationships" xmlns:p="http://schemas.openxmlformats.org/presentationml/2006/main">
   <p:cSld>
     <p:spTree>
@@ -12058,6 +11875,78 @@
 </p:sld>
 </file>
 
+<file path=ppt/slides/slide25.xml><?xml version="1.0" encoding="utf-8"?>
+<p:sld xmlns:a="http://schemas.openxmlformats.org/drawingml/2006/main" xmlns:r="http://schemas.openxmlformats.org/officeDocument/2006/relationships" xmlns:p="http://schemas.openxmlformats.org/presentationml/2006/main">
+  <p:cSld>
+    <p:spTree>
+      <p:nvGrpSpPr>
+        <p:cNvPr id="1" name=""/>
+        <p:cNvGrpSpPr/>
+        <p:nvPr/>
+      </p:nvGrpSpPr>
+      <p:grpSpPr>
+        <a:xfrm>
+          <a:off x="0" y="0"/>
+          <a:ext cx="0" cy="0"/>
+          <a:chOff x="0" y="0"/>
+          <a:chExt cx="0" cy="0"/>
+        </a:xfrm>
+      </p:grpSpPr>
+      <p:sp>
+        <p:nvSpPr>
+          <p:cNvPr id="2" name="Title 1"/>
+          <p:cNvSpPr>
+            <a:spLocks noGrp="1"/>
+          </p:cNvSpPr>
+          <p:nvPr>
+            <p:ph type="title"/>
+          </p:nvPr>
+        </p:nvSpPr>
+        <p:spPr>
+          <a:xfrm>
+            <a:off x="914400" y="2819400"/>
+            <a:ext cx="7772400" cy="1447800"/>
+          </a:xfrm>
+        </p:spPr>
+        <p:txBody>
+          <a:bodyPr/>
+          <a:lstStyle/>
+          <a:p>
+            <a:r>
+              <a:rPr lang="en-US" sz="6000" dirty="0" smtClean="0">
+                <a:solidFill>
+                  <a:srgbClr val="FFC000"/>
+                </a:solidFill>
+                <a:latin typeface="Courier New" pitchFamily="49" charset="0"/>
+                <a:cs typeface="Courier New" pitchFamily="49" charset="0"/>
+              </a:rPr>
+              <a:t>&lt;code /&gt;</a:t>
+            </a:r>
+            <a:endParaRPr lang="en-US" sz="6000" dirty="0">
+              <a:solidFill>
+                <a:srgbClr val="FFC000"/>
+              </a:solidFill>
+              <a:latin typeface="Courier New" pitchFamily="49" charset="0"/>
+              <a:cs typeface="Courier New" pitchFamily="49" charset="0"/>
+            </a:endParaRPr>
+          </a:p>
+        </p:txBody>
+      </p:sp>
+    </p:spTree>
+  </p:cSld>
+  <p:clrMapOvr>
+    <a:masterClrMapping/>
+  </p:clrMapOvr>
+  <p:timing>
+    <p:tnLst>
+      <p:par>
+        <p:cTn id="1" dur="indefinite" restart="never" nodeType="tmRoot"/>
+      </p:par>
+    </p:tnLst>
+  </p:timing>
+</p:sld>
+</file>
+
 <file path=ppt/slides/slide26.xml><?xml version="1.0" encoding="utf-8"?>
 <p:sld xmlns:a="http://schemas.openxmlformats.org/drawingml/2006/main" xmlns:r="http://schemas.openxmlformats.org/officeDocument/2006/relationships" xmlns:p="http://schemas.openxmlformats.org/presentationml/2006/main">
   <p:cSld>
@@ -12085,33 +11974,104 @@
             <p:ph type="title"/>
           </p:nvPr>
         </p:nvSpPr>
-        <p:spPr>
-          <a:xfrm>
-            <a:off x="914400" y="2819400"/>
-            <a:ext cx="7772400" cy="1447800"/>
-          </a:xfrm>
-        </p:spPr>
+        <p:spPr/>
         <p:txBody>
           <a:bodyPr/>
           <a:lstStyle/>
           <a:p>
             <a:r>
-              <a:rPr lang="en-US" sz="6000" dirty="0" smtClean="0">
-                <a:solidFill>
-                  <a:srgbClr val="FFC000"/>
-                </a:solidFill>
-                <a:latin typeface="Courier New" pitchFamily="49" charset="0"/>
-                <a:cs typeface="Courier New" pitchFamily="49" charset="0"/>
+              <a:rPr lang="en-US" dirty="0" smtClean="0"/>
+              <a:t>Resources</a:t>
+            </a:r>
+            <a:endParaRPr lang="en-US" dirty="0"/>
+          </a:p>
+        </p:txBody>
+      </p:sp>
+      <p:sp>
+        <p:nvSpPr>
+          <p:cNvPr id="3" name="Content Placeholder 2"/>
+          <p:cNvSpPr>
+            <a:spLocks noGrp="1"/>
+          </p:cNvSpPr>
+          <p:nvPr>
+            <p:ph idx="1"/>
+          </p:nvPr>
+        </p:nvSpPr>
+        <p:spPr/>
+        <p:txBody>
+          <a:bodyPr/>
+          <a:lstStyle/>
+          <a:p>
+            <a:r>
+              <a:rPr lang="en-US" smtClean="0">
+                <a:hlinkClick r:id="rId3"/>
               </a:rPr>
-              <a:t>&lt;code /&gt;</a:t>
-            </a:r>
-            <a:endParaRPr lang="en-US" sz="6000" dirty="0">
-              <a:solidFill>
-                <a:srgbClr val="FFC000"/>
-              </a:solidFill>
-              <a:latin typeface="Courier New" pitchFamily="49" charset="0"/>
-              <a:cs typeface="Courier New" pitchFamily="49" charset="0"/>
-            </a:endParaRPr>
+              <a:t>www.asp.net/mvc/</a:t>
+            </a:r>
+            <a:endParaRPr lang="en-US" dirty="0" smtClean="0"/>
+          </a:p>
+          <a:p>
+            <a:r>
+              <a:rPr lang="en-US" dirty="0" smtClean="0">
+                <a:hlinkClick r:id="rId4"/>
+              </a:rPr>
+              <a:t>www.hanselman.com/blog/</a:t>
+            </a:r>
+            <a:endParaRPr lang="en-US" dirty="0" smtClean="0"/>
+          </a:p>
+          <a:p>
+            <a:r>
+              <a:rPr lang="en-US" dirty="0" smtClean="0">
+                <a:hlinkClick r:id="rId5"/>
+              </a:rPr>
+              <a:t>www.haacked.com</a:t>
+            </a:r>
+            <a:endParaRPr lang="en-US" dirty="0" smtClean="0"/>
+          </a:p>
+          <a:p>
+            <a:r>
+              <a:rPr lang="en-US" dirty="0" smtClean="0">
+                <a:hlinkClick r:id="rId6"/>
+              </a:rPr>
+              <a:t>sessions.visitmix.com/?</a:t>
+            </a:r>
+            <a:r>
+              <a:rPr lang="en-US" dirty="0" err="1" smtClean="0">
+                <a:hlinkClick r:id="rId6"/>
+              </a:rPr>
+              <a:t>selectedSearch</a:t>
+            </a:r>
+            <a:r>
+              <a:rPr lang="en-US" dirty="0" smtClean="0">
+                <a:hlinkClick r:id="rId6"/>
+              </a:rPr>
+              <a:t>=T22</a:t>
+            </a:r>
+            <a:endParaRPr lang="en-US" dirty="0" smtClean="0"/>
+          </a:p>
+          <a:p>
+            <a:r>
+              <a:rPr lang="en-US" dirty="0" smtClean="0">
+                <a:hlinkClick r:id="rId7"/>
+              </a:rPr>
+              <a:t>weblogs.asp.net/</a:t>
+            </a:r>
+            <a:r>
+              <a:rPr lang="en-US" dirty="0" err="1" smtClean="0">
+                <a:hlinkClick r:id="rId7"/>
+              </a:rPr>
+              <a:t>scottgu</a:t>
+            </a:r>
+            <a:r>
+              <a:rPr lang="en-US" dirty="0" smtClean="0">
+                <a:hlinkClick r:id="rId7"/>
+              </a:rPr>
+              <a:t>/</a:t>
+            </a:r>
+            <a:endParaRPr lang="en-US" dirty="0" smtClean="0"/>
+          </a:p>
+          <a:p>
+            <a:endParaRPr lang="en-US" dirty="0"/>
           </a:p>
         </p:txBody>
       </p:sp>
@@ -12149,149 +12109,6 @@
       </p:grpSpPr>
       <p:sp>
         <p:nvSpPr>
-          <p:cNvPr id="2" name="Title 1"/>
-          <p:cNvSpPr>
-            <a:spLocks noGrp="1"/>
-          </p:cNvSpPr>
-          <p:nvPr>
-            <p:ph type="title"/>
-          </p:nvPr>
-        </p:nvSpPr>
-        <p:spPr/>
-        <p:txBody>
-          <a:bodyPr/>
-          <a:lstStyle/>
-          <a:p>
-            <a:r>
-              <a:rPr lang="en-US" dirty="0" smtClean="0"/>
-              <a:t>Resources</a:t>
-            </a:r>
-            <a:endParaRPr lang="en-US" dirty="0"/>
-          </a:p>
-        </p:txBody>
-      </p:sp>
-      <p:sp>
-        <p:nvSpPr>
-          <p:cNvPr id="3" name="Content Placeholder 2"/>
-          <p:cNvSpPr>
-            <a:spLocks noGrp="1"/>
-          </p:cNvSpPr>
-          <p:nvPr>
-            <p:ph idx="1"/>
-          </p:nvPr>
-        </p:nvSpPr>
-        <p:spPr/>
-        <p:txBody>
-          <a:bodyPr/>
-          <a:lstStyle/>
-          <a:p>
-            <a:r>
-              <a:rPr lang="en-US" smtClean="0">
-                <a:hlinkClick r:id="rId3"/>
-              </a:rPr>
-              <a:t>www.asp.net/mvc/</a:t>
-            </a:r>
-            <a:endParaRPr lang="en-US" dirty="0" smtClean="0"/>
-          </a:p>
-          <a:p>
-            <a:r>
-              <a:rPr lang="en-US" dirty="0" smtClean="0">
-                <a:hlinkClick r:id="rId4"/>
-              </a:rPr>
-              <a:t>www.hanselman.com/blog/</a:t>
-            </a:r>
-            <a:endParaRPr lang="en-US" dirty="0" smtClean="0"/>
-          </a:p>
-          <a:p>
-            <a:r>
-              <a:rPr lang="en-US" dirty="0" smtClean="0">
-                <a:hlinkClick r:id="rId5"/>
-              </a:rPr>
-              <a:t>www.haacked.com</a:t>
-            </a:r>
-            <a:endParaRPr lang="en-US" dirty="0" smtClean="0"/>
-          </a:p>
-          <a:p>
-            <a:r>
-              <a:rPr lang="en-US" dirty="0" smtClean="0">
-                <a:hlinkClick r:id="rId6"/>
-              </a:rPr>
-              <a:t>sessions.visitmix.com/?</a:t>
-            </a:r>
-            <a:r>
-              <a:rPr lang="en-US" dirty="0" err="1" smtClean="0">
-                <a:hlinkClick r:id="rId6"/>
-              </a:rPr>
-              <a:t>selectedSearch</a:t>
-            </a:r>
-            <a:r>
-              <a:rPr lang="en-US" dirty="0" smtClean="0">
-                <a:hlinkClick r:id="rId6"/>
-              </a:rPr>
-              <a:t>=T22</a:t>
-            </a:r>
-            <a:endParaRPr lang="en-US" dirty="0" smtClean="0"/>
-          </a:p>
-          <a:p>
-            <a:r>
-              <a:rPr lang="en-US" dirty="0" smtClean="0">
-                <a:hlinkClick r:id="rId7"/>
-              </a:rPr>
-              <a:t>weblogs.asp.net/</a:t>
-            </a:r>
-            <a:r>
-              <a:rPr lang="en-US" dirty="0" err="1" smtClean="0">
-                <a:hlinkClick r:id="rId7"/>
-              </a:rPr>
-              <a:t>scottgu</a:t>
-            </a:r>
-            <a:r>
-              <a:rPr lang="en-US" dirty="0" smtClean="0">
-                <a:hlinkClick r:id="rId7"/>
-              </a:rPr>
-              <a:t>/</a:t>
-            </a:r>
-            <a:endParaRPr lang="en-US" dirty="0" smtClean="0"/>
-          </a:p>
-          <a:p>
-            <a:endParaRPr lang="en-US" dirty="0"/>
-          </a:p>
-        </p:txBody>
-      </p:sp>
-    </p:spTree>
-  </p:cSld>
-  <p:clrMapOvr>
-    <a:masterClrMapping/>
-  </p:clrMapOvr>
-  <p:timing>
-    <p:tnLst>
-      <p:par>
-        <p:cTn id="1" dur="indefinite" restart="never" nodeType="tmRoot"/>
-      </p:par>
-    </p:tnLst>
-  </p:timing>
-</p:sld>
-</file>
-
-<file path=ppt/slides/slide28.xml><?xml version="1.0" encoding="utf-8"?>
-<p:sld xmlns:a="http://schemas.openxmlformats.org/drawingml/2006/main" xmlns:r="http://schemas.openxmlformats.org/officeDocument/2006/relationships" xmlns:p="http://schemas.openxmlformats.org/presentationml/2006/main">
-  <p:cSld>
-    <p:spTree>
-      <p:nvGrpSpPr>
-        <p:cNvPr id="1" name=""/>
-        <p:cNvGrpSpPr/>
-        <p:nvPr/>
-      </p:nvGrpSpPr>
-      <p:grpSpPr>
-        <a:xfrm>
-          <a:off x="0" y="0"/>
-          <a:ext cx="0" cy="0"/>
-          <a:chOff x="0" y="0"/>
-          <a:chExt cx="0" cy="0"/>
-        </a:xfrm>
-      </p:grpSpPr>
-      <p:sp>
-        <p:nvSpPr>
           <p:cNvPr id="3" name="Title 2"/>
           <p:cNvSpPr>
             <a:spLocks noGrp="1"/>
@@ -12393,64 +12210,6 @@
 </file>
 
 <file path=ppt/slides/slide3.xml><?xml version="1.0" encoding="utf-8"?>
-<p:sld xmlns:a="http://schemas.openxmlformats.org/drawingml/2006/main" xmlns:r="http://schemas.openxmlformats.org/officeDocument/2006/relationships" xmlns:p="http://schemas.openxmlformats.org/presentationml/2006/main">
-  <p:cSld>
-    <p:spTree>
-      <p:nvGrpSpPr>
-        <p:cNvPr id="1" name=""/>
-        <p:cNvGrpSpPr/>
-        <p:nvPr/>
-      </p:nvGrpSpPr>
-      <p:grpSpPr>
-        <a:xfrm>
-          <a:off x="0" y="0"/>
-          <a:ext cx="0" cy="0"/>
-          <a:chOff x="0" y="0"/>
-          <a:chExt cx="0" cy="0"/>
-        </a:xfrm>
-      </p:grpSpPr>
-      <p:pic>
-        <p:nvPicPr>
-          <p:cNvPr id="2050" name="Picture 2" descr="C:\Users\Tim\Pictures\presentation graphics\mvc getting started\nash.jpg"/>
-          <p:cNvPicPr>
-            <a:picLocks noChangeAspect="1" noChangeArrowheads="1"/>
-          </p:cNvPicPr>
-          <p:nvPr/>
-        </p:nvPicPr>
-        <p:blipFill>
-          <a:blip r:embed="rId3"/>
-          <a:srcRect/>
-          <a:stretch>
-            <a:fillRect/>
-          </a:stretch>
-        </p:blipFill>
-        <p:spPr bwMode="auto">
-          <a:xfrm>
-            <a:off x="-1143000" y="0"/>
-            <a:ext cx="11181522" cy="6858000"/>
-          </a:xfrm>
-          <a:prstGeom prst="rect">
-            <a:avLst/>
-          </a:prstGeom>
-          <a:noFill/>
-        </p:spPr>
-      </p:pic>
-    </p:spTree>
-  </p:cSld>
-  <p:clrMapOvr>
-    <a:masterClrMapping/>
-  </p:clrMapOvr>
-  <p:timing>
-    <p:tnLst>
-      <p:par>
-        <p:cTn id="1" dur="indefinite" restart="never" nodeType="tmRoot"/>
-      </p:par>
-    </p:tnLst>
-  </p:timing>
-</p:sld>
-</file>
-
-<file path=ppt/slides/slide4.xml><?xml version="1.0" encoding="utf-8"?>
 <p:sld xmlns:a="http://schemas.openxmlformats.org/drawingml/2006/main" xmlns:r="http://schemas.openxmlformats.org/officeDocument/2006/relationships" xmlns:p="http://schemas.openxmlformats.org/presentationml/2006/main">
   <p:cSld>
     <p:spTree>
@@ -12560,7 +12319,7 @@
 </p:sld>
 </file>
 
-<file path=ppt/slides/slide5.xml><?xml version="1.0" encoding="utf-8"?>
+<file path=ppt/slides/slide4.xml><?xml version="1.0" encoding="utf-8"?>
 <p:sld xmlns:a="http://schemas.openxmlformats.org/drawingml/2006/main" xmlns:r="http://schemas.openxmlformats.org/officeDocument/2006/relationships" xmlns:p="http://schemas.openxmlformats.org/presentationml/2006/main">
   <p:cSld>
     <p:spTree>
@@ -12925,7 +12684,7 @@
 </p:sld>
 </file>
 
-<file path=ppt/slides/slide6.xml><?xml version="1.0" encoding="utf-8"?>
+<file path=ppt/slides/slide5.xml><?xml version="1.0" encoding="utf-8"?>
 <p:sld xmlns:a="http://schemas.openxmlformats.org/drawingml/2006/main" xmlns:r="http://schemas.openxmlformats.org/officeDocument/2006/relationships" xmlns:p="http://schemas.openxmlformats.org/presentationml/2006/main">
   <p:cSld>
     <p:spTree>
@@ -12983,7 +12742,7 @@
 </p:sld>
 </file>
 
-<file path=ppt/slides/slide7.xml><?xml version="1.0" encoding="utf-8"?>
+<file path=ppt/slides/slide6.xml><?xml version="1.0" encoding="utf-8"?>
 <p:sld xmlns:a="http://schemas.openxmlformats.org/drawingml/2006/main" xmlns:r="http://schemas.openxmlformats.org/officeDocument/2006/relationships" xmlns:p="http://schemas.openxmlformats.org/presentationml/2006/main">
   <p:cSld>
     <p:spTree>
@@ -13041,7 +12800,7 @@
 </p:sld>
 </file>
 
-<file path=ppt/slides/slide8.xml><?xml version="1.0" encoding="utf-8"?>
+<file path=ppt/slides/slide7.xml><?xml version="1.0" encoding="utf-8"?>
 <p:sld xmlns:a="http://schemas.openxmlformats.org/drawingml/2006/main" xmlns:r="http://schemas.openxmlformats.org/officeDocument/2006/relationships" xmlns:p="http://schemas.openxmlformats.org/presentationml/2006/main">
   <p:cSld>
     <p:spTree>
@@ -13099,7 +12858,7 @@
 </p:sld>
 </file>
 
-<file path=ppt/slides/slide9.xml><?xml version="1.0" encoding="utf-8"?>
+<file path=ppt/slides/slide8.xml><?xml version="1.0" encoding="utf-8"?>
 <p:sld xmlns:a="http://schemas.openxmlformats.org/drawingml/2006/main" xmlns:r="http://schemas.openxmlformats.org/officeDocument/2006/relationships" xmlns:p="http://schemas.openxmlformats.org/presentationml/2006/main">
   <p:cSld>
     <p:spTree>
@@ -13187,6 +12946,116 @@
           <a:xfrm>
             <a:off x="5486400" y="3886200"/>
             <a:ext cx="2590800" cy="1155728"/>
+          </a:xfrm>
+          <a:prstGeom prst="rect">
+            <a:avLst/>
+          </a:prstGeom>
+          <a:noFill/>
+        </p:spPr>
+      </p:pic>
+    </p:spTree>
+  </p:cSld>
+  <p:clrMapOvr>
+    <a:masterClrMapping/>
+  </p:clrMapOvr>
+  <p:timing>
+    <p:tnLst>
+      <p:par>
+        <p:cTn id="1" dur="indefinite" restart="never" nodeType="tmRoot"/>
+      </p:par>
+    </p:tnLst>
+  </p:timing>
+</p:sld>
+</file>
+
+<file path=ppt/slides/slide9.xml><?xml version="1.0" encoding="utf-8"?>
+<p:sld xmlns:a="http://schemas.openxmlformats.org/drawingml/2006/main" xmlns:r="http://schemas.openxmlformats.org/officeDocument/2006/relationships" xmlns:p="http://schemas.openxmlformats.org/presentationml/2006/main">
+  <p:cSld>
+    <p:spTree>
+      <p:nvGrpSpPr>
+        <p:cNvPr id="1" name=""/>
+        <p:cNvGrpSpPr/>
+        <p:nvPr/>
+      </p:nvGrpSpPr>
+      <p:grpSpPr>
+        <a:xfrm>
+          <a:off x="0" y="0"/>
+          <a:ext cx="0" cy="0"/>
+          <a:chOff x="0" y="0"/>
+          <a:chExt cx="0" cy="0"/>
+        </a:xfrm>
+      </p:grpSpPr>
+      <p:pic>
+        <p:nvPicPr>
+          <p:cNvPr id="2" name="Picture 13" descr="C:\Users\Tim\Pictures\presentation graphics\mvc getting started\php_logo.png"/>
+          <p:cNvPicPr>
+            <a:picLocks noChangeAspect="1" noChangeArrowheads="1"/>
+          </p:cNvPicPr>
+          <p:nvPr/>
+        </p:nvPicPr>
+        <p:blipFill>
+          <a:blip r:embed="rId3"/>
+          <a:srcRect/>
+          <a:stretch>
+            <a:fillRect/>
+          </a:stretch>
+        </p:blipFill>
+        <p:spPr bwMode="auto">
+          <a:xfrm>
+            <a:off x="533400" y="609600"/>
+            <a:ext cx="3617088" cy="1905000"/>
+          </a:xfrm>
+          <a:prstGeom prst="rect">
+            <a:avLst/>
+          </a:prstGeom>
+          <a:noFill/>
+        </p:spPr>
+      </p:pic>
+      <p:pic>
+        <p:nvPicPr>
+          <p:cNvPr id="3" name="Picture 14" descr="C:\Users\Tim\Pictures\presentation graphics\mvc getting started\cake-logo.png"/>
+          <p:cNvPicPr>
+            <a:picLocks noChangeAspect="1" noChangeArrowheads="1"/>
+          </p:cNvPicPr>
+          <p:nvPr/>
+        </p:nvPicPr>
+        <p:blipFill>
+          <a:blip r:embed="rId4"/>
+          <a:srcRect/>
+          <a:stretch>
+            <a:fillRect/>
+          </a:stretch>
+        </p:blipFill>
+        <p:spPr bwMode="auto">
+          <a:xfrm>
+            <a:off x="6019800" y="1295400"/>
+            <a:ext cx="1905000" cy="1905000"/>
+          </a:xfrm>
+          <a:prstGeom prst="rect">
+            <a:avLst/>
+          </a:prstGeom>
+          <a:noFill/>
+        </p:spPr>
+      </p:pic>
+      <p:pic>
+        <p:nvPicPr>
+          <p:cNvPr id="4" name="Picture 15" descr="C:\Users\Tim\Pictures\presentation graphics\mvc getting started\zend_framework_logo.png"/>
+          <p:cNvPicPr>
+            <a:picLocks noChangeAspect="1" noChangeArrowheads="1"/>
+          </p:cNvPicPr>
+          <p:nvPr/>
+        </p:nvPicPr>
+        <p:blipFill>
+          <a:blip r:embed="rId5"/>
+          <a:srcRect/>
+          <a:stretch>
+            <a:fillRect/>
+          </a:stretch>
+        </p:blipFill>
+        <p:spPr bwMode="auto">
+          <a:xfrm>
+            <a:off x="6096000" y="3657600"/>
+            <a:ext cx="2362200" cy="1240383"/>
           </a:xfrm>
           <a:prstGeom prst="rect">
             <a:avLst/>

</xml_diff>

<commit_message>
removed QSI logo from master slides
</commit_message>
<xml_diff>
--- a/Samples/Getting-Started-With-MVC/Getting Started with MVC.pptx
+++ b/Samples/Getting-Started-With-MVC/Getting Started with MVC.pptx
@@ -543,11 +543,7 @@
           <a:p>
             <a:r>
               <a:rPr lang="en-US" baseline="0" dirty="0" smtClean="0"/>
-              <a:t>New preview code drop came out on Thursday (4/17</a:t>
-            </a:r>
-            <a:r>
-              <a:rPr lang="en-US" baseline="0" dirty="0" smtClean="0"/>
-              <a:t>)</a:t>
+              <a:t>New preview code drop came out on Thursday (4/17)</a:t>
             </a:r>
           </a:p>
           <a:p>
@@ -3972,43 +3968,6 @@
           </a:p>
         </p:txBody>
       </p:sp>
-      <p:pic>
-        <p:nvPicPr>
-          <p:cNvPr id="18" name="Picture 8" descr="Stacked"/>
-          <p:cNvPicPr>
-            <a:picLocks noChangeAspect="1" noChangeArrowheads="1"/>
-          </p:cNvPicPr>
-          <p:nvPr userDrawn="1"/>
-        </p:nvPicPr>
-        <p:blipFill>
-          <a:blip r:embed="rId2" cstate="print">
-            <a:clrChange>
-              <a:clrFrom>
-                <a:srgbClr val="FFFFFF"/>
-              </a:clrFrom>
-              <a:clrTo>
-                <a:srgbClr val="FFFFFF">
-                  <a:alpha val="0"/>
-                </a:srgbClr>
-              </a:clrTo>
-            </a:clrChange>
-          </a:blip>
-          <a:srcRect/>
-          <a:stretch>
-            <a:fillRect/>
-          </a:stretch>
-        </p:blipFill>
-        <p:spPr bwMode="auto">
-          <a:xfrm>
-            <a:off x="7958020" y="5257800"/>
-            <a:ext cx="1014529" cy="1182688"/>
-          </a:xfrm>
-          <a:prstGeom prst="rect">
-            <a:avLst/>
-          </a:prstGeom>
-          <a:noFill/>
-        </p:spPr>
-      </p:pic>
     </p:spTree>
   </p:cSld>
   <p:clrMapOvr>
@@ -6637,43 +6596,6 @@
           </a:p>
         </p:txBody>
       </p:sp>
-      <p:pic>
-        <p:nvPicPr>
-          <p:cNvPr id="8" name="Picture 8" descr="Stacked"/>
-          <p:cNvPicPr>
-            <a:picLocks noChangeAspect="1" noChangeArrowheads="1"/>
-          </p:cNvPicPr>
-          <p:nvPr userDrawn="1"/>
-        </p:nvPicPr>
-        <p:blipFill>
-          <a:blip r:embed="rId2" cstate="print">
-            <a:clrChange>
-              <a:clrFrom>
-                <a:srgbClr val="FFFFFF"/>
-              </a:clrFrom>
-              <a:clrTo>
-                <a:srgbClr val="FFFFFF">
-                  <a:alpha val="0"/>
-                </a:srgbClr>
-              </a:clrTo>
-            </a:clrChange>
-          </a:blip>
-          <a:srcRect/>
-          <a:stretch>
-            <a:fillRect/>
-          </a:stretch>
-        </p:blipFill>
-        <p:spPr bwMode="auto">
-          <a:xfrm>
-            <a:off x="7958020" y="5257800"/>
-            <a:ext cx="1014529" cy="1182688"/>
-          </a:xfrm>
-          <a:prstGeom prst="rect">
-            <a:avLst/>
-          </a:prstGeom>
-          <a:noFill/>
-        </p:spPr>
-      </p:pic>
     </p:spTree>
   </p:cSld>
   <p:clrMapOvr>
@@ -7545,43 +7467,6 @@
           </a:p>
         </p:txBody>
       </p:sp>
-      <p:pic>
-        <p:nvPicPr>
-          <p:cNvPr id="23" name="Picture 8" descr="Stacked"/>
-          <p:cNvPicPr>
-            <a:picLocks noChangeAspect="1" noChangeArrowheads="1"/>
-          </p:cNvPicPr>
-          <p:nvPr userDrawn="1"/>
-        </p:nvPicPr>
-        <p:blipFill>
-          <a:blip r:embed="rId2" cstate="print">
-            <a:clrChange>
-              <a:clrFrom>
-                <a:srgbClr val="FFFFFF"/>
-              </a:clrFrom>
-              <a:clrTo>
-                <a:srgbClr val="FFFFFF">
-                  <a:alpha val="0"/>
-                </a:srgbClr>
-              </a:clrTo>
-            </a:clrChange>
-          </a:blip>
-          <a:srcRect/>
-          <a:stretch>
-            <a:fillRect/>
-          </a:stretch>
-        </p:blipFill>
-        <p:spPr bwMode="auto">
-          <a:xfrm>
-            <a:off x="7958020" y="5257800"/>
-            <a:ext cx="1014529" cy="1182688"/>
-          </a:xfrm>
-          <a:prstGeom prst="rect">
-            <a:avLst/>
-          </a:prstGeom>
-          <a:noFill/>
-        </p:spPr>
-      </p:pic>
     </p:spTree>
   </p:cSld>
   <p:clrMapOvr>
@@ -7811,43 +7696,6 @@
           </a:p>
         </p:txBody>
       </p:sp>
-      <p:pic>
-        <p:nvPicPr>
-          <p:cNvPr id="5" name="Picture 8" descr="Stacked"/>
-          <p:cNvPicPr>
-            <a:picLocks noChangeAspect="1" noChangeArrowheads="1"/>
-          </p:cNvPicPr>
-          <p:nvPr userDrawn="1"/>
-        </p:nvPicPr>
-        <p:blipFill>
-          <a:blip r:embed="rId2" cstate="print">
-            <a:clrChange>
-              <a:clrFrom>
-                <a:srgbClr val="FFFFFF"/>
-              </a:clrFrom>
-              <a:clrTo>
-                <a:srgbClr val="FFFFFF">
-                  <a:alpha val="0"/>
-                </a:srgbClr>
-              </a:clrTo>
-            </a:clrChange>
-          </a:blip>
-          <a:srcRect/>
-          <a:stretch>
-            <a:fillRect/>
-          </a:stretch>
-        </p:blipFill>
-        <p:spPr bwMode="auto">
-          <a:xfrm>
-            <a:off x="7958020" y="5257800"/>
-            <a:ext cx="1014529" cy="1182688"/>
-          </a:xfrm>
-          <a:prstGeom prst="rect">
-            <a:avLst/>
-          </a:prstGeom>
-          <a:noFill/>
-        </p:spPr>
-      </p:pic>
     </p:spTree>
   </p:cSld>
   <p:clrMapOvr>
@@ -9284,43 +9132,6 @@
           </a:p>
         </p:txBody>
       </p:sp>
-      <p:pic>
-        <p:nvPicPr>
-          <p:cNvPr id="18" name="Picture 8" descr="Stacked"/>
-          <p:cNvPicPr>
-            <a:picLocks noChangeAspect="1" noChangeArrowheads="1"/>
-          </p:cNvPicPr>
-          <p:nvPr userDrawn="1"/>
-        </p:nvPicPr>
-        <p:blipFill>
-          <a:blip r:embed="rId13" cstate="print">
-            <a:clrChange>
-              <a:clrFrom>
-                <a:srgbClr val="FFFFFF"/>
-              </a:clrFrom>
-              <a:clrTo>
-                <a:srgbClr val="FFFFFF">
-                  <a:alpha val="0"/>
-                </a:srgbClr>
-              </a:clrTo>
-            </a:clrChange>
-          </a:blip>
-          <a:srcRect/>
-          <a:stretch>
-            <a:fillRect/>
-          </a:stretch>
-        </p:blipFill>
-        <p:spPr bwMode="auto">
-          <a:xfrm>
-            <a:off x="7958020" y="5257800"/>
-            <a:ext cx="1014529" cy="1182688"/>
-          </a:xfrm>
-          <a:prstGeom prst="rect">
-            <a:avLst/>
-          </a:prstGeom>
-          <a:noFill/>
-        </p:spPr>
-      </p:pic>
     </p:spTree>
   </p:cSld>
   <p:clrMap bg1="dk1" tx1="lt1" bg2="dk2" tx2="lt2" accent1="accent1" accent2="accent2" accent3="accent3" accent4="accent4" accent5="accent5" accent6="accent6" hlink="hlink" folHlink="folHlink"/>

</xml_diff>